<commit_message>
Update THỰC TẬP ĐỒ ÁN CHUYÊN NGÀNH.pptx
</commit_message>
<xml_diff>
--- a/thesis/abs/THỰC TẬP ĐỒ ÁN CHUYÊN NGÀNH.pptx
+++ b/thesis/abs/THỰC TẬP ĐỒ ÁN CHUYÊN NGÀNH.pptx
@@ -5,47 +5,32 @@
     <p:sldMasterId id="2147483648" r:id="rId1"/>
   </p:sldMasterIdLst>
   <p:notesMasterIdLst>
-    <p:notesMasterId r:id="rId11"/>
+    <p:notesMasterId r:id="rId18"/>
   </p:notesMasterIdLst>
   <p:sldIdLst>
-    <p:sldId id="256" r:id="rId3"/>
-    <p:sldId id="257" r:id="rId4"/>
-    <p:sldId id="258" r:id="rId5"/>
-    <p:sldId id="259" r:id="rId6"/>
-    <p:sldId id="260" r:id="rId7"/>
-    <p:sldId id="274" r:id="rId8"/>
-    <p:sldId id="261" r:id="rId9"/>
-    <p:sldId id="262" r:id="rId10"/>
-    <p:sldId id="276" r:id="rId12"/>
-    <p:sldId id="289" r:id="rId13"/>
-    <p:sldId id="290" r:id="rId14"/>
-    <p:sldId id="264" r:id="rId15"/>
-    <p:sldId id="306" r:id="rId16"/>
-    <p:sldId id="307" r:id="rId17"/>
-    <p:sldId id="291" r:id="rId18"/>
-    <p:sldId id="298" r:id="rId19"/>
+    <p:sldId id="256" r:id="rId2"/>
+    <p:sldId id="257" r:id="rId3"/>
+    <p:sldId id="258" r:id="rId4"/>
+    <p:sldId id="259" r:id="rId5"/>
+    <p:sldId id="260" r:id="rId6"/>
+    <p:sldId id="274" r:id="rId7"/>
+    <p:sldId id="261" r:id="rId8"/>
+    <p:sldId id="262" r:id="rId9"/>
+    <p:sldId id="276" r:id="rId10"/>
+    <p:sldId id="289" r:id="rId11"/>
+    <p:sldId id="290" r:id="rId12"/>
+    <p:sldId id="264" r:id="rId13"/>
+    <p:sldId id="306" r:id="rId14"/>
+    <p:sldId id="307" r:id="rId15"/>
+    <p:sldId id="291" r:id="rId16"/>
+    <p:sldId id="298" r:id="rId17"/>
   </p:sldIdLst>
   <p:sldSz cx="18288000" cy="10287000"/>
   <p:notesSz cx="6858000" cy="9144000"/>
   <p:embeddedFontLst>
     <p:embeddedFont>
-      <p:font typeface="Cormorant Garamond Bold Italics" panose="00000800000000000000"/>
-      <p:boldItalic r:id="rId23"/>
-    </p:embeddedFont>
-    <p:embeddedFont>
-      <p:font typeface="Times New Roman Condensed" panose="02030506070405020303"/>
-      <p:regular r:id="rId24"/>
-    </p:embeddedFont>
-    <p:embeddedFont>
-      <p:font typeface="Cormorant Garamond Bold" panose="00000800000000000000"/>
-      <p:bold r:id="rId25"/>
-    </p:embeddedFont>
-    <p:embeddedFont>
-      <p:font typeface="Calibri" panose="020F0502020204030204" charset="0"/>
-      <p:regular r:id="rId26"/>
-      <p:bold r:id="rId27"/>
-      <p:italic r:id="rId28"/>
-      <p:boldItalic r:id="rId29"/>
+      <p:font typeface="Cormorant Garamond Bold Italics" panose="020B0604020202020204" charset="0"/>
+      <p:boldItalic r:id="rId19"/>
     </p:embeddedFont>
   </p:embeddedFontLst>
   <p:defaultTextStyle>
@@ -244,6 +229,7 @@
           <a:p>
             <a:fld id="{3EFD42F7-718C-4B98-AAEC-167E6DDD60A7}" type="datetimeFigureOut">
               <a:rPr lang="en-US" smtClean="0"/>
+              <a:t>1/9/2025</a:t>
             </a:fld>
             <a:endParaRPr lang="en-US"/>
           </a:p>
@@ -307,42 +293,37 @@
           <a:p>
             <a:pPr lvl="0"/>
             <a:r>
-              <a:rPr lang="en-US" smtClean="0"/>
+              <a:rPr lang="en-US"/>
               <a:t>Click to edit Master text styles</a:t>
             </a:r>
-            <a:endParaRPr lang="en-US" smtClean="0"/>
           </a:p>
           <a:p>
             <a:pPr lvl="1"/>
             <a:r>
-              <a:rPr lang="en-US" smtClean="0"/>
+              <a:rPr lang="en-US"/>
               <a:t>Second level</a:t>
             </a:r>
-            <a:endParaRPr lang="en-US" smtClean="0"/>
           </a:p>
           <a:p>
             <a:pPr lvl="2"/>
             <a:r>
-              <a:rPr lang="en-US" smtClean="0"/>
+              <a:rPr lang="en-US"/>
               <a:t>Third level</a:t>
             </a:r>
-            <a:endParaRPr lang="en-US" smtClean="0"/>
           </a:p>
           <a:p>
             <a:pPr lvl="3"/>
             <a:r>
-              <a:rPr lang="en-US" smtClean="0"/>
+              <a:rPr lang="en-US"/>
               <a:t>Fourth level</a:t>
             </a:r>
-            <a:endParaRPr lang="en-US" smtClean="0"/>
           </a:p>
           <a:p>
             <a:pPr lvl="4"/>
             <a:r>
-              <a:rPr lang="en-US" smtClean="0"/>
+              <a:rPr lang="en-US"/>
               <a:t>Fifth level</a:t>
             </a:r>
-            <a:endParaRPr lang="en-US"/>
           </a:p>
         </p:txBody>
       </p:sp>
@@ -406,6 +387,7 @@
           <a:p>
             <a:fld id="{21B2AA4F-B828-4D7C-AFD3-893933DAFCB4}" type="slidenum">
               <a:rPr lang="en-US" smtClean="0"/>
+              <a:t>‹#›</a:t>
             </a:fld>
             <a:endParaRPr lang="en-US"/>
           </a:p>
@@ -518,12 +500,19 @@
         <p:cNvGrpSpPr/>
         <p:nvPr/>
       </p:nvGrpSpPr>
-      <p:grpSpPr/>
+      <p:grpSpPr>
+        <a:xfrm>
+          <a:off x="0" y="0"/>
+          <a:ext cx="0" cy="0"/>
+          <a:chOff x="0" y="0"/>
+          <a:chExt cx="0" cy="0"/>
+        </a:xfrm>
+      </p:grpSpPr>
       <p:sp>
         <p:nvSpPr>
           <p:cNvPr id="2" name="Slide Image Placeholder 1"/>
           <p:cNvSpPr>
-            <a:spLocks noGrp="1"/>
+            <a:spLocks noGrp="1" noRot="1" noChangeAspect="1"/>
           </p:cNvSpPr>
           <p:nvPr>
             <p:ph type="sldImg" idx="2"/>
@@ -544,6 +533,7 @@
         <p:spPr/>
         <p:txBody>
           <a:bodyPr/>
+          <a:lstStyle/>
           <a:p>
             <a:endParaRPr lang="en-US"/>
           </a:p>
@@ -566,12 +556,19 @@
         <p:cNvGrpSpPr/>
         <p:nvPr/>
       </p:nvGrpSpPr>
-      <p:grpSpPr/>
+      <p:grpSpPr>
+        <a:xfrm>
+          <a:off x="0" y="0"/>
+          <a:ext cx="0" cy="0"/>
+          <a:chOff x="0" y="0"/>
+          <a:chExt cx="0" cy="0"/>
+        </a:xfrm>
+      </p:grpSpPr>
       <p:sp>
         <p:nvSpPr>
           <p:cNvPr id="2" name="Slide Image Placeholder 1"/>
           <p:cNvSpPr>
-            <a:spLocks noGrp="1"/>
+            <a:spLocks noGrp="1" noRot="1" noChangeAspect="1"/>
           </p:cNvSpPr>
           <p:nvPr>
             <p:ph type="sldImg" idx="2"/>
@@ -592,6 +589,7 @@
         <p:spPr/>
         <p:txBody>
           <a:bodyPr/>
+          <a:lstStyle/>
           <a:p>
             <a:endParaRPr lang="en-US"/>
           </a:p>
@@ -643,10 +641,9 @@
           <a:lstStyle/>
           <a:p>
             <a:r>
-              <a:rPr lang="en-US" smtClean="0"/>
+              <a:rPr lang="en-US"/>
               <a:t>Click to edit Master title style</a:t>
             </a:r>
-            <a:endParaRPr lang="en-US"/>
           </a:p>
         </p:txBody>
       </p:sp>
@@ -762,10 +759,9 @@
           </a:lstStyle>
           <a:p>
             <a:r>
-              <a:rPr lang="en-US" smtClean="0"/>
+              <a:rPr lang="en-US"/>
               <a:t>Click to edit Master subtitle style</a:t>
             </a:r>
-            <a:endParaRPr lang="en-US"/>
           </a:p>
         </p:txBody>
       </p:sp>
@@ -786,6 +782,7 @@
           <a:p>
             <a:fld id="{1D8BD707-D9CF-40AE-B4C6-C98DA3205C09}" type="datetimeFigureOut">
               <a:rPr lang="en-US" smtClean="0"/>
+              <a:t>1/9/2025</a:t>
             </a:fld>
             <a:endParaRPr lang="en-US"/>
           </a:p>
@@ -827,6 +824,7 @@
           <a:p>
             <a:fld id="{B6F15528-21DE-4FAA-801E-634DDDAF4B2B}" type="slidenum">
               <a:rPr lang="en-US" smtClean="0"/>
+              <a:t>‹#›</a:t>
             </a:fld>
             <a:endParaRPr lang="en-US"/>
           </a:p>
@@ -873,10 +871,9 @@
           <a:lstStyle/>
           <a:p>
             <a:r>
-              <a:rPr lang="en-US" smtClean="0"/>
+              <a:rPr lang="en-US"/>
               <a:t>Click to edit Master title style</a:t>
             </a:r>
-            <a:endParaRPr lang="en-US"/>
           </a:p>
         </p:txBody>
       </p:sp>
@@ -897,42 +894,37 @@
           <a:p>
             <a:pPr lvl="0"/>
             <a:r>
-              <a:rPr lang="en-US" smtClean="0"/>
+              <a:rPr lang="en-US"/>
               <a:t>Click to edit Master text styles</a:t>
             </a:r>
-            <a:endParaRPr lang="en-US" smtClean="0"/>
           </a:p>
           <a:p>
             <a:pPr lvl="1"/>
             <a:r>
-              <a:rPr lang="en-US" smtClean="0"/>
+              <a:rPr lang="en-US"/>
               <a:t>Second level</a:t>
             </a:r>
-            <a:endParaRPr lang="en-US" smtClean="0"/>
           </a:p>
           <a:p>
             <a:pPr lvl="2"/>
             <a:r>
-              <a:rPr lang="en-US" smtClean="0"/>
+              <a:rPr lang="en-US"/>
               <a:t>Third level</a:t>
             </a:r>
-            <a:endParaRPr lang="en-US" smtClean="0"/>
           </a:p>
           <a:p>
             <a:pPr lvl="3"/>
             <a:r>
-              <a:rPr lang="en-US" smtClean="0"/>
+              <a:rPr lang="en-US"/>
               <a:t>Fourth level</a:t>
             </a:r>
-            <a:endParaRPr lang="en-US" smtClean="0"/>
           </a:p>
           <a:p>
             <a:pPr lvl="4"/>
             <a:r>
-              <a:rPr lang="en-US" smtClean="0"/>
+              <a:rPr lang="en-US"/>
               <a:t>Fifth level</a:t>
             </a:r>
-            <a:endParaRPr lang="en-US"/>
           </a:p>
         </p:txBody>
       </p:sp>
@@ -953,6 +945,7 @@
           <a:p>
             <a:fld id="{1D8BD707-D9CF-40AE-B4C6-C98DA3205C09}" type="datetimeFigureOut">
               <a:rPr lang="en-US" smtClean="0"/>
+              <a:t>1/9/2025</a:t>
             </a:fld>
             <a:endParaRPr lang="en-US"/>
           </a:p>
@@ -994,6 +987,7 @@
           <a:p>
             <a:fld id="{B6F15528-21DE-4FAA-801E-634DDDAF4B2B}" type="slidenum">
               <a:rPr lang="en-US" smtClean="0"/>
+              <a:t>‹#›</a:t>
             </a:fld>
             <a:endParaRPr lang="en-US"/>
           </a:p>
@@ -1045,10 +1039,9 @@
           <a:lstStyle/>
           <a:p>
             <a:r>
-              <a:rPr lang="en-US" smtClean="0"/>
+              <a:rPr lang="en-US"/>
               <a:t>Click to edit Master title style</a:t>
             </a:r>
-            <a:endParaRPr lang="en-US"/>
           </a:p>
         </p:txBody>
       </p:sp>
@@ -1074,42 +1067,37 @@
           <a:p>
             <a:pPr lvl="0"/>
             <a:r>
-              <a:rPr lang="en-US" smtClean="0"/>
+              <a:rPr lang="en-US"/>
               <a:t>Click to edit Master text styles</a:t>
             </a:r>
-            <a:endParaRPr lang="en-US" smtClean="0"/>
           </a:p>
           <a:p>
             <a:pPr lvl="1"/>
             <a:r>
-              <a:rPr lang="en-US" smtClean="0"/>
+              <a:rPr lang="en-US"/>
               <a:t>Second level</a:t>
             </a:r>
-            <a:endParaRPr lang="en-US" smtClean="0"/>
           </a:p>
           <a:p>
             <a:pPr lvl="2"/>
             <a:r>
-              <a:rPr lang="en-US" smtClean="0"/>
+              <a:rPr lang="en-US"/>
               <a:t>Third level</a:t>
             </a:r>
-            <a:endParaRPr lang="en-US" smtClean="0"/>
           </a:p>
           <a:p>
             <a:pPr lvl="3"/>
             <a:r>
-              <a:rPr lang="en-US" smtClean="0"/>
+              <a:rPr lang="en-US"/>
               <a:t>Fourth level</a:t>
             </a:r>
-            <a:endParaRPr lang="en-US" smtClean="0"/>
           </a:p>
           <a:p>
             <a:pPr lvl="4"/>
             <a:r>
-              <a:rPr lang="en-US" smtClean="0"/>
+              <a:rPr lang="en-US"/>
               <a:t>Fifth level</a:t>
             </a:r>
-            <a:endParaRPr lang="en-US"/>
           </a:p>
         </p:txBody>
       </p:sp>
@@ -1130,6 +1118,7 @@
           <a:p>
             <a:fld id="{1D8BD707-D9CF-40AE-B4C6-C98DA3205C09}" type="datetimeFigureOut">
               <a:rPr lang="en-US" smtClean="0"/>
+              <a:t>1/9/2025</a:t>
             </a:fld>
             <a:endParaRPr lang="en-US"/>
           </a:p>
@@ -1171,6 +1160,7 @@
           <a:p>
             <a:fld id="{B6F15528-21DE-4FAA-801E-634DDDAF4B2B}" type="slidenum">
               <a:rPr lang="en-US" smtClean="0"/>
+              <a:t>‹#›</a:t>
             </a:fld>
             <a:endParaRPr lang="en-US"/>
           </a:p>
@@ -1217,10 +1207,9 @@
           <a:lstStyle/>
           <a:p>
             <a:r>
-              <a:rPr lang="en-US" smtClean="0"/>
+              <a:rPr lang="en-US"/>
               <a:t>Click to edit Master title style</a:t>
             </a:r>
-            <a:endParaRPr lang="en-US"/>
           </a:p>
         </p:txBody>
       </p:sp>
@@ -1241,42 +1230,37 @@
           <a:p>
             <a:pPr lvl="0"/>
             <a:r>
-              <a:rPr lang="en-US" smtClean="0"/>
+              <a:rPr lang="en-US"/>
               <a:t>Click to edit Master text styles</a:t>
             </a:r>
-            <a:endParaRPr lang="en-US" smtClean="0"/>
           </a:p>
           <a:p>
             <a:pPr lvl="1"/>
             <a:r>
-              <a:rPr lang="en-US" smtClean="0"/>
+              <a:rPr lang="en-US"/>
               <a:t>Second level</a:t>
             </a:r>
-            <a:endParaRPr lang="en-US" smtClean="0"/>
           </a:p>
           <a:p>
             <a:pPr lvl="2"/>
             <a:r>
-              <a:rPr lang="en-US" smtClean="0"/>
+              <a:rPr lang="en-US"/>
               <a:t>Third level</a:t>
             </a:r>
-            <a:endParaRPr lang="en-US" smtClean="0"/>
           </a:p>
           <a:p>
             <a:pPr lvl="3"/>
             <a:r>
-              <a:rPr lang="en-US" smtClean="0"/>
+              <a:rPr lang="en-US"/>
               <a:t>Fourth level</a:t>
             </a:r>
-            <a:endParaRPr lang="en-US" smtClean="0"/>
           </a:p>
           <a:p>
             <a:pPr lvl="4"/>
             <a:r>
-              <a:rPr lang="en-US" smtClean="0"/>
+              <a:rPr lang="en-US"/>
               <a:t>Fifth level</a:t>
             </a:r>
-            <a:endParaRPr lang="en-US"/>
           </a:p>
         </p:txBody>
       </p:sp>
@@ -1297,6 +1281,7 @@
           <a:p>
             <a:fld id="{1D8BD707-D9CF-40AE-B4C6-C98DA3205C09}" type="datetimeFigureOut">
               <a:rPr lang="en-US" smtClean="0"/>
+              <a:t>1/9/2025</a:t>
             </a:fld>
             <a:endParaRPr lang="en-US"/>
           </a:p>
@@ -1338,6 +1323,7 @@
           <a:p>
             <a:fld id="{B6F15528-21DE-4FAA-801E-634DDDAF4B2B}" type="slidenum">
               <a:rPr lang="en-US" smtClean="0"/>
+              <a:t>‹#›</a:t>
             </a:fld>
             <a:endParaRPr lang="en-US"/>
           </a:p>
@@ -1393,10 +1379,9 @@
           </a:lstStyle>
           <a:p>
             <a:r>
-              <a:rPr lang="en-US" smtClean="0"/>
+              <a:rPr lang="en-US"/>
               <a:t>Click to edit Master title style</a:t>
             </a:r>
-            <a:endParaRPr lang="en-US"/>
           </a:p>
         </p:txBody>
       </p:sp>
@@ -1513,10 +1498,9 @@
           <a:p>
             <a:pPr lvl="0"/>
             <a:r>
-              <a:rPr lang="en-US" smtClean="0"/>
+              <a:rPr lang="en-US"/>
               <a:t>Click to edit Master text styles</a:t>
             </a:r>
-            <a:endParaRPr lang="en-US" smtClean="0"/>
           </a:p>
         </p:txBody>
       </p:sp>
@@ -1537,6 +1521,7 @@
           <a:p>
             <a:fld id="{1D8BD707-D9CF-40AE-B4C6-C98DA3205C09}" type="datetimeFigureOut">
               <a:rPr lang="en-US" smtClean="0"/>
+              <a:t>1/9/2025</a:t>
             </a:fld>
             <a:endParaRPr lang="en-US"/>
           </a:p>
@@ -1578,6 +1563,7 @@
           <a:p>
             <a:fld id="{B6F15528-21DE-4FAA-801E-634DDDAF4B2B}" type="slidenum">
               <a:rPr lang="en-US" smtClean="0"/>
+              <a:t>‹#›</a:t>
             </a:fld>
             <a:endParaRPr lang="en-US"/>
           </a:p>
@@ -1624,10 +1610,9 @@
           <a:lstStyle/>
           <a:p>
             <a:r>
-              <a:rPr lang="en-US" smtClean="0"/>
+              <a:rPr lang="en-US"/>
               <a:t>Click to edit Master title style</a:t>
             </a:r>
-            <a:endParaRPr lang="en-US"/>
           </a:p>
         </p:txBody>
       </p:sp>
@@ -1681,42 +1666,37 @@
           <a:p>
             <a:pPr lvl="0"/>
             <a:r>
-              <a:rPr lang="en-US" smtClean="0"/>
+              <a:rPr lang="en-US"/>
               <a:t>Click to edit Master text styles</a:t>
             </a:r>
-            <a:endParaRPr lang="en-US" smtClean="0"/>
           </a:p>
           <a:p>
             <a:pPr lvl="1"/>
             <a:r>
-              <a:rPr lang="en-US" smtClean="0"/>
+              <a:rPr lang="en-US"/>
               <a:t>Second level</a:t>
             </a:r>
-            <a:endParaRPr lang="en-US" smtClean="0"/>
           </a:p>
           <a:p>
             <a:pPr lvl="2"/>
             <a:r>
-              <a:rPr lang="en-US" smtClean="0"/>
+              <a:rPr lang="en-US"/>
               <a:t>Third level</a:t>
             </a:r>
-            <a:endParaRPr lang="en-US" smtClean="0"/>
           </a:p>
           <a:p>
             <a:pPr lvl="3"/>
             <a:r>
-              <a:rPr lang="en-US" smtClean="0"/>
+              <a:rPr lang="en-US"/>
               <a:t>Fourth level</a:t>
             </a:r>
-            <a:endParaRPr lang="en-US" smtClean="0"/>
           </a:p>
           <a:p>
             <a:pPr lvl="4"/>
             <a:r>
-              <a:rPr lang="en-US" smtClean="0"/>
+              <a:rPr lang="en-US"/>
               <a:t>Fifth level</a:t>
             </a:r>
-            <a:endParaRPr lang="en-US"/>
           </a:p>
         </p:txBody>
       </p:sp>
@@ -1770,42 +1750,37 @@
           <a:p>
             <a:pPr lvl="0"/>
             <a:r>
-              <a:rPr lang="en-US" smtClean="0"/>
+              <a:rPr lang="en-US"/>
               <a:t>Click to edit Master text styles</a:t>
             </a:r>
-            <a:endParaRPr lang="en-US" smtClean="0"/>
           </a:p>
           <a:p>
             <a:pPr lvl="1"/>
             <a:r>
-              <a:rPr lang="en-US" smtClean="0"/>
+              <a:rPr lang="en-US"/>
               <a:t>Second level</a:t>
             </a:r>
-            <a:endParaRPr lang="en-US" smtClean="0"/>
           </a:p>
           <a:p>
             <a:pPr lvl="2"/>
             <a:r>
-              <a:rPr lang="en-US" smtClean="0"/>
+              <a:rPr lang="en-US"/>
               <a:t>Third level</a:t>
             </a:r>
-            <a:endParaRPr lang="en-US" smtClean="0"/>
           </a:p>
           <a:p>
             <a:pPr lvl="3"/>
             <a:r>
-              <a:rPr lang="en-US" smtClean="0"/>
+              <a:rPr lang="en-US"/>
               <a:t>Fourth level</a:t>
             </a:r>
-            <a:endParaRPr lang="en-US" smtClean="0"/>
           </a:p>
           <a:p>
             <a:pPr lvl="4"/>
             <a:r>
-              <a:rPr lang="en-US" smtClean="0"/>
+              <a:rPr lang="en-US"/>
               <a:t>Fifth level</a:t>
             </a:r>
-            <a:endParaRPr lang="en-US"/>
           </a:p>
         </p:txBody>
       </p:sp>
@@ -1826,6 +1801,7 @@
           <a:p>
             <a:fld id="{1D8BD707-D9CF-40AE-B4C6-C98DA3205C09}" type="datetimeFigureOut">
               <a:rPr lang="en-US" smtClean="0"/>
+              <a:t>1/9/2025</a:t>
             </a:fld>
             <a:endParaRPr lang="en-US"/>
           </a:p>
@@ -1867,6 +1843,7 @@
           <a:p>
             <a:fld id="{B6F15528-21DE-4FAA-801E-634DDDAF4B2B}" type="slidenum">
               <a:rPr lang="en-US" smtClean="0"/>
+              <a:t>‹#›</a:t>
             </a:fld>
             <a:endParaRPr lang="en-US"/>
           </a:p>
@@ -1917,10 +1894,9 @@
           </a:lstStyle>
           <a:p>
             <a:r>
-              <a:rPr lang="en-US" smtClean="0"/>
+              <a:rPr lang="en-US"/>
               <a:t>Click to edit Master title style</a:t>
             </a:r>
-            <a:endParaRPr lang="en-US"/>
           </a:p>
         </p:txBody>
       </p:sp>
@@ -1983,10 +1959,9 @@
           <a:p>
             <a:pPr lvl="0"/>
             <a:r>
-              <a:rPr lang="en-US" smtClean="0"/>
+              <a:rPr lang="en-US"/>
               <a:t>Click to edit Master text styles</a:t>
             </a:r>
-            <a:endParaRPr lang="en-US" smtClean="0"/>
           </a:p>
         </p:txBody>
       </p:sp>
@@ -2040,42 +2015,37 @@
           <a:p>
             <a:pPr lvl="0"/>
             <a:r>
-              <a:rPr lang="en-US" smtClean="0"/>
+              <a:rPr lang="en-US"/>
               <a:t>Click to edit Master text styles</a:t>
             </a:r>
-            <a:endParaRPr lang="en-US" smtClean="0"/>
           </a:p>
           <a:p>
             <a:pPr lvl="1"/>
             <a:r>
-              <a:rPr lang="en-US" smtClean="0"/>
+              <a:rPr lang="en-US"/>
               <a:t>Second level</a:t>
             </a:r>
-            <a:endParaRPr lang="en-US" smtClean="0"/>
           </a:p>
           <a:p>
             <a:pPr lvl="2"/>
             <a:r>
-              <a:rPr lang="en-US" smtClean="0"/>
+              <a:rPr lang="en-US"/>
               <a:t>Third level</a:t>
             </a:r>
-            <a:endParaRPr lang="en-US" smtClean="0"/>
           </a:p>
           <a:p>
             <a:pPr lvl="3"/>
             <a:r>
-              <a:rPr lang="en-US" smtClean="0"/>
+              <a:rPr lang="en-US"/>
               <a:t>Fourth level</a:t>
             </a:r>
-            <a:endParaRPr lang="en-US" smtClean="0"/>
           </a:p>
           <a:p>
             <a:pPr lvl="4"/>
             <a:r>
-              <a:rPr lang="en-US" smtClean="0"/>
+              <a:rPr lang="en-US"/>
               <a:t>Fifth level</a:t>
             </a:r>
-            <a:endParaRPr lang="en-US"/>
           </a:p>
         </p:txBody>
       </p:sp>
@@ -2138,10 +2108,9 @@
           <a:p>
             <a:pPr lvl="0"/>
             <a:r>
-              <a:rPr lang="en-US" smtClean="0"/>
+              <a:rPr lang="en-US"/>
               <a:t>Click to edit Master text styles</a:t>
             </a:r>
-            <a:endParaRPr lang="en-US" smtClean="0"/>
           </a:p>
         </p:txBody>
       </p:sp>
@@ -2195,42 +2164,37 @@
           <a:p>
             <a:pPr lvl="0"/>
             <a:r>
-              <a:rPr lang="en-US" smtClean="0"/>
+              <a:rPr lang="en-US"/>
               <a:t>Click to edit Master text styles</a:t>
             </a:r>
-            <a:endParaRPr lang="en-US" smtClean="0"/>
           </a:p>
           <a:p>
             <a:pPr lvl="1"/>
             <a:r>
-              <a:rPr lang="en-US" smtClean="0"/>
+              <a:rPr lang="en-US"/>
               <a:t>Second level</a:t>
             </a:r>
-            <a:endParaRPr lang="en-US" smtClean="0"/>
           </a:p>
           <a:p>
             <a:pPr lvl="2"/>
             <a:r>
-              <a:rPr lang="en-US" smtClean="0"/>
+              <a:rPr lang="en-US"/>
               <a:t>Third level</a:t>
             </a:r>
-            <a:endParaRPr lang="en-US" smtClean="0"/>
           </a:p>
           <a:p>
             <a:pPr lvl="3"/>
             <a:r>
-              <a:rPr lang="en-US" smtClean="0"/>
+              <a:rPr lang="en-US"/>
               <a:t>Fourth level</a:t>
             </a:r>
-            <a:endParaRPr lang="en-US" smtClean="0"/>
           </a:p>
           <a:p>
             <a:pPr lvl="4"/>
             <a:r>
-              <a:rPr lang="en-US" smtClean="0"/>
+              <a:rPr lang="en-US"/>
               <a:t>Fifth level</a:t>
             </a:r>
-            <a:endParaRPr lang="en-US"/>
           </a:p>
         </p:txBody>
       </p:sp>
@@ -2251,6 +2215,7 @@
           <a:p>
             <a:fld id="{1D8BD707-D9CF-40AE-B4C6-C98DA3205C09}" type="datetimeFigureOut">
               <a:rPr lang="en-US" smtClean="0"/>
+              <a:t>1/9/2025</a:t>
             </a:fld>
             <a:endParaRPr lang="en-US"/>
           </a:p>
@@ -2292,6 +2257,7 @@
           <a:p>
             <a:fld id="{B6F15528-21DE-4FAA-801E-634DDDAF4B2B}" type="slidenum">
               <a:rPr lang="en-US" smtClean="0"/>
+              <a:t>‹#›</a:t>
             </a:fld>
             <a:endParaRPr lang="en-US"/>
           </a:p>
@@ -2338,10 +2304,9 @@
           <a:lstStyle/>
           <a:p>
             <a:r>
-              <a:rPr lang="en-US" smtClean="0"/>
+              <a:rPr lang="en-US"/>
               <a:t>Click to edit Master title style</a:t>
             </a:r>
-            <a:endParaRPr lang="en-US"/>
           </a:p>
         </p:txBody>
       </p:sp>
@@ -2362,6 +2327,7 @@
           <a:p>
             <a:fld id="{1D8BD707-D9CF-40AE-B4C6-C98DA3205C09}" type="datetimeFigureOut">
               <a:rPr lang="en-US" smtClean="0"/>
+              <a:t>1/9/2025</a:t>
             </a:fld>
             <a:endParaRPr lang="en-US"/>
           </a:p>
@@ -2403,6 +2369,7 @@
           <a:p>
             <a:fld id="{B6F15528-21DE-4FAA-801E-634DDDAF4B2B}" type="slidenum">
               <a:rPr lang="en-US" smtClean="0"/>
+              <a:t>‹#›</a:t>
             </a:fld>
             <a:endParaRPr lang="en-US"/>
           </a:p>
@@ -2450,6 +2417,7 @@
           <a:p>
             <a:fld id="{1D8BD707-D9CF-40AE-B4C6-C98DA3205C09}" type="datetimeFigureOut">
               <a:rPr lang="en-US" smtClean="0"/>
+              <a:t>1/9/2025</a:t>
             </a:fld>
             <a:endParaRPr lang="en-US"/>
           </a:p>
@@ -2491,6 +2459,7 @@
           <a:p>
             <a:fld id="{B6F15528-21DE-4FAA-801E-634DDDAF4B2B}" type="slidenum">
               <a:rPr lang="en-US" smtClean="0"/>
+              <a:t>‹#›</a:t>
             </a:fld>
             <a:endParaRPr lang="en-US"/>
           </a:p>
@@ -2546,10 +2515,9 @@
           </a:lstStyle>
           <a:p>
             <a:r>
-              <a:rPr lang="en-US" smtClean="0"/>
+              <a:rPr lang="en-US"/>
               <a:t>Click to edit Master title style</a:t>
             </a:r>
-            <a:endParaRPr lang="en-US"/>
           </a:p>
         </p:txBody>
       </p:sp>
@@ -2603,42 +2571,37 @@
           <a:p>
             <a:pPr lvl="0"/>
             <a:r>
-              <a:rPr lang="en-US" smtClean="0"/>
+              <a:rPr lang="en-US"/>
               <a:t>Click to edit Master text styles</a:t>
             </a:r>
-            <a:endParaRPr lang="en-US" smtClean="0"/>
           </a:p>
           <a:p>
             <a:pPr lvl="1"/>
             <a:r>
-              <a:rPr lang="en-US" smtClean="0"/>
+              <a:rPr lang="en-US"/>
               <a:t>Second level</a:t>
             </a:r>
-            <a:endParaRPr lang="en-US" smtClean="0"/>
           </a:p>
           <a:p>
             <a:pPr lvl="2"/>
             <a:r>
-              <a:rPr lang="en-US" smtClean="0"/>
+              <a:rPr lang="en-US"/>
               <a:t>Third level</a:t>
             </a:r>
-            <a:endParaRPr lang="en-US" smtClean="0"/>
           </a:p>
           <a:p>
             <a:pPr lvl="3"/>
             <a:r>
-              <a:rPr lang="en-US" smtClean="0"/>
+              <a:rPr lang="en-US"/>
               <a:t>Fourth level</a:t>
             </a:r>
-            <a:endParaRPr lang="en-US" smtClean="0"/>
           </a:p>
           <a:p>
             <a:pPr lvl="4"/>
             <a:r>
-              <a:rPr lang="en-US" smtClean="0"/>
+              <a:rPr lang="en-US"/>
               <a:t>Fifth level</a:t>
             </a:r>
-            <a:endParaRPr lang="en-US"/>
           </a:p>
         </p:txBody>
       </p:sp>
@@ -2701,10 +2664,9 @@
           <a:p>
             <a:pPr lvl="0"/>
             <a:r>
-              <a:rPr lang="en-US" smtClean="0"/>
+              <a:rPr lang="en-US"/>
               <a:t>Click to edit Master text styles</a:t>
             </a:r>
-            <a:endParaRPr lang="en-US" smtClean="0"/>
           </a:p>
         </p:txBody>
       </p:sp>
@@ -2725,6 +2687,7 @@
           <a:p>
             <a:fld id="{1D8BD707-D9CF-40AE-B4C6-C98DA3205C09}" type="datetimeFigureOut">
               <a:rPr lang="en-US" smtClean="0"/>
+              <a:t>1/9/2025</a:t>
             </a:fld>
             <a:endParaRPr lang="en-US"/>
           </a:p>
@@ -2766,6 +2729,7 @@
           <a:p>
             <a:fld id="{B6F15528-21DE-4FAA-801E-634DDDAF4B2B}" type="slidenum">
               <a:rPr lang="en-US" smtClean="0"/>
+              <a:t>‹#›</a:t>
             </a:fld>
             <a:endParaRPr lang="en-US"/>
           </a:p>
@@ -2821,10 +2785,9 @@
           </a:lstStyle>
           <a:p>
             <a:r>
-              <a:rPr lang="en-US" smtClean="0"/>
+              <a:rPr lang="en-US"/>
               <a:t>Click to edit Master title style</a:t>
             </a:r>
-            <a:endParaRPr lang="en-US"/>
           </a:p>
         </p:txBody>
       </p:sp>
@@ -2948,10 +2911,9 @@
           <a:p>
             <a:pPr lvl="0"/>
             <a:r>
-              <a:rPr lang="en-US" smtClean="0"/>
+              <a:rPr lang="en-US"/>
               <a:t>Click to edit Master text styles</a:t>
             </a:r>
-            <a:endParaRPr lang="en-US" smtClean="0"/>
           </a:p>
         </p:txBody>
       </p:sp>
@@ -2972,6 +2934,7 @@
           <a:p>
             <a:fld id="{1D8BD707-D9CF-40AE-B4C6-C98DA3205C09}" type="datetimeFigureOut">
               <a:rPr lang="en-US" smtClean="0"/>
+              <a:t>1/9/2025</a:t>
             </a:fld>
             <a:endParaRPr lang="en-US"/>
           </a:p>
@@ -3013,6 +2976,7 @@
           <a:p>
             <a:fld id="{B6F15528-21DE-4FAA-801E-634DDDAF4B2B}" type="slidenum">
               <a:rPr lang="en-US" smtClean="0"/>
+              <a:t>‹#›</a:t>
             </a:fld>
             <a:endParaRPr lang="en-US"/>
           </a:p>
@@ -3074,10 +3038,9 @@
           <a:lstStyle/>
           <a:p>
             <a:r>
-              <a:rPr lang="en-US" smtClean="0"/>
+              <a:rPr lang="en-US"/>
               <a:t>Click to edit Master title style</a:t>
             </a:r>
-            <a:endParaRPr lang="en-US"/>
           </a:p>
         </p:txBody>
       </p:sp>
@@ -3108,42 +3071,37 @@
           <a:p>
             <a:pPr lvl="0"/>
             <a:r>
-              <a:rPr lang="en-US" smtClean="0"/>
+              <a:rPr lang="en-US"/>
               <a:t>Click to edit Master text styles</a:t>
             </a:r>
-            <a:endParaRPr lang="en-US" smtClean="0"/>
           </a:p>
           <a:p>
             <a:pPr lvl="1"/>
             <a:r>
-              <a:rPr lang="en-US" smtClean="0"/>
+              <a:rPr lang="en-US"/>
               <a:t>Second level</a:t>
             </a:r>
-            <a:endParaRPr lang="en-US" smtClean="0"/>
           </a:p>
           <a:p>
             <a:pPr lvl="2"/>
             <a:r>
-              <a:rPr lang="en-US" smtClean="0"/>
+              <a:rPr lang="en-US"/>
               <a:t>Third level</a:t>
             </a:r>
-            <a:endParaRPr lang="en-US" smtClean="0"/>
           </a:p>
           <a:p>
             <a:pPr lvl="3"/>
             <a:r>
-              <a:rPr lang="en-US" smtClean="0"/>
+              <a:rPr lang="en-US"/>
               <a:t>Fourth level</a:t>
             </a:r>
-            <a:endParaRPr lang="en-US" smtClean="0"/>
           </a:p>
           <a:p>
             <a:pPr lvl="4"/>
             <a:r>
-              <a:rPr lang="en-US" smtClean="0"/>
+              <a:rPr lang="en-US"/>
               <a:t>Fifth level</a:t>
             </a:r>
-            <a:endParaRPr lang="en-US"/>
           </a:p>
         </p:txBody>
       </p:sp>
@@ -3182,6 +3140,7 @@
           <a:p>
             <a:fld id="{1D8BD707-D9CF-40AE-B4C6-C98DA3205C09}" type="datetimeFigureOut">
               <a:rPr lang="en-US" smtClean="0"/>
+              <a:t>1/9/2025</a:t>
             </a:fld>
             <a:endParaRPr lang="en-US"/>
           </a:p>
@@ -3259,6 +3218,7 @@
           <a:p>
             <a:fld id="{B6F15528-21DE-4FAA-801E-634DDDAF4B2B}" type="slidenum">
               <a:rPr lang="en-US" smtClean="0"/>
+              <a:t>‹#›</a:t>
             </a:fld>
             <a:endParaRPr lang="en-US"/>
           </a:p>
@@ -3589,7 +3549,7 @@
             </a:pathLst>
           </a:custGeom>
           <a:blipFill>
-            <a:blip r:embed="rId1"/>
+            <a:blip r:embed="rId2"/>
             <a:stretch>
               <a:fillRect l="-2204" r="-2204"/>
             </a:stretch>
@@ -3635,10 +3595,10 @@
             </a:pathLst>
           </a:custGeom>
           <a:blipFill>
-            <a:blip r:embed="rId2">
+            <a:blip r:embed="rId3">
               <a:extLst>
                 <a:ext uri="{96DAC541-7B7A-43D3-8B79-37D633B846F1}">
-                  <asvg:svgBlip xmlns:asvg="http://schemas.microsoft.com/office/drawing/2016/SVG/main" r:embed="rId3"/>
+                  <asvg:svgBlip xmlns:asvg="http://schemas.microsoft.com/office/drawing/2016/SVG/main" r:embed="rId4"/>
                 </a:ext>
               </a:extLst>
             </a:blip>
@@ -3687,10 +3647,10 @@
             </a:pathLst>
           </a:custGeom>
           <a:blipFill>
-            <a:blip r:embed="rId4">
+            <a:blip r:embed="rId5">
               <a:extLst>
                 <a:ext uri="{96DAC541-7B7A-43D3-8B79-37D633B846F1}">
-                  <asvg:svgBlip xmlns:asvg="http://schemas.microsoft.com/office/drawing/2016/SVG/main" r:embed="rId5"/>
+                  <asvg:svgBlip xmlns:asvg="http://schemas.microsoft.com/office/drawing/2016/SVG/main" r:embed="rId6"/>
                 </a:ext>
               </a:extLst>
             </a:blip>
@@ -3708,7 +3668,7 @@
         </p:nvSpPr>
         <p:spPr>
           <a:xfrm flipH="1">
-            <a:off x="2163248" y="2221779"/>
+            <a:off x="2514600" y="2602779"/>
             <a:ext cx="0" cy="5843443"/>
           </a:xfrm>
           <a:prstGeom prst="line">
@@ -3763,7 +3723,7 @@
             </a:pathLst>
           </a:custGeom>
           <a:blipFill>
-            <a:blip r:embed="rId6"/>
+            <a:blip r:embed="rId7"/>
             <a:stretch>
               <a:fillRect/>
             </a:stretch>
@@ -3778,8 +3738,90 @@
         </p:nvSpPr>
         <p:spPr>
           <a:xfrm>
-            <a:off x="2417593" y="3812384"/>
-            <a:ext cx="15404202" cy="1813708"/>
+            <a:off x="2705101" y="3051798"/>
+            <a:ext cx="12877798" cy="3005246"/>
+          </a:xfrm>
+          <a:prstGeom prst="rect">
+            <a:avLst/>
+          </a:prstGeom>
+        </p:spPr>
+        <p:txBody>
+          <a:bodyPr wrap="square" lIns="0" tIns="0" rIns="0" bIns="0" rtlCol="0" anchor="t">
+            <a:spAutoFit/>
+          </a:bodyPr>
+          <a:lstStyle/>
+          <a:p>
+            <a:pPr algn="ctr">
+              <a:lnSpc>
+                <a:spcPct val="150000"/>
+              </a:lnSpc>
+            </a:pPr>
+            <a:r>
+              <a:rPr lang="vi-VN" sz="4500" b="1" i="1" dirty="0">
+                <a:solidFill>
+                  <a:schemeClr val="tx2"/>
+                </a:solidFill>
+                <a:effectLst/>
+                <a:latin typeface="+mj-lt"/>
+              </a:rPr>
+              <a:t>TÌM HIỂU GIẢI PHÁP THU THẬP DỮ LIỆU</a:t>
+            </a:r>
+          </a:p>
+          <a:p>
+            <a:pPr algn="ctr">
+              <a:lnSpc>
+                <a:spcPct val="150000"/>
+              </a:lnSpc>
+            </a:pPr>
+            <a:r>
+              <a:rPr lang="vi-VN" sz="4500" b="1" i="1" dirty="0">
+                <a:solidFill>
+                  <a:schemeClr val="tx2"/>
+                </a:solidFill>
+                <a:effectLst/>
+                <a:latin typeface="+mj-lt"/>
+              </a:rPr>
+              <a:t> THÔNG QUA  API CỦA CÁC NỀN TẢNG </a:t>
+            </a:r>
+          </a:p>
+          <a:p>
+            <a:pPr algn="ctr">
+              <a:lnSpc>
+                <a:spcPct val="150000"/>
+              </a:lnSpc>
+            </a:pPr>
+            <a:r>
+              <a:rPr lang="vi-VN" sz="4500" b="1" i="1" dirty="0">
+                <a:solidFill>
+                  <a:schemeClr val="tx2"/>
+                </a:solidFill>
+                <a:effectLst/>
+                <a:latin typeface="+mj-lt"/>
+              </a:rPr>
+              <a:t>THƯƠNG MẠI ĐIỆN TỬ</a:t>
+            </a:r>
+            <a:endParaRPr lang="en-US" sz="4500" b="1" i="1" dirty="0">
+              <a:solidFill>
+                <a:schemeClr val="tx2"/>
+              </a:solidFill>
+              <a:latin typeface="+mj-lt"/>
+              <a:ea typeface="Cormorant Garamond Bold Italics" panose="00000800000000000000"/>
+              <a:cs typeface="Cormorant Garamond Bold Italics" panose="00000800000000000000"/>
+              <a:sym typeface="Cormorant Garamond Bold Italics" panose="00000800000000000000"/>
+            </a:endParaRPr>
+          </a:p>
+        </p:txBody>
+      </p:sp>
+      <p:sp>
+        <p:nvSpPr>
+          <p:cNvPr id="8" name="TextBox 8"/>
+          <p:cNvSpPr txBox="1"/>
+          <p:nvPr/>
+        </p:nvSpPr>
+        <p:spPr>
+          <a:xfrm>
+            <a:off x="2895600" y="6341757"/>
+            <a:ext cx="10368096" cy="1307465"/>
           </a:xfrm>
           <a:prstGeom prst="rect">
             <a:avLst/>
@@ -3793,71 +3835,238 @@
           <a:p>
             <a:pPr algn="l">
               <a:lnSpc>
-                <a:spcPts val="7350"/>
+                <a:spcPts val="5100"/>
               </a:lnSpc>
             </a:pPr>
             <a:r>
-              <a:rPr lang="en-US" sz="4900" b="1" i="1">
+              <a:rPr lang="en-US" sz="3400" spc="13" dirty="0">
                 <a:solidFill>
                   <a:srgbClr val="2D3880"/>
                 </a:solidFill>
-                <a:latin typeface="Cormorant Garamond Bold Italics" panose="00000800000000000000"/>
-                <a:ea typeface="Cormorant Garamond Bold Italics" panose="00000800000000000000"/>
-                <a:cs typeface="Cormorant Garamond Bold Italics" panose="00000800000000000000"/>
-                <a:sym typeface="Cormorant Garamond Bold Italics" panose="00000800000000000000"/>
-              </a:rPr>
-              <a:t>TIỂM HIỂU GIẢI PHÁP THU TẬP DỮ LIỆU THÔNG QUA API</a:t>
-            </a:r>
-            <a:endParaRPr lang="en-US" sz="4900" b="1" i="1">
+                <a:latin typeface="Times New Roman" panose="02020603050405020304" charset="0"/>
+                <a:ea typeface="Times New Roman Condensed" panose="02030506070405020303"/>
+                <a:cs typeface="Times New Roman" panose="02020603050405020304" charset="0"/>
+                <a:sym typeface="Times New Roman Condensed" panose="02030506070405020303"/>
+              </a:rPr>
+              <a:t>GVHD: </a:t>
+            </a:r>
+            <a:r>
+              <a:rPr lang="en-US" sz="3400" spc="13" dirty="0" err="1">
+                <a:solidFill>
+                  <a:srgbClr val="2D3880"/>
+                </a:solidFill>
+                <a:latin typeface="Times New Roman" panose="02020603050405020304" charset="0"/>
+                <a:ea typeface="Times New Roman Condensed" panose="02030506070405020303"/>
+                <a:cs typeface="Times New Roman" panose="02020603050405020304" charset="0"/>
+                <a:sym typeface="Times New Roman Condensed" panose="02030506070405020303"/>
+              </a:rPr>
+              <a:t>Nguyễn</a:t>
+            </a:r>
+            <a:r>
+              <a:rPr lang="en-US" sz="3400" spc="13" dirty="0">
+                <a:solidFill>
+                  <a:srgbClr val="2D3880"/>
+                </a:solidFill>
+                <a:latin typeface="Times New Roman" panose="02020603050405020304" charset="0"/>
+                <a:ea typeface="Times New Roman Condensed" panose="02030506070405020303"/>
+                <a:cs typeface="Times New Roman" panose="02020603050405020304" charset="0"/>
+                <a:sym typeface="Times New Roman Condensed" panose="02030506070405020303"/>
+              </a:rPr>
+              <a:t> </a:t>
+            </a:r>
+            <a:r>
+              <a:rPr lang="en-US" sz="3400" spc="13" dirty="0" err="1">
+                <a:solidFill>
+                  <a:srgbClr val="2D3880"/>
+                </a:solidFill>
+                <a:latin typeface="Times New Roman" panose="02020603050405020304" charset="0"/>
+                <a:ea typeface="Times New Roman Condensed" panose="02030506070405020303"/>
+                <a:cs typeface="Times New Roman" panose="02020603050405020304" charset="0"/>
+                <a:sym typeface="Times New Roman Condensed" panose="02030506070405020303"/>
+              </a:rPr>
+              <a:t>Khắc</a:t>
+            </a:r>
+            <a:r>
+              <a:rPr lang="en-US" sz="3400" spc="13" dirty="0">
+                <a:solidFill>
+                  <a:srgbClr val="2D3880"/>
+                </a:solidFill>
+                <a:latin typeface="Times New Roman" panose="02020603050405020304" charset="0"/>
+                <a:ea typeface="Times New Roman Condensed" panose="02030506070405020303"/>
+                <a:cs typeface="Times New Roman" panose="02020603050405020304" charset="0"/>
+                <a:sym typeface="Times New Roman Condensed" panose="02030506070405020303"/>
+              </a:rPr>
+              <a:t> </a:t>
+            </a:r>
+            <a:r>
+              <a:rPr lang="en-US" sz="3400" spc="13" dirty="0" err="1">
+                <a:solidFill>
+                  <a:srgbClr val="2D3880"/>
+                </a:solidFill>
+                <a:latin typeface="Times New Roman" panose="02020603050405020304" charset="0"/>
+                <a:ea typeface="Times New Roman Condensed" panose="02030506070405020303"/>
+                <a:cs typeface="Times New Roman" panose="02020603050405020304" charset="0"/>
+                <a:sym typeface="Times New Roman Condensed" panose="02030506070405020303"/>
+              </a:rPr>
+              <a:t>Quốc</a:t>
+            </a:r>
+            <a:endParaRPr lang="en-US" sz="3400" spc="13" dirty="0">
               <a:solidFill>
                 <a:srgbClr val="2D3880"/>
               </a:solidFill>
-              <a:latin typeface="Cormorant Garamond Bold Italics" panose="00000800000000000000"/>
-              <a:ea typeface="Cormorant Garamond Bold Italics" panose="00000800000000000000"/>
-              <a:cs typeface="Cormorant Garamond Bold Italics" panose="00000800000000000000"/>
-              <a:sym typeface="Cormorant Garamond Bold Italics" panose="00000800000000000000"/>
+              <a:latin typeface="Times New Roman" panose="02020603050405020304" charset="0"/>
+              <a:ea typeface="Times New Roman Condensed" panose="02030506070405020303"/>
+              <a:cs typeface="Times New Roman" panose="02020603050405020304" charset="0"/>
+              <a:sym typeface="Times New Roman Condensed" panose="02030506070405020303"/>
             </a:endParaRPr>
           </a:p>
           <a:p>
             <a:pPr marL="0" lvl="0" indent="0" algn="l">
               <a:lnSpc>
-                <a:spcPts val="7350"/>
+                <a:spcPts val="5100"/>
               </a:lnSpc>
             </a:pPr>
             <a:r>
-              <a:rPr lang="en-US" sz="4900" b="1" i="1">
+              <a:rPr lang="en-US" sz="3400" spc="13" dirty="0">
                 <a:solidFill>
                   <a:srgbClr val="2D3880"/>
                 </a:solidFill>
-                <a:latin typeface="Cormorant Garamond Bold Italics" panose="00000800000000000000"/>
-                <a:ea typeface="Cormorant Garamond Bold Italics" panose="00000800000000000000"/>
-                <a:cs typeface="Cormorant Garamond Bold Italics" panose="00000800000000000000"/>
-                <a:sym typeface="Cormorant Garamond Bold Italics" panose="00000800000000000000"/>
-              </a:rPr>
-              <a:t>TỪ CÁC NỀN TẢNG THƯƠNG MẠI ĐIỆN TỬ</a:t>
-            </a:r>
-            <a:endParaRPr lang="en-US" sz="4900" b="1" i="1">
-              <a:solidFill>
-                <a:srgbClr val="2D3880"/>
-              </a:solidFill>
-              <a:latin typeface="Cormorant Garamond Bold Italics" panose="00000800000000000000"/>
-              <a:ea typeface="Cormorant Garamond Bold Italics" panose="00000800000000000000"/>
-              <a:cs typeface="Cormorant Garamond Bold Italics" panose="00000800000000000000"/>
-              <a:sym typeface="Cormorant Garamond Bold Italics" panose="00000800000000000000"/>
-            </a:endParaRPr>
+                <a:latin typeface="Times New Roman" panose="02020603050405020304" charset="0"/>
+                <a:ea typeface="Times New Roman Condensed" panose="02030506070405020303"/>
+                <a:cs typeface="Times New Roman" panose="02020603050405020304" charset="0"/>
+                <a:sym typeface="Times New Roman Condensed" panose="02030506070405020303"/>
+              </a:rPr>
+              <a:t>SVTH: </a:t>
+            </a:r>
+            <a:r>
+              <a:rPr lang="en-US" sz="3400" spc="13" dirty="0" err="1">
+                <a:solidFill>
+                  <a:srgbClr val="2D3880"/>
+                </a:solidFill>
+                <a:latin typeface="Times New Roman" panose="02020603050405020304" charset="0"/>
+                <a:ea typeface="Times New Roman Condensed" panose="02030506070405020303"/>
+                <a:cs typeface="Times New Roman" panose="02020603050405020304" charset="0"/>
+                <a:sym typeface="Times New Roman Condensed" panose="02030506070405020303"/>
+              </a:rPr>
+              <a:t>Nguyễn</a:t>
+            </a:r>
+            <a:r>
+              <a:rPr lang="en-US" sz="3400" spc="13" dirty="0">
+                <a:solidFill>
+                  <a:srgbClr val="2D3880"/>
+                </a:solidFill>
+                <a:latin typeface="Times New Roman" panose="02020603050405020304" charset="0"/>
+                <a:ea typeface="Times New Roman Condensed" panose="02030506070405020303"/>
+                <a:cs typeface="Times New Roman" panose="02020603050405020304" charset="0"/>
+                <a:sym typeface="Times New Roman Condensed" panose="02030506070405020303"/>
+              </a:rPr>
+              <a:t> </a:t>
+            </a:r>
+            <a:r>
+              <a:rPr lang="en-US" sz="3400" spc="13" dirty="0" err="1">
+                <a:solidFill>
+                  <a:srgbClr val="2D3880"/>
+                </a:solidFill>
+                <a:latin typeface="Times New Roman" panose="02020603050405020304" charset="0"/>
+                <a:ea typeface="Times New Roman Condensed" panose="02030506070405020303"/>
+                <a:cs typeface="Times New Roman" panose="02020603050405020304" charset="0"/>
+                <a:sym typeface="Times New Roman Condensed" panose="02030506070405020303"/>
+              </a:rPr>
+              <a:t>Tấn</a:t>
+            </a:r>
+            <a:r>
+              <a:rPr lang="en-US" sz="3400" spc="13" dirty="0">
+                <a:solidFill>
+                  <a:srgbClr val="2D3880"/>
+                </a:solidFill>
+                <a:latin typeface="Times New Roman" panose="02020603050405020304" charset="0"/>
+                <a:ea typeface="Times New Roman Condensed" panose="02030506070405020303"/>
+                <a:cs typeface="Times New Roman" panose="02020603050405020304" charset="0"/>
+                <a:sym typeface="Times New Roman Condensed" panose="02030506070405020303"/>
+              </a:rPr>
+              <a:t> </a:t>
+            </a:r>
+            <a:r>
+              <a:rPr lang="en-US" sz="3400" spc="13" dirty="0" err="1">
+                <a:solidFill>
+                  <a:srgbClr val="2D3880"/>
+                </a:solidFill>
+                <a:latin typeface="Times New Roman" panose="02020603050405020304" charset="0"/>
+                <a:ea typeface="Times New Roman Condensed" panose="02030506070405020303"/>
+                <a:cs typeface="Times New Roman" panose="02020603050405020304" charset="0"/>
+                <a:sym typeface="Times New Roman Condensed" panose="02030506070405020303"/>
+              </a:rPr>
+              <a:t>Lộc</a:t>
+            </a:r>
+            <a:r>
+              <a:rPr lang="en-US" sz="3400" spc="13" dirty="0">
+                <a:solidFill>
+                  <a:srgbClr val="2D3880"/>
+                </a:solidFill>
+                <a:latin typeface="Times New Roman" panose="02020603050405020304" charset="0"/>
+                <a:ea typeface="Times New Roman Condensed" panose="02030506070405020303"/>
+                <a:cs typeface="Times New Roman" panose="02020603050405020304" charset="0"/>
+                <a:sym typeface="Times New Roman Condensed" panose="02030506070405020303"/>
+              </a:rPr>
+              <a:t> - 110121189</a:t>
+            </a:r>
           </a:p>
         </p:txBody>
       </p:sp>
       <p:sp>
         <p:nvSpPr>
-          <p:cNvPr id="8" name="TextBox 8"/>
+          <p:cNvPr id="9" name="TextBox 9"/>
           <p:cNvSpPr txBox="1"/>
           <p:nvPr/>
         </p:nvSpPr>
         <p:spPr>
           <a:xfrm>
-            <a:off x="2417593" y="5960757"/>
-            <a:ext cx="10368096" cy="1307465"/>
+            <a:off x="4359910" y="1866900"/>
+            <a:ext cx="9568815" cy="681990"/>
+          </a:xfrm>
+          <a:prstGeom prst="rect">
+            <a:avLst/>
+          </a:prstGeom>
+        </p:spPr>
+        <p:txBody>
+          <a:bodyPr wrap="square" lIns="0" tIns="0" rIns="0" bIns="0" rtlCol="0" anchor="t">
+            <a:spAutoFit/>
+          </a:bodyPr>
+          <a:lstStyle/>
+          <a:p>
+            <a:pPr marL="0" lvl="0" indent="0" algn="ctr">
+              <a:lnSpc>
+                <a:spcPts val="5320"/>
+              </a:lnSpc>
+              <a:spcBef>
+                <a:spcPct val="0"/>
+              </a:spcBef>
+            </a:pPr>
+            <a:r>
+              <a:rPr lang="en-US" sz="3800" b="1" dirty="0">
+                <a:solidFill>
+                  <a:srgbClr val="2D3880"/>
+                </a:solidFill>
+                <a:latin typeface="Times New Roman" panose="02020603050405020304" charset="0"/>
+                <a:ea typeface="Glacial Indifference Bold" panose="00000800000000000000"/>
+                <a:cs typeface="Times New Roman" panose="02020603050405020304" charset="0"/>
+                <a:sym typeface="Glacial Indifference Bold" panose="00000800000000000000"/>
+              </a:rPr>
+              <a:t>THỰC TẬP ĐỒ ÁN CHUYÊN NGÀNH</a:t>
+            </a:r>
+          </a:p>
+        </p:txBody>
+      </p:sp>
+      <p:sp>
+        <p:nvSpPr>
+          <p:cNvPr id="10" name="TextBox 10"/>
+          <p:cNvSpPr txBox="1"/>
+          <p:nvPr/>
+        </p:nvSpPr>
+        <p:spPr>
+          <a:xfrm>
+            <a:off x="2895600" y="7908376"/>
+            <a:ext cx="10368096" cy="574040"/>
           </a:xfrm>
           <a:prstGeom prst="rect">
             <a:avLst/>
@@ -3869,137 +4078,6 @@
           </a:bodyPr>
           <a:lstStyle/>
           <a:p>
-            <a:pPr algn="l">
-              <a:lnSpc>
-                <a:spcPts val="5100"/>
-              </a:lnSpc>
-            </a:pPr>
-            <a:r>
-              <a:rPr lang="en-US" sz="3400" spc="13">
-                <a:solidFill>
-                  <a:srgbClr val="2D3880"/>
-                </a:solidFill>
-                <a:latin typeface="Times New Roman" panose="02020603050405020304" charset="0"/>
-                <a:ea typeface="Times New Roman Condensed" panose="02030506070405020303"/>
-                <a:cs typeface="Times New Roman" panose="02020603050405020304" charset="0"/>
-                <a:sym typeface="Times New Roman Condensed" panose="02030506070405020303"/>
-              </a:rPr>
-              <a:t>GVHD: Nguyễn Khắc Quốc</a:t>
-            </a:r>
-            <a:endParaRPr lang="en-US" sz="3400" spc="13">
-              <a:solidFill>
-                <a:srgbClr val="2D3880"/>
-              </a:solidFill>
-              <a:latin typeface="Times New Roman" panose="02020603050405020304" charset="0"/>
-              <a:ea typeface="Times New Roman Condensed" panose="02030506070405020303"/>
-              <a:cs typeface="Times New Roman" panose="02020603050405020304" charset="0"/>
-              <a:sym typeface="Times New Roman Condensed" panose="02030506070405020303"/>
-            </a:endParaRPr>
-          </a:p>
-          <a:p>
-            <a:pPr marL="0" lvl="0" indent="0" algn="l">
-              <a:lnSpc>
-                <a:spcPts val="5100"/>
-              </a:lnSpc>
-            </a:pPr>
-            <a:r>
-              <a:rPr lang="en-US" sz="3400" spc="13">
-                <a:solidFill>
-                  <a:srgbClr val="2D3880"/>
-                </a:solidFill>
-                <a:latin typeface="Times New Roman" panose="02020603050405020304" charset="0"/>
-                <a:ea typeface="Times New Roman Condensed" panose="02030506070405020303"/>
-                <a:cs typeface="Times New Roman" panose="02020603050405020304" charset="0"/>
-                <a:sym typeface="Times New Roman Condensed" panose="02030506070405020303"/>
-              </a:rPr>
-              <a:t>SVTH: Nguyễn Tấn Lộc - 110121189</a:t>
-            </a:r>
-            <a:endParaRPr lang="en-US" sz="3400" spc="13">
-              <a:solidFill>
-                <a:srgbClr val="2D3880"/>
-              </a:solidFill>
-              <a:latin typeface="Times New Roman" panose="02020603050405020304" charset="0"/>
-              <a:ea typeface="Times New Roman Condensed" panose="02030506070405020303"/>
-              <a:cs typeface="Times New Roman" panose="02020603050405020304" charset="0"/>
-              <a:sym typeface="Times New Roman Condensed" panose="02030506070405020303"/>
-            </a:endParaRPr>
-          </a:p>
-        </p:txBody>
-      </p:sp>
-      <p:sp>
-        <p:nvSpPr>
-          <p:cNvPr id="9" name="TextBox 9"/>
-          <p:cNvSpPr txBox="1"/>
-          <p:nvPr/>
-        </p:nvSpPr>
-        <p:spPr>
-          <a:xfrm>
-            <a:off x="4359910" y="2400300"/>
-            <a:ext cx="9568815" cy="681990"/>
-          </a:xfrm>
-          <a:prstGeom prst="rect">
-            <a:avLst/>
-          </a:prstGeom>
-        </p:spPr>
-        <p:txBody>
-          <a:bodyPr wrap="square" lIns="0" tIns="0" rIns="0" bIns="0" rtlCol="0" anchor="t">
-            <a:spAutoFit/>
-          </a:bodyPr>
-          <a:lstStyle/>
-          <a:p>
-            <a:pPr marL="0" lvl="0" indent="0" algn="ctr">
-              <a:lnSpc>
-                <a:spcPts val="5320"/>
-              </a:lnSpc>
-              <a:spcBef>
-                <a:spcPct val="0"/>
-              </a:spcBef>
-            </a:pPr>
-            <a:r>
-              <a:rPr lang="en-US" sz="3800" b="1">
-                <a:solidFill>
-                  <a:srgbClr val="2D3880"/>
-                </a:solidFill>
-                <a:latin typeface="Times New Roman" panose="02020603050405020304" charset="0"/>
-                <a:ea typeface="Glacial Indifference Bold" panose="00000800000000000000"/>
-                <a:cs typeface="Times New Roman" panose="02020603050405020304" charset="0"/>
-                <a:sym typeface="Glacial Indifference Bold" panose="00000800000000000000"/>
-              </a:rPr>
-              <a:t>THỰC TẬP ĐỒ ÁN CHUYÊN NGÀNH</a:t>
-            </a:r>
-            <a:endParaRPr lang="en-US" sz="3800" b="1">
-              <a:solidFill>
-                <a:srgbClr val="2D3880"/>
-              </a:solidFill>
-              <a:latin typeface="Times New Roman" panose="02020603050405020304" charset="0"/>
-              <a:ea typeface="Glacial Indifference Bold" panose="00000800000000000000"/>
-              <a:cs typeface="Times New Roman" panose="02020603050405020304" charset="0"/>
-              <a:sym typeface="Glacial Indifference Bold" panose="00000800000000000000"/>
-            </a:endParaRPr>
-          </a:p>
-        </p:txBody>
-      </p:sp>
-      <p:sp>
-        <p:nvSpPr>
-          <p:cNvPr id="10" name="TextBox 10"/>
-          <p:cNvSpPr txBox="1"/>
-          <p:nvPr/>
-        </p:nvSpPr>
-        <p:spPr>
-          <a:xfrm>
-            <a:off x="2417593" y="7527376"/>
-            <a:ext cx="10368096" cy="574040"/>
-          </a:xfrm>
-          <a:prstGeom prst="rect">
-            <a:avLst/>
-          </a:prstGeom>
-        </p:spPr>
-        <p:txBody>
-          <a:bodyPr lIns="0" tIns="0" rIns="0" bIns="0" rtlCol="0" anchor="t">
-            <a:spAutoFit/>
-          </a:bodyPr>
-          <a:lstStyle/>
-          <a:p>
             <a:pPr marL="0" lvl="0" indent="0" algn="l">
               <a:lnSpc>
                 <a:spcPts val="4480"/>
@@ -4020,15 +4098,6 @@
               </a:rPr>
               <a:t>DA21TTB</a:t>
             </a:r>
-            <a:endParaRPr lang="en-US" sz="3200">
-              <a:solidFill>
-                <a:srgbClr val="2D3880"/>
-              </a:solidFill>
-              <a:latin typeface="Times New Roman" panose="02020603050405020304" charset="0"/>
-              <a:ea typeface="Glacial Indifference"/>
-              <a:cs typeface="Times New Roman" panose="02020603050405020304" charset="0"/>
-              <a:sym typeface="Glacial Indifference"/>
-            </a:endParaRPr>
           </a:p>
         </p:txBody>
       </p:sp>
@@ -4037,13 +4106,13 @@
   <p:clrMapOvr>
     <a:masterClrMapping/>
   </p:clrMapOvr>
-  <mc:AlternateContent xmlns:mc="http://schemas.openxmlformats.org/markup-compatibility/2006">
-    <mc:Choice xmlns:p14="http://schemas.microsoft.com/office/powerpoint/2010/main" Requires="p14">
-      <p:transition spd="slow" p14:dur="1000">
+  <mc:AlternateContent xmlns:mc="http://schemas.openxmlformats.org/markup-compatibility/2006" xmlns:p14="http://schemas.microsoft.com/office/powerpoint/2010/main">
+    <mc:Choice Requires="p14">
+      <p:transition spd="slow">
         <p:wedge/>
       </p:transition>
     </mc:Choice>
-    <mc:Fallback>
+    <mc:Fallback xmlns="">
       <p:transition spd="slow">
         <p:wedge/>
       </p:transition>
@@ -4076,7 +4145,7 @@
           <p:nvPr/>
         </p:nvGrpSpPr>
         <p:grpSpPr>
-          <a:xfrm rot="0">
+          <a:xfrm>
             <a:off x="1028700" y="2122170"/>
             <a:ext cx="8115300" cy="3233058"/>
             <a:chOff x="0" y="0"/>
@@ -4147,6 +4216,7 @@
                   <a:spcPts val="3360"/>
                 </a:lnSpc>
               </a:pPr>
+              <a:endParaRPr/>
             </a:p>
           </p:txBody>
         </p:sp>
@@ -4158,7 +4228,7 @@
           <p:nvPr/>
         </p:nvGrpSpPr>
         <p:grpSpPr>
-          <a:xfrm rot="0">
+          <a:xfrm>
             <a:off x="9144000" y="2122170"/>
             <a:ext cx="8115300" cy="3233058"/>
             <a:chOff x="0" y="0"/>
@@ -4229,6 +4299,7 @@
                   <a:spcPts val="3360"/>
                 </a:lnSpc>
               </a:pPr>
+              <a:endParaRPr/>
             </a:p>
           </p:txBody>
         </p:sp>
@@ -4240,7 +4311,7 @@
           <p:nvPr/>
         </p:nvGrpSpPr>
         <p:grpSpPr>
-          <a:xfrm rot="0">
+          <a:xfrm>
             <a:off x="9144000" y="6031503"/>
             <a:ext cx="8115300" cy="3226797"/>
             <a:chOff x="0" y="0"/>
@@ -4311,6 +4382,7 @@
                   <a:spcPts val="3360"/>
                 </a:lnSpc>
               </a:pPr>
+              <a:endParaRPr/>
             </a:p>
           </p:txBody>
         </p:sp>
@@ -4322,7 +4394,7 @@
           <p:nvPr/>
         </p:nvGrpSpPr>
         <p:grpSpPr>
-          <a:xfrm rot="0">
+          <a:xfrm>
             <a:off x="1028700" y="6025242"/>
             <a:ext cx="8115300" cy="3233058"/>
             <a:chOff x="0" y="0"/>
@@ -4393,6 +4465,7 @@
                   <a:spcPts val="3360"/>
                 </a:lnSpc>
               </a:pPr>
+              <a:endParaRPr/>
             </a:p>
           </p:txBody>
         </p:sp>
@@ -4436,29 +4509,8 @@
                 <a:cs typeface="Times New Roman" panose="02020603050405020304" charset="0"/>
                 <a:sym typeface="Cormorant Garamond Bold" panose="00000800000000000000"/>
               </a:rPr>
-              <a:t>Các giải pháp nghiên </a:t>
-            </a:r>
-            <a:r>
-              <a:rPr lang="vi-VN" altLang="en-US" sz="7200" b="1">
-                <a:solidFill>
-                  <a:srgbClr val="2D3880"/>
-                </a:solidFill>
-                <a:latin typeface="Times New Roman" panose="02020603050405020304" charset="0"/>
-                <a:ea typeface="Cormorant Garamond Bold" panose="00000800000000000000"/>
-                <a:cs typeface="Times New Roman" panose="02020603050405020304" charset="0"/>
-                <a:sym typeface="Cormorant Garamond Bold" panose="00000800000000000000"/>
-              </a:rPr>
-              <a:t>cứu</a:t>
-            </a:r>
-            <a:endParaRPr lang="vi-VN" altLang="en-US" sz="7200" b="1">
-              <a:solidFill>
-                <a:srgbClr val="2D3880"/>
-              </a:solidFill>
-              <a:latin typeface="Times New Roman" panose="02020603050405020304" charset="0"/>
-              <a:ea typeface="Cormorant Garamond Bold" panose="00000800000000000000"/>
-              <a:cs typeface="Times New Roman" panose="02020603050405020304" charset="0"/>
-              <a:sym typeface="Cormorant Garamond Bold" panose="00000800000000000000"/>
-            </a:endParaRPr>
+              <a:t>Các giải pháp nghiên cứu</a:t>
+            </a:r>
           </a:p>
         </p:txBody>
       </p:sp>
@@ -4503,15 +4555,6 @@
               </a:rPr>
               <a:t>Giải pháp thu thấp dữ liệu thông qua API bằng Python</a:t>
             </a:r>
-            <a:endParaRPr lang="vi-VN" altLang="en-US" sz="3600" b="1">
-              <a:solidFill>
-                <a:srgbClr val="2D3880"/>
-              </a:solidFill>
-              <a:latin typeface="Times New Roman" panose="02020603050405020304" charset="0"/>
-              <a:ea typeface="Glacial Indifference Bold" panose="00000800000000000000"/>
-              <a:cs typeface="Times New Roman" panose="02020603050405020304" charset="0"/>
-              <a:sym typeface="Glacial Indifference Bold" panose="00000800000000000000"/>
-            </a:endParaRPr>
           </a:p>
         </p:txBody>
       </p:sp>
@@ -4554,29 +4597,8 @@
                 <a:cs typeface="Times New Roman" panose="02020603050405020304" charset="0"/>
                 <a:sym typeface="Glacial Indifference Bold" panose="00000800000000000000"/>
               </a:rPr>
-              <a:t>Giải pháp thu thập dữ liệu thông qua API </a:t>
-            </a:r>
-            <a:r>
-              <a:rPr lang="vi-VN" altLang="en-US" sz="3600" b="1">
-                <a:solidFill>
-                  <a:srgbClr val="2D3880"/>
-                </a:solidFill>
-                <a:latin typeface="Times New Roman" panose="02020603050405020304" charset="0"/>
-                <a:ea typeface="Glacial Indifference Bold" panose="00000800000000000000"/>
-                <a:cs typeface="Times New Roman" panose="02020603050405020304" charset="0"/>
-                <a:sym typeface="Glacial Indifference Bold" panose="00000800000000000000"/>
-              </a:rPr>
-              <a:t>qua việc </a:t>
-            </a:r>
-            <a:endParaRPr lang="vi-VN" altLang="en-US" sz="3600" b="1">
-              <a:solidFill>
-                <a:srgbClr val="2D3880"/>
-              </a:solidFill>
-              <a:latin typeface="Times New Roman" panose="02020603050405020304" charset="0"/>
-              <a:ea typeface="Glacial Indifference Bold" panose="00000800000000000000"/>
-              <a:cs typeface="Times New Roman" panose="02020603050405020304" charset="0"/>
-              <a:sym typeface="Glacial Indifference Bold" panose="00000800000000000000"/>
-            </a:endParaRPr>
+              <a:t>Giải pháp thu thập dữ liệu thông qua API qua việc </a:t>
+            </a:r>
           </a:p>
           <a:p>
             <a:pPr marL="0" lvl="0" indent="0" algn="ctr">
@@ -4599,15 +4621,6 @@
               </a:rPr>
               <a:t>bán hàng</a:t>
             </a:r>
-            <a:endParaRPr lang="vi-VN" altLang="en-US" sz="3600" b="1">
-              <a:solidFill>
-                <a:srgbClr val="2D3880"/>
-              </a:solidFill>
-              <a:latin typeface="Times New Roman" panose="02020603050405020304" charset="0"/>
-              <a:ea typeface="Glacial Indifference Bold" panose="00000800000000000000"/>
-              <a:cs typeface="Times New Roman" panose="02020603050405020304" charset="0"/>
-              <a:sym typeface="Glacial Indifference Bold" panose="00000800000000000000"/>
-            </a:endParaRPr>
           </a:p>
         </p:txBody>
       </p:sp>
@@ -4652,15 +4665,6 @@
               </a:rPr>
               <a:t>Giải pháp thu thập dữ liệu thông qua API bằng phần mềm quản lý đám mây</a:t>
             </a:r>
-            <a:endParaRPr lang="vi-VN" altLang="en-US" sz="3600" b="1">
-              <a:solidFill>
-                <a:srgbClr val="2D3880"/>
-              </a:solidFill>
-              <a:latin typeface="Times New Roman" panose="02020603050405020304" charset="0"/>
-              <a:ea typeface="Glacial Indifference Bold" panose="00000800000000000000"/>
-              <a:cs typeface="Times New Roman" panose="02020603050405020304" charset="0"/>
-              <a:sym typeface="Glacial Indifference Bold" panose="00000800000000000000"/>
-            </a:endParaRPr>
           </a:p>
         </p:txBody>
       </p:sp>
@@ -4703,29 +4707,8 @@
                 <a:cs typeface="Times New Roman" panose="02020603050405020304" charset="0"/>
                 <a:sym typeface="Glacial Indifference Bold" panose="00000800000000000000"/>
               </a:rPr>
-              <a:t>Giải pháp thu thập dữ liệu thông qua API </a:t>
-            </a:r>
-            <a:r>
-              <a:rPr lang="vi-VN" altLang="en-US" sz="3600" b="1">
-                <a:solidFill>
-                  <a:srgbClr val="2D3880"/>
-                </a:solidFill>
-                <a:latin typeface="Times New Roman" panose="02020603050405020304" charset="0"/>
-                <a:ea typeface="Glacial Indifference Bold" panose="00000800000000000000"/>
-                <a:cs typeface="Times New Roman" panose="02020603050405020304" charset="0"/>
-                <a:sym typeface="Glacial Indifference Bold" panose="00000800000000000000"/>
-              </a:rPr>
-              <a:t>qua việc hợp tác với các cửa hàng </a:t>
-            </a:r>
-            <a:endParaRPr lang="vi-VN" altLang="en-US" sz="3600" b="1">
-              <a:solidFill>
-                <a:srgbClr val="2D3880"/>
-              </a:solidFill>
-              <a:latin typeface="Times New Roman" panose="02020603050405020304" charset="0"/>
-              <a:ea typeface="Glacial Indifference Bold" panose="00000800000000000000"/>
-              <a:cs typeface="Times New Roman" panose="02020603050405020304" charset="0"/>
-              <a:sym typeface="Glacial Indifference Bold" panose="00000800000000000000"/>
-            </a:endParaRPr>
+              <a:t>Giải pháp thu thập dữ liệu thông qua API qua việc hợp tác với các cửa hàng </a:t>
+            </a:r>
           </a:p>
         </p:txBody>
       </p:sp>
@@ -4736,7 +4719,7 @@
           <p:nvPr/>
         </p:nvPicPr>
         <p:blipFill>
-          <a:blip r:embed="rId1"/>
+          <a:blip r:embed="rId2"/>
           <a:srcRect l="39111" t="4741" r="7556" b="8736"/>
           <a:stretch>
             <a:fillRect/>
@@ -4759,7 +4742,7 @@
           <p:nvPr/>
         </p:nvPicPr>
         <p:blipFill>
-          <a:blip r:embed="rId2"/>
+          <a:blip r:embed="rId3"/>
           <a:srcRect l="35500" t="30260" r="35500"/>
           <a:stretch>
             <a:fillRect/>
@@ -4782,7 +4765,7 @@
           <p:nvPr/>
         </p:nvPicPr>
         <p:blipFill>
-          <a:blip r:embed="rId3"/>
+          <a:blip r:embed="rId4"/>
           <a:srcRect l="18667" r="16000"/>
           <a:stretch>
             <a:fillRect/>
@@ -4805,7 +4788,7 @@
           <p:nvPr/>
         </p:nvPicPr>
         <p:blipFill>
-          <a:blip r:embed="rId4"/>
+          <a:blip r:embed="rId5"/>
           <a:srcRect l="24609" t="9028" r="17578" b="4861"/>
           <a:stretch>
             <a:fillRect/>
@@ -4853,7 +4836,7 @@
           <p:nvPr/>
         </p:nvGrpSpPr>
         <p:grpSpPr>
-          <a:xfrm rot="0">
+          <a:xfrm>
             <a:off x="9889130" y="1055071"/>
             <a:ext cx="7370170" cy="8203229"/>
             <a:chOff x="0" y="0"/>
@@ -4924,6 +4907,7 @@
                   <a:spcPts val="3010"/>
                 </a:lnSpc>
               </a:pPr>
+              <a:endParaRPr/>
             </a:p>
           </p:txBody>
         </p:sp>
@@ -4967,10 +4951,10 @@
             </a:pathLst>
           </a:custGeom>
           <a:blipFill>
-            <a:blip r:embed="rId1">
+            <a:blip r:embed="rId2">
               <a:extLst>
                 <a:ext uri="{96DAC541-7B7A-43D3-8B79-37D633B846F1}">
-                  <asvg:svgBlip xmlns:asvg="http://schemas.microsoft.com/office/drawing/2016/SVG/main" r:embed="rId2"/>
+                  <asvg:svgBlip xmlns:asvg="http://schemas.microsoft.com/office/drawing/2016/SVG/main" r:embed="rId3"/>
                 </a:ext>
               </a:extLst>
             </a:blip>
@@ -5019,10 +5003,10 @@
             </a:pathLst>
           </a:custGeom>
           <a:blipFill>
-            <a:blip r:embed="rId3">
+            <a:blip r:embed="rId4">
               <a:extLst>
                 <a:ext uri="{96DAC541-7B7A-43D3-8B79-37D633B846F1}">
-                  <asvg:svgBlip xmlns:asvg="http://schemas.microsoft.com/office/drawing/2016/SVG/main" r:embed="rId4"/>
+                  <asvg:svgBlip xmlns:asvg="http://schemas.microsoft.com/office/drawing/2016/SVG/main" r:embed="rId5"/>
                 </a:ext>
               </a:extLst>
             </a:blip>
@@ -5073,15 +5057,6 @@
               </a:rPr>
               <a:t>Kết quả</a:t>
             </a:r>
-            <a:endParaRPr lang="vi-VN" altLang="en-US" sz="10800" b="1" i="1">
-              <a:solidFill>
-                <a:srgbClr val="2D3880"/>
-              </a:solidFill>
-              <a:latin typeface="Times New Roman" panose="02020603050405020304" charset="0"/>
-              <a:ea typeface="Cormorant Garamond Bold Italics" panose="00000800000000000000"/>
-              <a:cs typeface="Times New Roman" panose="02020603050405020304" charset="0"/>
-              <a:sym typeface="Cormorant Garamond Bold Italics" panose="00000800000000000000"/>
-            </a:endParaRPr>
           </a:p>
         </p:txBody>
       </p:sp>
@@ -5092,7 +5067,7 @@
           <p:nvPr/>
         </p:nvPicPr>
         <p:blipFill>
-          <a:blip r:embed="rId5"/>
+          <a:blip r:embed="rId6"/>
           <a:stretch>
             <a:fillRect/>
           </a:stretch>
@@ -5171,10 +5146,10 @@
             </a:pathLst>
           </a:custGeom>
           <a:blipFill>
-            <a:blip r:embed="rId1">
+            <a:blip r:embed="rId2">
               <a:extLst>
                 <a:ext uri="{96DAC541-7B7A-43D3-8B79-37D633B846F1}">
-                  <asvg:svgBlip xmlns:asvg="http://schemas.microsoft.com/office/drawing/2016/SVG/main" r:embed="rId2"/>
+                  <asvg:svgBlip xmlns:asvg="http://schemas.microsoft.com/office/drawing/2016/SVG/main" r:embed="rId3"/>
                 </a:ext>
               </a:extLst>
             </a:blip>
@@ -5222,15 +5197,6 @@
               </a:rPr>
               <a:t>Ưu điểm:</a:t>
             </a:r>
-            <a:endParaRPr lang="vi-VN" altLang="en-US" sz="3600" b="1">
-              <a:solidFill>
-                <a:srgbClr val="2D3880"/>
-              </a:solidFill>
-              <a:latin typeface="Times New Roman" panose="02020603050405020304" charset="0"/>
-              <a:ea typeface="Glacial Indifference Bold" panose="00000800000000000000"/>
-              <a:cs typeface="Times New Roman" panose="02020603050405020304" charset="0"/>
-              <a:sym typeface="Glacial Indifference Bold" panose="00000800000000000000"/>
-            </a:endParaRPr>
           </a:p>
         </p:txBody>
       </p:sp>
@@ -5275,15 +5241,6 @@
               </a:rPr>
               <a:t>Nhược điểm:</a:t>
             </a:r>
-            <a:endParaRPr lang="vi-VN" altLang="en-US" sz="3600" b="1">
-              <a:solidFill>
-                <a:srgbClr val="2D3880"/>
-              </a:solidFill>
-              <a:latin typeface="Times New Roman" panose="02020603050405020304" charset="0"/>
-              <a:ea typeface="Glacial Indifference Bold" panose="00000800000000000000"/>
-              <a:cs typeface="Times New Roman" panose="02020603050405020304" charset="0"/>
-              <a:sym typeface="Glacial Indifference Bold" panose="00000800000000000000"/>
-            </a:endParaRPr>
           </a:p>
         </p:txBody>
       </p:sp>
@@ -5321,6 +5278,7 @@
         </p:style>
         <p:txBody>
           <a:bodyPr rtlCol="0" anchor="ctr"/>
+          <a:lstStyle/>
           <a:p>
             <a:pPr algn="ctr"/>
             <a:r>
@@ -5380,6 +5338,7 @@
         </p:style>
         <p:txBody>
           <a:bodyPr rtlCol="0" anchor="ctr"/>
+          <a:lstStyle/>
           <a:p>
             <a:pPr algn="l">
               <a:lnSpc>
@@ -5396,13 +5355,6 @@
               </a:rPr>
               <a:t>- Linh hoạt và tùy biến cao</a:t>
             </a:r>
-            <a:endParaRPr lang="en-US" altLang="en-US" sz="3200">
-              <a:solidFill>
-                <a:schemeClr val="tx2"/>
-              </a:solidFill>
-              <a:latin typeface="Times New Roman" panose="02020603050405020304" charset="0"/>
-              <a:cs typeface="Times New Roman" panose="02020603050405020304" charset="0"/>
-            </a:endParaRPr>
           </a:p>
           <a:p>
             <a:pPr algn="l">
@@ -5418,35 +5370,8 @@
                 <a:latin typeface="Times New Roman" panose="02020603050405020304" charset="0"/>
                 <a:cs typeface="Times New Roman" panose="02020603050405020304" charset="0"/>
               </a:rPr>
-              <a:t>- Th</a:t>
-            </a:r>
-            <a:r>
-              <a:rPr lang="en-US" altLang="en-US" sz="3200">
-                <a:solidFill>
-                  <a:schemeClr val="tx2"/>
-                </a:solidFill>
-                <a:latin typeface="Times New Roman" panose="02020603050405020304" charset="0"/>
-                <a:cs typeface="Times New Roman" panose="02020603050405020304" charset="0"/>
-              </a:rPr>
-              <a:t>ư</a:t>
-            </a:r>
-            <a:r>
-              <a:rPr lang="en-US" altLang="en-US" sz="3200">
-                <a:solidFill>
-                  <a:schemeClr val="tx2"/>
-                </a:solidFill>
-                <a:latin typeface="Times New Roman" panose="02020603050405020304" charset="0"/>
-                <a:cs typeface="Times New Roman" panose="02020603050405020304" charset="0"/>
-              </a:rPr>
-              <a:t> viện hỗ trợ phong phú</a:t>
-            </a:r>
-            <a:endParaRPr lang="en-US" altLang="en-US" sz="3200">
-              <a:solidFill>
-                <a:schemeClr val="tx2"/>
-              </a:solidFill>
-              <a:latin typeface="Times New Roman" panose="02020603050405020304" charset="0"/>
-              <a:cs typeface="Times New Roman" panose="02020603050405020304" charset="0"/>
-            </a:endParaRPr>
+              <a:t>- Thư viện hỗ trợ phong phú</a:t>
+            </a:r>
           </a:p>
           <a:p>
             <a:pPr algn="l">
@@ -5464,13 +5389,6 @@
               </a:rPr>
               <a:t>- Tiết kiệm chi phí</a:t>
             </a:r>
-            <a:endParaRPr lang="en-US" altLang="en-US" sz="3200">
-              <a:solidFill>
-                <a:schemeClr val="tx2"/>
-              </a:solidFill>
-              <a:latin typeface="Times New Roman" panose="02020603050405020304" charset="0"/>
-              <a:cs typeface="Times New Roman" panose="02020603050405020304" charset="0"/>
-            </a:endParaRPr>
           </a:p>
           <a:p>
             <a:pPr algn="l">
@@ -5486,35 +5404,8 @@
                 <a:latin typeface="Times New Roman" panose="02020603050405020304" charset="0"/>
                 <a:cs typeface="Times New Roman" panose="02020603050405020304" charset="0"/>
               </a:rPr>
-              <a:t>- Khả n</a:t>
-            </a:r>
-            <a:r>
-              <a:rPr lang="en-US" altLang="en-US" sz="3200">
-                <a:solidFill>
-                  <a:schemeClr val="tx2"/>
-                </a:solidFill>
-                <a:latin typeface="Times New Roman" panose="02020603050405020304" charset="0"/>
-                <a:cs typeface="Times New Roman" panose="02020603050405020304" charset="0"/>
-              </a:rPr>
-              <a:t>ă</a:t>
-            </a:r>
-            <a:r>
-              <a:rPr lang="en-US" altLang="en-US" sz="3200">
-                <a:solidFill>
-                  <a:schemeClr val="tx2"/>
-                </a:solidFill>
-                <a:latin typeface="Times New Roman" panose="02020603050405020304" charset="0"/>
-                <a:cs typeface="Times New Roman" panose="02020603050405020304" charset="0"/>
-              </a:rPr>
-              <a:t>ng mở rộng</a:t>
-            </a:r>
-            <a:endParaRPr lang="en-US" altLang="en-US" sz="3200">
-              <a:solidFill>
-                <a:schemeClr val="tx2"/>
-              </a:solidFill>
-              <a:latin typeface="Times New Roman" panose="02020603050405020304" charset="0"/>
-              <a:cs typeface="Times New Roman" panose="02020603050405020304" charset="0"/>
-            </a:endParaRPr>
+              <a:t>- Khả năng mở rộng</a:t>
+            </a:r>
           </a:p>
         </p:txBody>
       </p:sp>
@@ -5557,6 +5448,7 @@
         </p:style>
         <p:txBody>
           <a:bodyPr rtlCol="0" anchor="ctr"/>
+          <a:lstStyle/>
           <a:p>
             <a:pPr algn="l">
               <a:lnSpc>
@@ -5571,35 +5463,8 @@
                 <a:latin typeface="Times New Roman" panose="02020603050405020304" charset="0"/>
                 <a:cs typeface="Times New Roman" panose="02020603050405020304" charset="0"/>
               </a:rPr>
-              <a:t>- Yêu cầu kỹ n</a:t>
-            </a:r>
-            <a:r>
-              <a:rPr lang="en-US" altLang="en-US" sz="3200">
-                <a:solidFill>
-                  <a:schemeClr val="tx2"/>
-                </a:solidFill>
-                <a:latin typeface="Times New Roman" panose="02020603050405020304" charset="0"/>
-                <a:cs typeface="Times New Roman" panose="02020603050405020304" charset="0"/>
-              </a:rPr>
-              <a:t>ă</a:t>
-            </a:r>
-            <a:r>
-              <a:rPr lang="en-US" altLang="en-US" sz="3200">
-                <a:solidFill>
-                  <a:schemeClr val="tx2"/>
-                </a:solidFill>
-                <a:latin typeface="Times New Roman" panose="02020603050405020304" charset="0"/>
-                <a:cs typeface="Times New Roman" panose="02020603050405020304" charset="0"/>
-              </a:rPr>
-              <a:t>ng lập trình</a:t>
-            </a:r>
-            <a:endParaRPr lang="en-US" altLang="en-US" sz="3200">
-              <a:solidFill>
-                <a:schemeClr val="tx2"/>
-              </a:solidFill>
-              <a:latin typeface="Times New Roman" panose="02020603050405020304" charset="0"/>
-              <a:cs typeface="Times New Roman" panose="02020603050405020304" charset="0"/>
-            </a:endParaRPr>
+              <a:t>- Yêu cầu kỹ năng lập trình</a:t>
+            </a:r>
           </a:p>
           <a:p>
             <a:pPr algn="l">
@@ -5615,55 +5480,8 @@
                 <a:latin typeface="Times New Roman" panose="02020603050405020304" charset="0"/>
                 <a:cs typeface="Times New Roman" panose="02020603050405020304" charset="0"/>
               </a:rPr>
-              <a:t>- Quản l</a:t>
-            </a:r>
-            <a:r>
-              <a:rPr lang="en-US" altLang="en-US" sz="3200">
-                <a:solidFill>
-                  <a:schemeClr val="tx2"/>
-                </a:solidFill>
-                <a:latin typeface="Times New Roman" panose="02020603050405020304" charset="0"/>
-                <a:cs typeface="Times New Roman" panose="02020603050405020304" charset="0"/>
-              </a:rPr>
-              <a:t>ý</a:t>
-            </a:r>
-            <a:r>
-              <a:rPr lang="en-US" altLang="en-US" sz="3200">
-                <a:solidFill>
-                  <a:schemeClr val="tx2"/>
-                </a:solidFill>
-                <a:latin typeface="Times New Roman" panose="02020603050405020304" charset="0"/>
-                <a:cs typeface="Times New Roman" panose="02020603050405020304" charset="0"/>
-              </a:rPr>
-              <a:t> môi tr</a:t>
-            </a:r>
-            <a:r>
-              <a:rPr lang="en-US" altLang="en-US" sz="3200">
-                <a:solidFill>
-                  <a:schemeClr val="tx2"/>
-                </a:solidFill>
-                <a:latin typeface="Times New Roman" panose="02020603050405020304" charset="0"/>
-                <a:cs typeface="Times New Roman" panose="02020603050405020304" charset="0"/>
-              </a:rPr>
-              <a:t>ư</a:t>
-            </a:r>
-            <a:r>
-              <a:rPr lang="en-US" altLang="en-US" sz="3200">
-                <a:solidFill>
-                  <a:schemeClr val="tx2"/>
-                </a:solidFill>
-                <a:latin typeface="Times New Roman" panose="02020603050405020304" charset="0"/>
-                <a:cs typeface="Times New Roman" panose="02020603050405020304" charset="0"/>
-              </a:rPr>
-              <a:t>ờng</a:t>
-            </a:r>
-            <a:endParaRPr lang="en-US" altLang="en-US" sz="3200">
-              <a:solidFill>
-                <a:schemeClr val="tx2"/>
-              </a:solidFill>
-              <a:latin typeface="Times New Roman" panose="02020603050405020304" charset="0"/>
-              <a:cs typeface="Times New Roman" panose="02020603050405020304" charset="0"/>
-            </a:endParaRPr>
+              <a:t>- Quản lý môi trường</a:t>
+            </a:r>
           </a:p>
           <a:p>
             <a:pPr algn="l">
@@ -5679,35 +5497,8 @@
                 <a:latin typeface="Times New Roman" panose="02020603050405020304" charset="0"/>
                 <a:cs typeface="Times New Roman" panose="02020603050405020304" charset="0"/>
               </a:rPr>
-              <a:t>- Giới hạn hiệu n</a:t>
-            </a:r>
-            <a:r>
-              <a:rPr lang="en-US" altLang="en-US" sz="3200">
-                <a:solidFill>
-                  <a:schemeClr val="tx2"/>
-                </a:solidFill>
-                <a:latin typeface="Times New Roman" panose="02020603050405020304" charset="0"/>
-                <a:cs typeface="Times New Roman" panose="02020603050405020304" charset="0"/>
-              </a:rPr>
-              <a:t>ă</a:t>
-            </a:r>
-            <a:r>
-              <a:rPr lang="en-US" altLang="en-US" sz="3200">
-                <a:solidFill>
-                  <a:schemeClr val="tx2"/>
-                </a:solidFill>
-                <a:latin typeface="Times New Roman" panose="02020603050405020304" charset="0"/>
-                <a:cs typeface="Times New Roman" panose="02020603050405020304" charset="0"/>
-              </a:rPr>
-              <a:t>ng khi </a:t>
-            </a:r>
-            <a:endParaRPr lang="en-US" altLang="en-US" sz="3200">
-              <a:solidFill>
-                <a:schemeClr val="tx2"/>
-              </a:solidFill>
-              <a:latin typeface="Times New Roman" panose="02020603050405020304" charset="0"/>
-              <a:cs typeface="Times New Roman" panose="02020603050405020304" charset="0"/>
-            </a:endParaRPr>
+              <a:t>- Giới hạn hiệu năng khi </a:t>
+            </a:r>
           </a:p>
         </p:txBody>
       </p:sp>
@@ -5745,6 +5536,7 @@
         </p:style>
         <p:txBody>
           <a:bodyPr rtlCol="0" anchor="ctr"/>
+          <a:lstStyle/>
           <a:p>
             <a:pPr marL="0" lvl="0" indent="0" algn="ctr">
               <a:lnSpc>
@@ -5814,6 +5606,7 @@
         </p:style>
         <p:txBody>
           <a:bodyPr rtlCol="0" anchor="ctr"/>
+          <a:lstStyle/>
           <a:p>
             <a:pPr algn="l">
               <a:lnSpc>
@@ -5829,6 +5622,40 @@
                 <a:cs typeface="Times New Roman" panose="02020603050405020304" charset="0"/>
               </a:rPr>
               <a:t>- Dễ triển khai và sử dụng</a:t>
+            </a:r>
+          </a:p>
+          <a:p>
+            <a:pPr algn="l">
+              <a:lnSpc>
+                <a:spcPct val="150000"/>
+              </a:lnSpc>
+            </a:pPr>
+            <a:r>
+              <a:rPr lang="en-US" altLang="en-US" sz="3200">
+                <a:solidFill>
+                  <a:schemeClr val="tx2"/>
+                </a:solidFill>
+                <a:latin typeface="Times New Roman" panose="02020603050405020304" charset="0"/>
+                <a:cs typeface="Times New Roman" panose="02020603050405020304" charset="0"/>
+              </a:rPr>
+              <a:t>- Hiệu năng cao và ổn định</a:t>
+            </a:r>
+          </a:p>
+          <a:p>
+            <a:pPr algn="l">
+              <a:lnSpc>
+                <a:spcPct val="150000"/>
+              </a:lnSpc>
+            </a:pPr>
+            <a:r>
+              <a:rPr lang="vi-VN" altLang="en-US" sz="3200">
+                <a:solidFill>
+                  <a:schemeClr val="tx2"/>
+                </a:solidFill>
+                <a:latin typeface="Times New Roman" panose="02020603050405020304" charset="0"/>
+                <a:cs typeface="Times New Roman" panose="02020603050405020304" charset="0"/>
+              </a:rPr>
+              <a:t>- Khả năng mở rộng</a:t>
             </a:r>
             <a:endParaRPr lang="en-US" altLang="en-US" sz="3200">
               <a:solidFill>
@@ -5852,55 +5679,8 @@
                 <a:latin typeface="Times New Roman" panose="02020603050405020304" charset="0"/>
                 <a:cs typeface="Times New Roman" panose="02020603050405020304" charset="0"/>
               </a:rPr>
-              <a:t>- Hiệu n</a:t>
-            </a:r>
-            <a:r>
-              <a:rPr lang="en-US" altLang="en-US" sz="3200">
-                <a:solidFill>
-                  <a:schemeClr val="tx2"/>
-                </a:solidFill>
-                <a:latin typeface="Times New Roman" panose="02020603050405020304" charset="0"/>
-                <a:cs typeface="Times New Roman" panose="02020603050405020304" charset="0"/>
-              </a:rPr>
-              <a:t>ă</a:t>
-            </a:r>
-            <a:r>
-              <a:rPr lang="en-US" altLang="en-US" sz="3200">
-                <a:solidFill>
-                  <a:schemeClr val="tx2"/>
-                </a:solidFill>
-                <a:latin typeface="Times New Roman" panose="02020603050405020304" charset="0"/>
-                <a:cs typeface="Times New Roman" panose="02020603050405020304" charset="0"/>
-              </a:rPr>
-              <a:t>ng cao và ổn </a:t>
-            </a:r>
-            <a:r>
-              <a:rPr lang="en-US" altLang="en-US" sz="3200">
-                <a:solidFill>
-                  <a:schemeClr val="tx2"/>
-                </a:solidFill>
-                <a:latin typeface="Times New Roman" panose="02020603050405020304" charset="0"/>
-                <a:cs typeface="Times New Roman" panose="02020603050405020304" charset="0"/>
-              </a:rPr>
-              <a:t>đ</a:t>
-            </a:r>
-            <a:r>
-              <a:rPr lang="en-US" altLang="en-US" sz="3200">
-                <a:solidFill>
-                  <a:schemeClr val="tx2"/>
-                </a:solidFill>
-                <a:latin typeface="Times New Roman" panose="02020603050405020304" charset="0"/>
-                <a:cs typeface="Times New Roman" panose="02020603050405020304" charset="0"/>
-              </a:rPr>
-              <a:t>ịnh</a:t>
-            </a:r>
-            <a:endParaRPr lang="en-US" altLang="en-US" sz="3200">
-              <a:solidFill>
-                <a:schemeClr val="tx2"/>
-              </a:solidFill>
-              <a:latin typeface="Times New Roman" panose="02020603050405020304" charset="0"/>
-              <a:cs typeface="Times New Roman" panose="02020603050405020304" charset="0"/>
-            </a:endParaRPr>
+              <a:t>- Quản lý tự động</a:t>
+            </a:r>
           </a:p>
           <a:p>
             <a:pPr algn="l">
@@ -5909,110 +5689,15 @@
               </a:lnSpc>
             </a:pPr>
             <a:r>
-              <a:rPr lang="vi-VN" altLang="en-US" sz="3200">
+              <a:rPr lang="en-US" altLang="en-US" sz="3200">
                 <a:solidFill>
                   <a:schemeClr val="tx2"/>
                 </a:solidFill>
                 <a:latin typeface="Times New Roman" panose="02020603050405020304" charset="0"/>
                 <a:cs typeface="Times New Roman" panose="02020603050405020304" charset="0"/>
               </a:rPr>
-              <a:t>- Khả năng mở rộng</a:t>
-            </a:r>
-            <a:endParaRPr lang="en-US" altLang="en-US" sz="3200">
-              <a:solidFill>
-                <a:schemeClr val="tx2"/>
-              </a:solidFill>
-              <a:latin typeface="Times New Roman" panose="02020603050405020304" charset="0"/>
-              <a:cs typeface="Times New Roman" panose="02020603050405020304" charset="0"/>
-            </a:endParaRPr>
-          </a:p>
-          <a:p>
-            <a:pPr algn="l">
-              <a:lnSpc>
-                <a:spcPct val="150000"/>
-              </a:lnSpc>
-            </a:pPr>
-            <a:r>
-              <a:rPr lang="en-US" altLang="en-US" sz="3200">
-                <a:solidFill>
-                  <a:schemeClr val="tx2"/>
-                </a:solidFill>
-                <a:latin typeface="Times New Roman" panose="02020603050405020304" charset="0"/>
-                <a:cs typeface="Times New Roman" panose="02020603050405020304" charset="0"/>
-              </a:rPr>
-              <a:t>- Quản l</a:t>
-            </a:r>
-            <a:r>
-              <a:rPr lang="en-US" altLang="en-US" sz="3200">
-                <a:solidFill>
-                  <a:schemeClr val="tx2"/>
-                </a:solidFill>
-                <a:latin typeface="Times New Roman" panose="02020603050405020304" charset="0"/>
-                <a:cs typeface="Times New Roman" panose="02020603050405020304" charset="0"/>
-              </a:rPr>
-              <a:t>ý</a:t>
-            </a:r>
-            <a:r>
-              <a:rPr lang="en-US" altLang="en-US" sz="3200">
-                <a:solidFill>
-                  <a:schemeClr val="tx2"/>
-                </a:solidFill>
-                <a:latin typeface="Times New Roman" panose="02020603050405020304" charset="0"/>
-                <a:cs typeface="Times New Roman" panose="02020603050405020304" charset="0"/>
-              </a:rPr>
-              <a:t> tự </a:t>
-            </a:r>
-            <a:r>
-              <a:rPr lang="en-US" altLang="en-US" sz="3200">
-                <a:solidFill>
-                  <a:schemeClr val="tx2"/>
-                </a:solidFill>
-                <a:latin typeface="Times New Roman" panose="02020603050405020304" charset="0"/>
-                <a:cs typeface="Times New Roman" panose="02020603050405020304" charset="0"/>
-              </a:rPr>
-              <a:t>đ</a:t>
-            </a:r>
-            <a:r>
-              <a:rPr lang="en-US" altLang="en-US" sz="3200">
-                <a:solidFill>
-                  <a:schemeClr val="tx2"/>
-                </a:solidFill>
-                <a:latin typeface="Times New Roman" panose="02020603050405020304" charset="0"/>
-                <a:cs typeface="Times New Roman" panose="02020603050405020304" charset="0"/>
-              </a:rPr>
-              <a:t>ộng</a:t>
-            </a:r>
-            <a:endParaRPr lang="en-US" altLang="en-US" sz="3200">
-              <a:solidFill>
-                <a:schemeClr val="tx2"/>
-              </a:solidFill>
-              <a:latin typeface="Times New Roman" panose="02020603050405020304" charset="0"/>
-              <a:cs typeface="Times New Roman" panose="02020603050405020304" charset="0"/>
-            </a:endParaRPr>
-          </a:p>
-          <a:p>
-            <a:pPr algn="l">
-              <a:lnSpc>
-                <a:spcPct val="150000"/>
-              </a:lnSpc>
-            </a:pPr>
-            <a:r>
-              <a:rPr lang="en-US" altLang="en-US" sz="3200">
-                <a:solidFill>
-                  <a:schemeClr val="tx2"/>
-                </a:solidFill>
-                <a:latin typeface="Times New Roman" panose="02020603050405020304" charset="0"/>
-                <a:cs typeface="Times New Roman" panose="02020603050405020304" charset="0"/>
-              </a:rPr>
               <a:t>- An toàn dữ liệu</a:t>
             </a:r>
-            <a:endParaRPr lang="en-US" altLang="en-US" sz="3200">
-              <a:solidFill>
-                <a:schemeClr val="tx2"/>
-              </a:solidFill>
-              <a:latin typeface="Times New Roman" panose="02020603050405020304" charset="0"/>
-              <a:cs typeface="Times New Roman" panose="02020603050405020304" charset="0"/>
-            </a:endParaRPr>
           </a:p>
         </p:txBody>
       </p:sp>
@@ -6055,6 +5740,7 @@
         </p:style>
         <p:txBody>
           <a:bodyPr rtlCol="0" anchor="ctr"/>
+          <a:lstStyle/>
           <a:p>
             <a:pPr algn="l">
               <a:lnSpc>
@@ -6079,25 +5765,8 @@
                 <a:latin typeface="Times New Roman" panose="02020603050405020304" charset="0"/>
                 <a:cs typeface="Times New Roman" panose="02020603050405020304" charset="0"/>
               </a:rPr>
-              <a:t>Chi phí </a:t>
-            </a:r>
-            <a:r>
-              <a:rPr lang="vi-VN" altLang="en-US" sz="3200">
-                <a:solidFill>
-                  <a:schemeClr val="tx2"/>
-                </a:solidFill>
-                <a:latin typeface="Times New Roman" panose="02020603050405020304" charset="0"/>
-                <a:cs typeface="Times New Roman" panose="02020603050405020304" charset="0"/>
-              </a:rPr>
-              <a:t>cao</a:t>
-            </a:r>
-            <a:endParaRPr lang="vi-VN" altLang="en-US" sz="3200">
-              <a:solidFill>
-                <a:schemeClr val="tx2"/>
-              </a:solidFill>
-              <a:latin typeface="Times New Roman" panose="02020603050405020304" charset="0"/>
-              <a:cs typeface="Times New Roman" panose="02020603050405020304" charset="0"/>
-            </a:endParaRPr>
+              <a:t>Chi phí cao</a:t>
+            </a:r>
           </a:p>
           <a:p>
             <a:pPr algn="l">
@@ -6181,25 +5850,8 @@
                 <a:latin typeface="Times New Roman" panose="02020603050405020304" charset="0"/>
                 <a:cs typeface="Times New Roman" panose="02020603050405020304" charset="0"/>
               </a:rPr>
-              <a:t>Yêu cầu kỹ năng quản lý đám </a:t>
-            </a:r>
-            <a:r>
-              <a:rPr lang="vi-VN" altLang="en-US" sz="3200">
-                <a:solidFill>
-                  <a:schemeClr val="tx2"/>
-                </a:solidFill>
-                <a:latin typeface="Times New Roman" panose="02020603050405020304" charset="0"/>
-                <a:cs typeface="Times New Roman" panose="02020603050405020304" charset="0"/>
-              </a:rPr>
-              <a:t>mây</a:t>
-            </a:r>
-            <a:endParaRPr lang="vi-VN" altLang="en-US" sz="3200">
-              <a:solidFill>
-                <a:schemeClr val="tx2"/>
-              </a:solidFill>
-              <a:latin typeface="Times New Roman" panose="02020603050405020304" charset="0"/>
-              <a:cs typeface="Times New Roman" panose="02020603050405020304" charset="0"/>
-            </a:endParaRPr>
+              <a:t>Yêu cầu kỹ năng quản lý đám mây</a:t>
+            </a:r>
           </a:p>
         </p:txBody>
       </p:sp>
@@ -6237,6 +5889,7 @@
         </p:style>
         <p:txBody>
           <a:bodyPr rtlCol="0" anchor="ctr"/>
+          <a:lstStyle/>
           <a:p>
             <a:pPr marL="0" lvl="0" indent="0" algn="ctr">
               <a:lnSpc>
@@ -6258,15 +5911,6 @@
               </a:rPr>
               <a:t>Giải pháp thu thập dữ liệu thông qua API</a:t>
             </a:r>
-            <a:endParaRPr lang="vi-VN" altLang="en-US" sz="5800" b="1">
-              <a:solidFill>
-                <a:srgbClr val="2D3880"/>
-              </a:solidFill>
-              <a:latin typeface="Times New Roman" panose="02020603050405020304" charset="0"/>
-              <a:ea typeface="Glacial Indifference Bold" panose="00000800000000000000"/>
-              <a:cs typeface="Times New Roman" panose="02020603050405020304" charset="0"/>
-              <a:sym typeface="Glacial Indifference Bold" panose="00000800000000000000"/>
-            </a:endParaRPr>
           </a:p>
           <a:p>
             <a:pPr marL="0" lvl="0" indent="0" algn="ctr">
@@ -6334,6 +5978,7 @@
         </p:style>
         <p:txBody>
           <a:bodyPr rtlCol="0" anchor="ctr"/>
+          <a:lstStyle/>
           <a:p>
             <a:pPr algn="l">
               <a:lnSpc>
@@ -6450,25 +6095,8 @@
                 <a:latin typeface="Times New Roman" panose="02020603050405020304" charset="0"/>
                 <a:cs typeface="Times New Roman" panose="02020603050405020304" charset="0"/>
               </a:rPr>
-              <a:t>Dễ tiếp cận và cập nhật liên </a:t>
-            </a:r>
-            <a:r>
-              <a:rPr lang="vi-VN" altLang="en-US" sz="3200">
-                <a:solidFill>
-                  <a:schemeClr val="tx2"/>
-                </a:solidFill>
-                <a:latin typeface="Times New Roman" panose="02020603050405020304" charset="0"/>
-                <a:cs typeface="Times New Roman" panose="02020603050405020304" charset="0"/>
-              </a:rPr>
-              <a:t>tục</a:t>
-            </a:r>
-            <a:endParaRPr lang="vi-VN" altLang="en-US" sz="3200">
-              <a:solidFill>
-                <a:schemeClr val="tx2"/>
-              </a:solidFill>
-              <a:latin typeface="Times New Roman" panose="02020603050405020304" charset="0"/>
-              <a:cs typeface="Times New Roman" panose="02020603050405020304" charset="0"/>
-            </a:endParaRPr>
+              <a:t>Dễ tiếp cận và cập nhật liên tục</a:t>
+            </a:r>
           </a:p>
           <a:p>
             <a:pPr algn="l">
@@ -6525,6 +6153,7 @@
         </p:style>
         <p:txBody>
           <a:bodyPr rtlCol="0" anchor="ctr"/>
+          <a:lstStyle/>
           <a:p>
             <a:pPr algn="l">
               <a:lnSpc>
@@ -6549,25 +6178,8 @@
                 <a:latin typeface="Times New Roman" panose="02020603050405020304" charset="0"/>
                 <a:cs typeface="Times New Roman" panose="02020603050405020304" charset="0"/>
               </a:rPr>
-              <a:t>Khó thu thập dữ liệu quy mô </a:t>
-            </a:r>
-            <a:r>
-              <a:rPr lang="vi-VN" altLang="en-US" sz="3200">
-                <a:solidFill>
-                  <a:schemeClr val="tx2"/>
-                </a:solidFill>
-                <a:latin typeface="Times New Roman" panose="02020603050405020304" charset="0"/>
-                <a:cs typeface="Times New Roman" panose="02020603050405020304" charset="0"/>
-              </a:rPr>
-              <a:t>lớn</a:t>
-            </a:r>
-            <a:endParaRPr lang="vi-VN" altLang="en-US" sz="3200">
-              <a:solidFill>
-                <a:schemeClr val="tx2"/>
-              </a:solidFill>
-              <a:latin typeface="Times New Roman" panose="02020603050405020304" charset="0"/>
-              <a:cs typeface="Times New Roman" panose="02020603050405020304" charset="0"/>
-            </a:endParaRPr>
+              <a:t>Khó thu thập dữ liệu quy mô lớn</a:t>
+            </a:r>
           </a:p>
           <a:p>
             <a:pPr algn="l">
@@ -6677,6 +6289,7 @@
         </p:style>
         <p:txBody>
           <a:bodyPr rtlCol="0" anchor="ctr"/>
+          <a:lstStyle/>
           <a:p>
             <a:pPr marL="0" lvl="0" indent="0" algn="ctr">
               <a:lnSpc>
@@ -6746,6 +6359,7 @@
         </p:style>
         <p:txBody>
           <a:bodyPr rtlCol="0" anchor="ctr"/>
+          <a:lstStyle/>
           <a:p>
             <a:pPr algn="l">
               <a:lnSpc>
@@ -6862,25 +6476,8 @@
                 <a:latin typeface="Times New Roman" panose="02020603050405020304" charset="0"/>
                 <a:cs typeface="Times New Roman" panose="02020603050405020304" charset="0"/>
               </a:rPr>
-              <a:t>Dữ liệu thực tế và kiệp </a:t>
-            </a:r>
-            <a:r>
-              <a:rPr lang="vi-VN" altLang="en-US" sz="3200">
-                <a:solidFill>
-                  <a:schemeClr val="tx2"/>
-                </a:solidFill>
-                <a:latin typeface="Times New Roman" panose="02020603050405020304" charset="0"/>
-                <a:cs typeface="Times New Roman" panose="02020603050405020304" charset="0"/>
-              </a:rPr>
-              <a:t>thời</a:t>
-            </a:r>
-            <a:endParaRPr lang="vi-VN" altLang="en-US" sz="3200">
-              <a:solidFill>
-                <a:schemeClr val="tx2"/>
-              </a:solidFill>
-              <a:latin typeface="Times New Roman" panose="02020603050405020304" charset="0"/>
-              <a:cs typeface="Times New Roman" panose="02020603050405020304" charset="0"/>
-            </a:endParaRPr>
+              <a:t>Dữ liệu thực tế và kiệp thời</a:t>
+            </a:r>
           </a:p>
           <a:p>
             <a:pPr algn="l">
@@ -6937,6 +6534,7 @@
         </p:style>
         <p:txBody>
           <a:bodyPr rtlCol="0" anchor="ctr"/>
+          <a:lstStyle/>
           <a:p>
             <a:pPr algn="l">
               <a:lnSpc>
@@ -6961,25 +6559,8 @@
                 <a:latin typeface="Times New Roman" panose="02020603050405020304" charset="0"/>
                 <a:cs typeface="Times New Roman" panose="02020603050405020304" charset="0"/>
               </a:rPr>
-              <a:t> Phụ thuộc vào các cửa </a:t>
-            </a:r>
-            <a:r>
-              <a:rPr lang="vi-VN" altLang="en-US" sz="3200">
-                <a:solidFill>
-                  <a:schemeClr val="tx2"/>
-                </a:solidFill>
-                <a:latin typeface="Times New Roman" panose="02020603050405020304" charset="0"/>
-                <a:cs typeface="Times New Roman" panose="02020603050405020304" charset="0"/>
-              </a:rPr>
-              <a:t>hàng</a:t>
-            </a:r>
-            <a:endParaRPr lang="vi-VN" altLang="en-US" sz="3200">
-              <a:solidFill>
-                <a:schemeClr val="tx2"/>
-              </a:solidFill>
-              <a:latin typeface="Times New Roman" panose="02020603050405020304" charset="0"/>
-              <a:cs typeface="Times New Roman" panose="02020603050405020304" charset="0"/>
-            </a:endParaRPr>
+              <a:t> Phụ thuộc vào các cửa hàng</a:t>
+            </a:r>
           </a:p>
           <a:p>
             <a:pPr algn="l">
@@ -7053,25 +6634,8 @@
                 <a:latin typeface="Times New Roman" panose="02020603050405020304" charset="0"/>
                 <a:cs typeface="Times New Roman" panose="02020603050405020304" charset="0"/>
               </a:rPr>
-              <a:t>- Khó khăng trong việc đồng bộ hóa dữ </a:t>
-            </a:r>
-            <a:r>
-              <a:rPr lang="vi-VN" altLang="en-US" sz="3200">
-                <a:solidFill>
-                  <a:schemeClr val="tx2"/>
-                </a:solidFill>
-                <a:latin typeface="Times New Roman" panose="02020603050405020304" charset="0"/>
-                <a:cs typeface="Times New Roman" panose="02020603050405020304" charset="0"/>
-              </a:rPr>
-              <a:t>liệu</a:t>
-            </a:r>
-            <a:endParaRPr lang="vi-VN" altLang="en-US" sz="3200">
-              <a:solidFill>
-                <a:schemeClr val="tx2"/>
-              </a:solidFill>
-              <a:latin typeface="Times New Roman" panose="02020603050405020304" charset="0"/>
-              <a:cs typeface="Times New Roman" panose="02020603050405020304" charset="0"/>
-            </a:endParaRPr>
+              <a:t>- Khó khăng trong việc đồng bộ hóa dữ liệu</a:t>
+            </a:r>
           </a:p>
         </p:txBody>
       </p:sp>
@@ -7852,14 +7416,14 @@
       </p:par>
     </p:tnLst>
     <p:bldLst>
+      <p:bldP spid="9" grpId="0"/>
+      <p:bldP spid="9" grpId="1"/>
+      <p:bldP spid="13" grpId="0"/>
+      <p:bldP spid="13" grpId="1"/>
       <p:bldP spid="14" grpId="0" animBg="1"/>
       <p:bldP spid="14" grpId="1" animBg="1"/>
-      <p:bldP spid="9" grpId="0"/>
-      <p:bldP spid="9" grpId="1"/>
       <p:bldP spid="16" grpId="0" animBg="1"/>
       <p:bldP spid="16" grpId="1" animBg="1"/>
-      <p:bldP spid="13" grpId="0"/>
-      <p:bldP spid="13" grpId="1"/>
       <p:bldP spid="17" grpId="0" animBg="1"/>
       <p:bldP spid="17" grpId="1" animBg="1"/>
       <p:bldP spid="18" grpId="0" bldLvl="0" animBg="1"/>
@@ -7909,7 +7473,7 @@
           <p:nvPr/>
         </p:nvGrpSpPr>
         <p:grpSpPr>
-          <a:xfrm rot="0">
+          <a:xfrm>
             <a:off x="10085070" y="1055370"/>
             <a:ext cx="7174230" cy="8202930"/>
             <a:chOff x="0" y="0"/>
@@ -7980,6 +7544,7 @@
                   <a:spcPts val="3010"/>
                 </a:lnSpc>
               </a:pPr>
+              <a:endParaRPr/>
             </a:p>
           </p:txBody>
         </p:sp>
@@ -8023,10 +7588,10 @@
             </a:pathLst>
           </a:custGeom>
           <a:blipFill>
-            <a:blip r:embed="rId1">
+            <a:blip r:embed="rId2">
               <a:extLst>
                 <a:ext uri="{96DAC541-7B7A-43D3-8B79-37D633B846F1}">
-                  <asvg:svgBlip xmlns:asvg="http://schemas.microsoft.com/office/drawing/2016/SVG/main" r:embed="rId2"/>
+                  <asvg:svgBlip xmlns:asvg="http://schemas.microsoft.com/office/drawing/2016/SVG/main" r:embed="rId3"/>
                 </a:ext>
               </a:extLst>
             </a:blip>
@@ -8075,10 +7640,10 @@
             </a:pathLst>
           </a:custGeom>
           <a:blipFill>
-            <a:blip r:embed="rId3">
+            <a:blip r:embed="rId4">
               <a:extLst>
                 <a:ext uri="{96DAC541-7B7A-43D3-8B79-37D633B846F1}">
-                  <asvg:svgBlip xmlns:asvg="http://schemas.microsoft.com/office/drawing/2016/SVG/main" r:embed="rId4"/>
+                  <asvg:svgBlip xmlns:asvg="http://schemas.microsoft.com/office/drawing/2016/SVG/main" r:embed="rId5"/>
                 </a:ext>
               </a:extLst>
             </a:blip>
@@ -8095,7 +7660,7 @@
           <p:nvPr/>
         </p:nvPicPr>
         <p:blipFill>
-          <a:blip r:embed="rId5"/>
+          <a:blip r:embed="rId6"/>
           <a:stretch>
             <a:fillRect/>
           </a:stretch>
@@ -8151,15 +7716,6 @@
               </a:rPr>
               <a:t>Kết luận và </a:t>
             </a:r>
-            <a:endParaRPr lang="vi-VN" altLang="en-US" sz="10800" b="1" i="1">
-              <a:solidFill>
-                <a:srgbClr val="2D3880"/>
-              </a:solidFill>
-              <a:latin typeface="Times New Roman" panose="02020603050405020304" charset="0"/>
-              <a:ea typeface="Cormorant Garamond Bold Italics" panose="00000800000000000000"/>
-              <a:cs typeface="Times New Roman" panose="02020603050405020304" charset="0"/>
-              <a:sym typeface="Cormorant Garamond Bold Italics" panose="00000800000000000000"/>
-            </a:endParaRPr>
           </a:p>
           <a:p>
             <a:pPr marL="0" lvl="0" indent="0" algn="ctr">
@@ -8180,29 +7736,8 @@
                 <a:cs typeface="Times New Roman" panose="02020603050405020304" charset="0"/>
                 <a:sym typeface="Cormorant Garamond Bold Italics" panose="00000800000000000000"/>
               </a:rPr>
-              <a:t>đề </a:t>
-            </a:r>
-            <a:r>
-              <a:rPr lang="vi-VN" altLang="en-US" sz="10800" b="1" i="1">
-                <a:solidFill>
-                  <a:srgbClr val="2D3880"/>
-                </a:solidFill>
-                <a:latin typeface="Times New Roman" panose="02020603050405020304" charset="0"/>
-                <a:ea typeface="Cormorant Garamond Bold Italics" panose="00000800000000000000"/>
-                <a:cs typeface="Times New Roman" panose="02020603050405020304" charset="0"/>
-                <a:sym typeface="Cormorant Garamond Bold Italics" panose="00000800000000000000"/>
-              </a:rPr>
-              <a:t>xuất</a:t>
-            </a:r>
-            <a:endParaRPr lang="vi-VN" altLang="en-US" sz="10800" b="1" i="1">
-              <a:solidFill>
-                <a:srgbClr val="2D3880"/>
-              </a:solidFill>
-              <a:latin typeface="Times New Roman" panose="02020603050405020304" charset="0"/>
-              <a:ea typeface="Cormorant Garamond Bold Italics" panose="00000800000000000000"/>
-              <a:cs typeface="Times New Roman" panose="02020603050405020304" charset="0"/>
-              <a:sym typeface="Cormorant Garamond Bold Italics" panose="00000800000000000000"/>
-            </a:endParaRPr>
+              <a:t>đề xuất</a:t>
+            </a:r>
           </a:p>
         </p:txBody>
       </p:sp>
@@ -8211,13 +7746,13 @@
   <p:clrMapOvr>
     <a:masterClrMapping/>
   </p:clrMapOvr>
-  <mc:AlternateContent xmlns:mc="http://schemas.openxmlformats.org/markup-compatibility/2006">
-    <mc:Choice xmlns:p14="http://schemas.microsoft.com/office/powerpoint/2010/main" Requires="p14">
-      <p:transition spd="med" p14:dur="750">
+  <mc:AlternateContent xmlns:mc="http://schemas.openxmlformats.org/markup-compatibility/2006" xmlns:p14="http://schemas.microsoft.com/office/powerpoint/2010/main">
+    <mc:Choice Requires="p14">
+      <p:transition spd="med">
         <p:pull/>
       </p:transition>
     </mc:Choice>
-    <mc:Fallback>
+    <mc:Fallback xmlns="">
       <p:transition spd="med">
         <p:pull/>
       </p:transition>
@@ -8262,6 +7797,7 @@
           <a:bodyPr wrap="square">
             <a:spAutoFit/>
           </a:bodyPr>
+          <a:lstStyle/>
           <a:p>
             <a:pPr marL="0" indent="0" algn="just" defTabSz="457200">
               <a:lnSpc>
@@ -8605,14 +8141,6 @@
               </a:rPr>
               <a:t>.</a:t>
             </a:r>
-            <a:endParaRPr lang="en-US" sz="3200">
-              <a:solidFill>
-                <a:schemeClr val="tx2"/>
-              </a:solidFill>
-              <a:latin typeface="Times New Roman" panose="02020603050405020304" charset="0"/>
-              <a:ea typeface="Times New Roman" panose="02020603050405020304"/>
-              <a:cs typeface="Times New Roman" panose="02020603050405020304" charset="0"/>
-            </a:endParaRPr>
           </a:p>
           <a:p>
             <a:pPr marL="0" indent="0" algn="just" defTabSz="457200">
@@ -8804,14 +8332,6 @@
               </a:rPr>
               <a:t>giúp thu thập dữ liệu đa dạng hơn so với giải pháp bán hàng, nhưng giải pháp này phụ thuộc vào các cửa hàng.</a:t>
             </a:r>
-            <a:endParaRPr lang="zh-CN" sz="3200">
-              <a:solidFill>
-                <a:schemeClr val="tx2"/>
-              </a:solidFill>
-              <a:latin typeface="Times New Roman" panose="02020603050405020304" charset="0"/>
-              <a:ea typeface="Times New Roman" panose="02020603050405020304"/>
-              <a:cs typeface="Times New Roman" panose="02020603050405020304" charset="0"/>
-            </a:endParaRPr>
           </a:p>
         </p:txBody>
       </p:sp>
@@ -8856,15 +8376,6 @@
               </a:rPr>
               <a:t>Kết luận</a:t>
             </a:r>
-            <a:endParaRPr lang="vi-VN" altLang="en-US" sz="7200" b="1" i="1">
-              <a:solidFill>
-                <a:srgbClr val="2D3880"/>
-              </a:solidFill>
-              <a:latin typeface="Times New Roman" panose="02020603050405020304" charset="0"/>
-              <a:ea typeface="Cormorant Garamond Bold Italics" panose="00000800000000000000"/>
-              <a:cs typeface="Times New Roman" panose="02020603050405020304" charset="0"/>
-              <a:sym typeface="Cormorant Garamond Bold Italics" panose="00000800000000000000"/>
-            </a:endParaRPr>
           </a:p>
         </p:txBody>
       </p:sp>
@@ -8907,10 +8418,10 @@
             </a:pathLst>
           </a:custGeom>
           <a:blipFill>
-            <a:blip r:embed="rId1">
+            <a:blip r:embed="rId2">
               <a:extLst>
                 <a:ext uri="{96DAC541-7B7A-43D3-8B79-37D633B846F1}">
-                  <asvg:svgBlip xmlns:asvg="http://schemas.microsoft.com/office/drawing/2016/SVG/main" r:embed="rId2"/>
+                  <asvg:svgBlip xmlns:asvg="http://schemas.microsoft.com/office/drawing/2016/SVG/main" r:embed="rId3"/>
                 </a:ext>
               </a:extLst>
             </a:blip>
@@ -8959,10 +8470,10 @@
             </a:pathLst>
           </a:custGeom>
           <a:blipFill>
-            <a:blip r:embed="rId1">
+            <a:blip r:embed="rId2">
               <a:extLst>
                 <a:ext uri="{96DAC541-7B7A-43D3-8B79-37D633B846F1}">
-                  <asvg:svgBlip xmlns:asvg="http://schemas.microsoft.com/office/drawing/2016/SVG/main" r:embed="rId2"/>
+                  <asvg:svgBlip xmlns:asvg="http://schemas.microsoft.com/office/drawing/2016/SVG/main" r:embed="rId3"/>
                 </a:ext>
               </a:extLst>
             </a:blip>
@@ -8977,13 +8488,13 @@
   <p:clrMapOvr>
     <a:masterClrMapping/>
   </p:clrMapOvr>
-  <mc:AlternateContent xmlns:mc="http://schemas.openxmlformats.org/markup-compatibility/2006">
-    <mc:Choice xmlns:p14="http://schemas.microsoft.com/office/powerpoint/2010/main" Requires="p14">
-      <p:transition spd="med" p14:dur="750">
+  <mc:AlternateContent xmlns:mc="http://schemas.openxmlformats.org/markup-compatibility/2006" xmlns:p14="http://schemas.microsoft.com/office/powerpoint/2010/main">
+    <mc:Choice Requires="p14">
+      <p:transition spd="med">
         <p:pull/>
       </p:transition>
     </mc:Choice>
-    <mc:Fallback>
+    <mc:Fallback xmlns="">
       <p:transition spd="med">
         <p:pull/>
       </p:transition>
@@ -9016,7 +8527,7 @@
           <p:nvPr/>
         </p:nvGrpSpPr>
         <p:grpSpPr>
-          <a:xfrm rot="0">
+          <a:xfrm>
             <a:off x="0" y="0"/>
             <a:ext cx="6331905" cy="10287000"/>
             <a:chOff x="0" y="0"/>
@@ -9087,6 +8598,7 @@
                   <a:spcPts val="3360"/>
                 </a:lnSpc>
               </a:pPr>
+              <a:endParaRPr/>
             </a:p>
           </p:txBody>
         </p:sp>
@@ -9127,29 +8639,8 @@
                 <a:cs typeface="Times New Roman" panose="02020603050405020304" charset="0"/>
                 <a:sym typeface="Cormorant Garamond Bold Italics" panose="00000800000000000000"/>
               </a:rPr>
-              <a:t>Đề </a:t>
-            </a:r>
-            <a:r>
-              <a:rPr lang="vi-VN" altLang="en-US" sz="8800" b="1" i="1">
-                <a:solidFill>
-                  <a:srgbClr val="FFFFFF"/>
-                </a:solidFill>
-                <a:latin typeface="Times New Roman" panose="02020603050405020304" charset="0"/>
-                <a:ea typeface="Cormorant Garamond Bold Italics" panose="00000800000000000000"/>
-                <a:cs typeface="Times New Roman" panose="02020603050405020304" charset="0"/>
-                <a:sym typeface="Cormorant Garamond Bold Italics" panose="00000800000000000000"/>
-              </a:rPr>
-              <a:t>xuất</a:t>
-            </a:r>
-            <a:endParaRPr lang="vi-VN" altLang="en-US" sz="8800" b="1" i="1">
-              <a:solidFill>
-                <a:srgbClr val="FFFFFF"/>
-              </a:solidFill>
-              <a:latin typeface="Times New Roman" panose="02020603050405020304" charset="0"/>
-              <a:ea typeface="Cormorant Garamond Bold Italics" panose="00000800000000000000"/>
-              <a:cs typeface="Times New Roman" panose="02020603050405020304" charset="0"/>
-              <a:sym typeface="Cormorant Garamond Bold Italics" panose="00000800000000000000"/>
-            </a:endParaRPr>
+              <a:t>Đề xuất</a:t>
+            </a:r>
           </a:p>
         </p:txBody>
       </p:sp>
@@ -9160,7 +8651,7 @@
           <p:nvPr/>
         </p:nvPicPr>
         <p:blipFill>
-          <a:blip r:embed="rId1"/>
+          <a:blip r:embed="rId2"/>
           <a:srcRect b="5926"/>
           <a:stretch>
             <a:fillRect/>
@@ -9195,6 +8686,7 @@
           <a:bodyPr lIns="0" tIns="0" rIns="0" bIns="0" rtlCol="0" anchor="t">
             <a:noAutofit/>
           </a:bodyPr>
+          <a:lstStyle/>
           <a:p>
             <a:pPr marL="0" lvl="0" indent="457200" algn="l">
               <a:lnSpc>
@@ -9211,10 +8703,10 @@
                 <a:cs typeface="Times New Roman" panose="02020603050405020304" charset="0"/>
                 <a:sym typeface="Glacial Indifference"/>
               </a:rPr>
-              <a:t>Dựa vào những giải pháp trên </a:t>
-            </a:r>
-            <a:r>
-              <a:rPr lang="en-US" altLang="en-US" sz="3600">
+              <a:t>Dựa vào những giải pháp trên đưa ra thêm nhiều giải pháp mới hiệu quả hơn, cải tiến hơn, giúp giảm thời gian, công sức, chi phí,… khi muốn thu thập dữ liệu như đánh giá khách hàng, đánh giá người bán, đánh giá hệ thống từ các nền tảng TMĐT</a:t>
+            </a:r>
+            <a:r>
+              <a:rPr lang="vi-VN" altLang="en-US" sz="3600">
                 <a:solidFill>
                   <a:srgbClr val="2D3880"/>
                 </a:solidFill>
@@ -9223,185 +8715,8 @@
                 <a:cs typeface="Times New Roman" panose="02020603050405020304" charset="0"/>
                 <a:sym typeface="Glacial Indifference"/>
               </a:rPr>
-              <a:t>đư</a:t>
-            </a:r>
-            <a:r>
-              <a:rPr lang="en-US" altLang="en-US" sz="3600">
-                <a:solidFill>
-                  <a:srgbClr val="2D3880"/>
-                </a:solidFill>
-                <a:latin typeface="Times New Roman" panose="02020603050405020304" charset="0"/>
-                <a:ea typeface="Glacial Indifference"/>
-                <a:cs typeface="Times New Roman" panose="02020603050405020304" charset="0"/>
-                <a:sym typeface="Glacial Indifference"/>
-              </a:rPr>
-              <a:t>a ra thêm nhiều giải pháp mới hiệu quả hơn, cải tiến hơn, giúp giảm thời gian, công sức, chi phí,… khi muốn thu thập dữ liệu nh</a:t>
-            </a:r>
-            <a:r>
-              <a:rPr lang="en-US" altLang="en-US" sz="3600">
-                <a:solidFill>
-                  <a:srgbClr val="2D3880"/>
-                </a:solidFill>
-                <a:latin typeface="Times New Roman" panose="02020603050405020304" charset="0"/>
-                <a:ea typeface="Glacial Indifference"/>
-                <a:cs typeface="Times New Roman" panose="02020603050405020304" charset="0"/>
-                <a:sym typeface="Glacial Indifference"/>
-              </a:rPr>
-              <a:t>ư</a:t>
-            </a:r>
-            <a:r>
-              <a:rPr lang="en-US" altLang="en-US" sz="3600">
-                <a:solidFill>
-                  <a:srgbClr val="2D3880"/>
-                </a:solidFill>
-                <a:latin typeface="Times New Roman" panose="02020603050405020304" charset="0"/>
-                <a:ea typeface="Glacial Indifference"/>
-                <a:cs typeface="Times New Roman" panose="02020603050405020304" charset="0"/>
-                <a:sym typeface="Glacial Indifference"/>
-              </a:rPr>
-              <a:t> </a:t>
-            </a:r>
-            <a:r>
-              <a:rPr lang="en-US" altLang="en-US" sz="3600">
-                <a:solidFill>
-                  <a:srgbClr val="2D3880"/>
-                </a:solidFill>
-                <a:latin typeface="Times New Roman" panose="02020603050405020304" charset="0"/>
-                <a:ea typeface="Glacial Indifference"/>
-                <a:cs typeface="Times New Roman" panose="02020603050405020304" charset="0"/>
-                <a:sym typeface="Glacial Indifference"/>
-              </a:rPr>
-              <a:t>đ</a:t>
-            </a:r>
-            <a:r>
-              <a:rPr lang="en-US" altLang="en-US" sz="3600">
-                <a:solidFill>
-                  <a:srgbClr val="2D3880"/>
-                </a:solidFill>
-                <a:latin typeface="Times New Roman" panose="02020603050405020304" charset="0"/>
-                <a:ea typeface="Glacial Indifference"/>
-                <a:cs typeface="Times New Roman" panose="02020603050405020304" charset="0"/>
-                <a:sym typeface="Glacial Indifference"/>
-              </a:rPr>
-              <a:t>ánh giá khách hàng, </a:t>
-            </a:r>
-            <a:r>
-              <a:rPr lang="en-US" altLang="en-US" sz="3600">
-                <a:solidFill>
-                  <a:srgbClr val="2D3880"/>
-                </a:solidFill>
-                <a:latin typeface="Times New Roman" panose="02020603050405020304" charset="0"/>
-                <a:ea typeface="Glacial Indifference"/>
-                <a:cs typeface="Times New Roman" panose="02020603050405020304" charset="0"/>
-                <a:sym typeface="Glacial Indifference"/>
-              </a:rPr>
-              <a:t>đ</a:t>
-            </a:r>
-            <a:r>
-              <a:rPr lang="en-US" altLang="en-US" sz="3600">
-                <a:solidFill>
-                  <a:srgbClr val="2D3880"/>
-                </a:solidFill>
-                <a:latin typeface="Times New Roman" panose="02020603050405020304" charset="0"/>
-                <a:ea typeface="Glacial Indifference"/>
-                <a:cs typeface="Times New Roman" panose="02020603050405020304" charset="0"/>
-                <a:sym typeface="Glacial Indifference"/>
-              </a:rPr>
-              <a:t>ánh giá ng</a:t>
-            </a:r>
-            <a:r>
-              <a:rPr lang="en-US" altLang="en-US" sz="3600">
-                <a:solidFill>
-                  <a:srgbClr val="2D3880"/>
-                </a:solidFill>
-                <a:latin typeface="Times New Roman" panose="02020603050405020304" charset="0"/>
-                <a:ea typeface="Glacial Indifference"/>
-                <a:cs typeface="Times New Roman" panose="02020603050405020304" charset="0"/>
-                <a:sym typeface="Glacial Indifference"/>
-              </a:rPr>
-              <a:t>ư</a:t>
-            </a:r>
-            <a:r>
-              <a:rPr lang="en-US" altLang="en-US" sz="3600">
-                <a:solidFill>
-                  <a:srgbClr val="2D3880"/>
-                </a:solidFill>
-                <a:latin typeface="Times New Roman" panose="02020603050405020304" charset="0"/>
-                <a:ea typeface="Glacial Indifference"/>
-                <a:cs typeface="Times New Roman" panose="02020603050405020304" charset="0"/>
-                <a:sym typeface="Glacial Indifference"/>
-              </a:rPr>
-              <a:t>ời bán, </a:t>
-            </a:r>
-            <a:r>
-              <a:rPr lang="en-US" altLang="en-US" sz="3600">
-                <a:solidFill>
-                  <a:srgbClr val="2D3880"/>
-                </a:solidFill>
-                <a:latin typeface="Times New Roman" panose="02020603050405020304" charset="0"/>
-                <a:ea typeface="Glacial Indifference"/>
-                <a:cs typeface="Times New Roman" panose="02020603050405020304" charset="0"/>
-                <a:sym typeface="Glacial Indifference"/>
-              </a:rPr>
-              <a:t>đ</a:t>
-            </a:r>
-            <a:r>
-              <a:rPr lang="en-US" altLang="en-US" sz="3600">
-                <a:solidFill>
-                  <a:srgbClr val="2D3880"/>
-                </a:solidFill>
-                <a:latin typeface="Times New Roman" panose="02020603050405020304" charset="0"/>
-                <a:ea typeface="Glacial Indifference"/>
-                <a:cs typeface="Times New Roman" panose="02020603050405020304" charset="0"/>
-                <a:sym typeface="Glacial Indifference"/>
-              </a:rPr>
-              <a:t>ánh giá hệ thống từ các nền tảng TM</a:t>
-            </a:r>
-            <a:r>
-              <a:rPr lang="en-US" altLang="en-US" sz="3600">
-                <a:solidFill>
-                  <a:srgbClr val="2D3880"/>
-                </a:solidFill>
-                <a:latin typeface="Times New Roman" panose="02020603050405020304" charset="0"/>
-                <a:ea typeface="Glacial Indifference"/>
-                <a:cs typeface="Times New Roman" panose="02020603050405020304" charset="0"/>
-                <a:sym typeface="Glacial Indifference"/>
-              </a:rPr>
-              <a:t>Đ</a:t>
-            </a:r>
-            <a:r>
-              <a:rPr lang="en-US" altLang="en-US" sz="3600">
-                <a:solidFill>
-                  <a:srgbClr val="2D3880"/>
-                </a:solidFill>
-                <a:latin typeface="Times New Roman" panose="02020603050405020304" charset="0"/>
-                <a:ea typeface="Glacial Indifference"/>
-                <a:cs typeface="Times New Roman" panose="02020603050405020304" charset="0"/>
-                <a:sym typeface="Glacial Indifference"/>
-              </a:rPr>
-              <a:t>T</a:t>
-            </a:r>
-            <a:r>
-              <a:rPr lang="vi-VN" altLang="en-US" sz="3600">
-                <a:solidFill>
-                  <a:srgbClr val="2D3880"/>
-                </a:solidFill>
-                <a:latin typeface="Times New Roman" panose="02020603050405020304" charset="0"/>
-                <a:ea typeface="Glacial Indifference"/>
-                <a:cs typeface="Times New Roman" panose="02020603050405020304" charset="0"/>
-                <a:sym typeface="Glacial Indifference"/>
-              </a:rPr>
               <a:t>.</a:t>
             </a:r>
-            <a:endParaRPr lang="vi-VN" altLang="en-US" sz="3600">
-              <a:solidFill>
-                <a:srgbClr val="2D3880"/>
-              </a:solidFill>
-              <a:latin typeface="Times New Roman" panose="02020603050405020304" charset="0"/>
-              <a:ea typeface="Glacial Indifference"/>
-              <a:cs typeface="Times New Roman" panose="02020603050405020304" charset="0"/>
-              <a:sym typeface="Glacial Indifference"/>
-            </a:endParaRPr>
           </a:p>
         </p:txBody>
       </p:sp>
@@ -9410,13 +8725,13 @@
   <p:clrMapOvr>
     <a:masterClrMapping/>
   </p:clrMapOvr>
-  <mc:AlternateContent xmlns:mc="http://schemas.openxmlformats.org/markup-compatibility/2006">
-    <mc:Choice xmlns:p14="http://schemas.microsoft.com/office/powerpoint/2010/main" Requires="p14">
-      <p:transition spd="med" p14:dur="750">
+  <mc:AlternateContent xmlns:mc="http://schemas.openxmlformats.org/markup-compatibility/2006" xmlns:p14="http://schemas.microsoft.com/office/powerpoint/2010/main">
+    <mc:Choice Requires="p14">
+      <p:transition spd="med">
         <p:pull/>
       </p:transition>
     </mc:Choice>
-    <mc:Fallback>
+    <mc:Fallback xmlns="">
       <p:transition spd="med">
         <p:pull/>
       </p:transition>
@@ -9481,10 +8796,10 @@
             </a:pathLst>
           </a:custGeom>
           <a:blipFill>
-            <a:blip r:embed="rId1">
+            <a:blip r:embed="rId2">
               <a:extLst>
                 <a:ext uri="{96DAC541-7B7A-43D3-8B79-37D633B846F1}">
-                  <asvg:svgBlip xmlns:asvg="http://schemas.microsoft.com/office/drawing/2016/SVG/main" r:embed="rId2"/>
+                  <asvg:svgBlip xmlns:asvg="http://schemas.microsoft.com/office/drawing/2016/SVG/main" r:embed="rId3"/>
                 </a:ext>
               </a:extLst>
             </a:blip>
@@ -9532,15 +8847,6 @@
               </a:rPr>
               <a:t>DEMO</a:t>
             </a:r>
-            <a:endParaRPr lang="en-US" sz="23205" b="1" i="1">
-              <a:solidFill>
-                <a:srgbClr val="2D3880"/>
-              </a:solidFill>
-              <a:latin typeface="Cormorant Garamond Bold Italics" panose="00000800000000000000"/>
-              <a:ea typeface="Cormorant Garamond Bold Italics" panose="00000800000000000000"/>
-              <a:cs typeface="Cormorant Garamond Bold Italics" panose="00000800000000000000"/>
-              <a:sym typeface="Cormorant Garamond Bold Italics" panose="00000800000000000000"/>
-            </a:endParaRPr>
           </a:p>
         </p:txBody>
       </p:sp>
@@ -9583,10 +8889,10 @@
             </a:pathLst>
           </a:custGeom>
           <a:blipFill>
-            <a:blip r:embed="rId1">
+            <a:blip r:embed="rId2">
               <a:extLst>
                 <a:ext uri="{96DAC541-7B7A-43D3-8B79-37D633B846F1}">
-                  <asvg:svgBlip xmlns:asvg="http://schemas.microsoft.com/office/drawing/2016/SVG/main" r:embed="rId2"/>
+                  <asvg:svgBlip xmlns:asvg="http://schemas.microsoft.com/office/drawing/2016/SVG/main" r:embed="rId3"/>
                 </a:ext>
               </a:extLst>
             </a:blip>
@@ -9601,13 +8907,13 @@
   <p:clrMapOvr>
     <a:masterClrMapping/>
   </p:clrMapOvr>
-  <mc:AlternateContent xmlns:mc="http://schemas.openxmlformats.org/markup-compatibility/2006">
-    <mc:Choice xmlns:p14="http://schemas.microsoft.com/office/powerpoint/2010/main" Requires="p14">
+  <mc:AlternateContent xmlns:mc="http://schemas.openxmlformats.org/markup-compatibility/2006" xmlns:p14="http://schemas.microsoft.com/office/powerpoint/2010/main">
+    <mc:Choice Requires="p14">
       <p:transition spd="slow" p14:dur="1500">
         <p:split orient="vert" dir="in"/>
       </p:transition>
     </mc:Choice>
-    <mc:Fallback>
+    <mc:Fallback xmlns="">
       <p:transition spd="slow">
         <p:split orient="vert" dir="in"/>
       </p:transition>
@@ -9672,10 +8978,10 @@
             </a:pathLst>
           </a:custGeom>
           <a:blipFill>
-            <a:blip r:embed="rId1">
+            <a:blip r:embed="rId2">
               <a:extLst>
                 <a:ext uri="{96DAC541-7B7A-43D3-8B79-37D633B846F1}">
-                  <asvg:svgBlip xmlns:asvg="http://schemas.microsoft.com/office/drawing/2016/SVG/main" r:embed="rId2"/>
+                  <asvg:svgBlip xmlns:asvg="http://schemas.microsoft.com/office/drawing/2016/SVG/main" r:embed="rId3"/>
                 </a:ext>
               </a:extLst>
             </a:blip>
@@ -9724,10 +9030,10 @@
             </a:pathLst>
           </a:custGeom>
           <a:blipFill>
-            <a:blip r:embed="rId3">
+            <a:blip r:embed="rId4">
               <a:extLst>
                 <a:ext uri="{96DAC541-7B7A-43D3-8B79-37D633B846F1}">
-                  <asvg:svgBlip xmlns:asvg="http://schemas.microsoft.com/office/drawing/2016/SVG/main" r:embed="rId4"/>
+                  <asvg:svgBlip xmlns:asvg="http://schemas.microsoft.com/office/drawing/2016/SVG/main" r:embed="rId5"/>
                 </a:ext>
               </a:extLst>
             </a:blip>
@@ -9744,7 +9050,7 @@
           <p:nvPr/>
         </p:nvGrpSpPr>
         <p:grpSpPr>
-          <a:xfrm rot="0">
+          <a:xfrm>
             <a:off x="5332188" y="2466285"/>
             <a:ext cx="8095674" cy="770455"/>
             <a:chOff x="0" y="0"/>
@@ -9838,6 +9144,7 @@
                   <a:spcPts val="3360"/>
                 </a:lnSpc>
               </a:pPr>
+              <a:endParaRPr/>
             </a:p>
           </p:txBody>
         </p:sp>
@@ -9849,7 +9156,7 @@
           <p:nvPr/>
         </p:nvGrpSpPr>
         <p:grpSpPr>
-          <a:xfrm rot="0">
+          <a:xfrm>
             <a:off x="4860139" y="2459452"/>
             <a:ext cx="795621" cy="877927"/>
             <a:chOff x="0" y="0"/>
@@ -9938,15 +9245,6 @@
                 </a:rPr>
                 <a:t>01</a:t>
               </a:r>
-              <a:endParaRPr lang="en-US" sz="2400" b="1">
-                <a:solidFill>
-                  <a:srgbClr val="FFFFFF"/>
-                </a:solidFill>
-                <a:latin typeface="Times New Roman" panose="02020603050405020304" charset="0"/>
-                <a:ea typeface="Glacial Indifference Bold" panose="00000800000000000000"/>
-                <a:cs typeface="Times New Roman" panose="02020603050405020304" charset="0"/>
-                <a:sym typeface="Glacial Indifference Bold" panose="00000800000000000000"/>
-              </a:endParaRPr>
             </a:p>
           </p:txBody>
         </p:sp>
@@ -9958,7 +9256,7 @@
           <p:nvPr/>
         </p:nvGrpSpPr>
         <p:grpSpPr>
-          <a:xfrm rot="0">
+          <a:xfrm>
             <a:off x="5332188" y="6956107"/>
             <a:ext cx="8095674" cy="770455"/>
             <a:chOff x="0" y="0"/>
@@ -10052,6 +9350,7 @@
                   <a:spcPts val="3360"/>
                 </a:lnSpc>
               </a:pPr>
+              <a:endParaRPr/>
             </a:p>
           </p:txBody>
         </p:sp>
@@ -10063,7 +9362,7 @@
           <p:nvPr/>
         </p:nvGrpSpPr>
         <p:grpSpPr>
-          <a:xfrm rot="0">
+          <a:xfrm>
             <a:off x="4860139" y="6940472"/>
             <a:ext cx="795621" cy="877927"/>
             <a:chOff x="0" y="0"/>
@@ -10152,15 +9451,6 @@
                 </a:rPr>
                 <a:t>04</a:t>
               </a:r>
-              <a:endParaRPr lang="en-US" sz="2400" b="1">
-                <a:solidFill>
-                  <a:srgbClr val="FFFFFF"/>
-                </a:solidFill>
-                <a:latin typeface="Times New Roman" panose="02020603050405020304" charset="0"/>
-                <a:ea typeface="Glacial Indifference Bold" panose="00000800000000000000"/>
-                <a:cs typeface="Times New Roman" panose="02020603050405020304" charset="0"/>
-                <a:sym typeface="Glacial Indifference Bold" panose="00000800000000000000"/>
-              </a:endParaRPr>
             </a:p>
           </p:txBody>
         </p:sp>
@@ -10172,7 +9462,7 @@
           <p:nvPr/>
         </p:nvGrpSpPr>
         <p:grpSpPr>
-          <a:xfrm rot="0">
+          <a:xfrm>
             <a:off x="5332188" y="5444073"/>
             <a:ext cx="8095674" cy="770455"/>
             <a:chOff x="0" y="0"/>
@@ -10266,6 +9556,7 @@
                   <a:spcPts val="3360"/>
                 </a:lnSpc>
               </a:pPr>
+              <a:endParaRPr/>
             </a:p>
           </p:txBody>
         </p:sp>
@@ -10277,7 +9568,7 @@
           <p:nvPr/>
         </p:nvGrpSpPr>
         <p:grpSpPr>
-          <a:xfrm rot="0">
+          <a:xfrm>
             <a:off x="4860139" y="5419934"/>
             <a:ext cx="795621" cy="877927"/>
             <a:chOff x="0" y="0"/>
@@ -10366,15 +9657,6 @@
                 </a:rPr>
                 <a:t>03</a:t>
               </a:r>
-              <a:endParaRPr lang="en-US" sz="2400" b="1">
-                <a:solidFill>
-                  <a:srgbClr val="FFFFFF"/>
-                </a:solidFill>
-                <a:latin typeface="Times New Roman" panose="02020603050405020304" charset="0"/>
-                <a:ea typeface="Glacial Indifference Bold" panose="00000800000000000000"/>
-                <a:cs typeface="Times New Roman" panose="02020603050405020304" charset="0"/>
-                <a:sym typeface="Glacial Indifference Bold" panose="00000800000000000000"/>
-              </a:endParaRPr>
             </a:p>
           </p:txBody>
         </p:sp>
@@ -10386,7 +9668,7 @@
           <p:nvPr/>
         </p:nvGrpSpPr>
         <p:grpSpPr>
-          <a:xfrm rot="0">
+          <a:xfrm>
             <a:off x="5332188" y="3908879"/>
             <a:ext cx="8095674" cy="770455"/>
             <a:chOff x="0" y="0"/>
@@ -10480,6 +9762,7 @@
                   <a:spcPts val="3360"/>
                 </a:lnSpc>
               </a:pPr>
+              <a:endParaRPr/>
             </a:p>
           </p:txBody>
         </p:sp>
@@ -10491,7 +9774,7 @@
           <p:nvPr/>
         </p:nvGrpSpPr>
         <p:grpSpPr>
-          <a:xfrm rot="0">
+          <a:xfrm>
             <a:off x="4860139" y="3899396"/>
             <a:ext cx="795621" cy="877927"/>
             <a:chOff x="0" y="0"/>
@@ -10580,15 +9863,6 @@
                 </a:rPr>
                 <a:t>02</a:t>
               </a:r>
-              <a:endParaRPr lang="en-US" sz="2400" b="1">
-                <a:solidFill>
-                  <a:srgbClr val="FFFFFF"/>
-                </a:solidFill>
-                <a:latin typeface="Times New Roman" panose="02020603050405020304" charset="0"/>
-                <a:ea typeface="Glacial Indifference Bold" panose="00000800000000000000"/>
-                <a:cs typeface="Times New Roman" panose="02020603050405020304" charset="0"/>
-                <a:sym typeface="Glacial Indifference Bold" panose="00000800000000000000"/>
-              </a:endParaRPr>
             </a:p>
           </p:txBody>
         </p:sp>
@@ -10634,15 +9908,6 @@
               </a:rPr>
               <a:t>Nội dung chính</a:t>
             </a:r>
-            <a:endParaRPr lang="en-US" sz="7200" b="1" i="1">
-              <a:solidFill>
-                <a:srgbClr val="2D3880"/>
-              </a:solidFill>
-              <a:latin typeface="Cormorant Garamond Bold Italics" panose="00000800000000000000"/>
-              <a:ea typeface="Cormorant Garamond Bold Italics" panose="00000800000000000000"/>
-              <a:cs typeface="Cormorant Garamond Bold Italics" panose="00000800000000000000"/>
-              <a:sym typeface="Cormorant Garamond Bold Italics" panose="00000800000000000000"/>
-            </a:endParaRPr>
           </a:p>
         </p:txBody>
       </p:sp>
@@ -10684,15 +9949,6 @@
               </a:rPr>
               <a:t>Giới thiệu </a:t>
             </a:r>
-            <a:endParaRPr lang="en-US" sz="3600" b="1">
-              <a:solidFill>
-                <a:srgbClr val="2D3880"/>
-              </a:solidFill>
-              <a:latin typeface="Times New Roman" panose="02020603050405020304" charset="0"/>
-              <a:ea typeface="Glacial Indifference"/>
-              <a:cs typeface="Times New Roman" panose="02020603050405020304" charset="0"/>
-              <a:sym typeface="Glacial Indifference"/>
-            </a:endParaRPr>
           </a:p>
         </p:txBody>
       </p:sp>
@@ -10734,15 +9990,6 @@
               </a:rPr>
               <a:t>Nghiên cứu lý thuyết</a:t>
             </a:r>
-            <a:endParaRPr lang="en-US" sz="3600" b="1">
-              <a:solidFill>
-                <a:srgbClr val="2D3880"/>
-              </a:solidFill>
-              <a:latin typeface="Times New Roman" panose="02020603050405020304" charset="0"/>
-              <a:ea typeface="Glacial Indifference"/>
-              <a:cs typeface="Times New Roman" panose="02020603050405020304" charset="0"/>
-              <a:sym typeface="Glacial Indifference"/>
-            </a:endParaRPr>
           </a:p>
         </p:txBody>
       </p:sp>
@@ -10796,15 +10043,6 @@
               </a:rPr>
               <a:t>quả</a:t>
             </a:r>
-            <a:endParaRPr lang="vi-VN" altLang="en-US" sz="3600" b="1">
-              <a:solidFill>
-                <a:srgbClr val="2D3880"/>
-              </a:solidFill>
-              <a:latin typeface="Times New Roman" panose="02020603050405020304" charset="0"/>
-              <a:ea typeface="Glacial Indifference"/>
-              <a:cs typeface="Times New Roman" panose="02020603050405020304" charset="0"/>
-              <a:sym typeface="Glacial Indifference"/>
-            </a:endParaRPr>
           </a:p>
         </p:txBody>
       </p:sp>
@@ -10882,15 +10120,6 @@
               </a:rPr>
               <a:t> xuất</a:t>
             </a:r>
-            <a:endParaRPr lang="en-US" sz="3600" b="1">
-              <a:solidFill>
-                <a:srgbClr val="2D3880"/>
-              </a:solidFill>
-              <a:latin typeface="Times New Roman" panose="02020603050405020304" charset="0"/>
-              <a:ea typeface="Glacial Indifference"/>
-              <a:cs typeface="Times New Roman" panose="02020603050405020304" charset="0"/>
-              <a:sym typeface="Glacial Indifference"/>
-            </a:endParaRPr>
           </a:p>
         </p:txBody>
       </p:sp>
@@ -10901,7 +10130,7 @@
           <p:nvPr/>
         </p:nvGrpSpPr>
         <p:grpSpPr>
-          <a:xfrm rot="0">
+          <a:xfrm>
             <a:off x="5295944" y="8472209"/>
             <a:ext cx="8095674" cy="770455"/>
             <a:chOff x="0" y="0"/>
@@ -10995,6 +10224,7 @@
                   <a:spcPts val="3360"/>
                 </a:lnSpc>
               </a:pPr>
+              <a:endParaRPr/>
             </a:p>
           </p:txBody>
         </p:sp>
@@ -11006,7 +10236,7 @@
           <p:nvPr/>
         </p:nvGrpSpPr>
         <p:grpSpPr>
-          <a:xfrm rot="0">
+          <a:xfrm>
             <a:off x="4823895" y="8456573"/>
             <a:ext cx="795621" cy="877927"/>
             <a:chOff x="0" y="0"/>
@@ -11095,15 +10325,6 @@
                 </a:rPr>
                 <a:t>05</a:t>
               </a:r>
-              <a:endParaRPr lang="en-US" sz="2400" b="1">
-                <a:solidFill>
-                  <a:srgbClr val="FFFFFF"/>
-                </a:solidFill>
-                <a:latin typeface="Times New Roman" panose="02020603050405020304" charset="0"/>
-                <a:ea typeface="Glacial Indifference Bold" panose="00000800000000000000"/>
-                <a:cs typeface="Times New Roman" panose="02020603050405020304" charset="0"/>
-                <a:sym typeface="Glacial Indifference Bold" panose="00000800000000000000"/>
-              </a:endParaRPr>
             </a:p>
           </p:txBody>
         </p:sp>
@@ -11146,15 +10367,6 @@
               </a:rPr>
               <a:t>Demo</a:t>
             </a:r>
-            <a:endParaRPr lang="en-US" sz="3600" b="1">
-              <a:solidFill>
-                <a:srgbClr val="2D3880"/>
-              </a:solidFill>
-              <a:latin typeface="Times New Roman" panose="02020603050405020304" charset="0"/>
-              <a:ea typeface="Glacial Indifference"/>
-              <a:cs typeface="Times New Roman" panose="02020603050405020304" charset="0"/>
-              <a:sym typeface="Glacial Indifference"/>
-            </a:endParaRPr>
           </a:p>
         </p:txBody>
       </p:sp>
@@ -11163,13 +10375,13 @@
   <p:clrMapOvr>
     <a:masterClrMapping/>
   </p:clrMapOvr>
-  <mc:AlternateContent xmlns:mc="http://schemas.openxmlformats.org/markup-compatibility/2006">
-    <mc:Choice xmlns:p14="http://schemas.microsoft.com/office/powerpoint/2010/main" Requires="p14">
-      <p:transition spd="slow" p14:dur="1000">
+  <mc:AlternateContent xmlns:mc="http://schemas.openxmlformats.org/markup-compatibility/2006" xmlns:p14="http://schemas.microsoft.com/office/powerpoint/2010/main">
+    <mc:Choice Requires="p14">
+      <p:transition spd="slow">
         <p:wipe/>
       </p:transition>
     </mc:Choice>
-    <mc:Fallback>
+    <mc:Fallback xmlns="">
       <p:transition spd="slow">
         <p:wipe/>
       </p:transition>
@@ -11202,7 +10414,7 @@
           <p:nvPr/>
         </p:nvGrpSpPr>
         <p:grpSpPr>
-          <a:xfrm rot="0">
+          <a:xfrm>
             <a:off x="10668000" y="664210"/>
             <a:ext cx="7259320" cy="9122410"/>
             <a:chOff x="0" y="0"/>
@@ -11273,6 +10485,7 @@
                   <a:spcPts val="3010"/>
                 </a:lnSpc>
               </a:pPr>
+              <a:endParaRPr/>
             </a:p>
           </p:txBody>
         </p:sp>
@@ -11318,15 +10531,6 @@
               </a:rPr>
               <a:t>Giới thiệu</a:t>
             </a:r>
-            <a:endParaRPr lang="en-US" sz="10800" b="1" i="1">
-              <a:solidFill>
-                <a:srgbClr val="2D3880"/>
-              </a:solidFill>
-              <a:latin typeface="Cormorant Garamond Bold Italics" panose="00000800000000000000"/>
-              <a:ea typeface="Cormorant Garamond Bold Italics" panose="00000800000000000000"/>
-              <a:cs typeface="Cormorant Garamond Bold Italics" panose="00000800000000000000"/>
-              <a:sym typeface="Cormorant Garamond Bold Italics" panose="00000800000000000000"/>
-            </a:endParaRPr>
           </a:p>
         </p:txBody>
       </p:sp>
@@ -11337,7 +10541,7 @@
           <p:nvPr/>
         </p:nvPicPr>
         <p:blipFill>
-          <a:blip r:embed="rId1"/>
+          <a:blip r:embed="rId2"/>
           <a:stretch>
             <a:fillRect/>
           </a:stretch>
@@ -11391,10 +10595,10 @@
             </a:pathLst>
           </a:custGeom>
           <a:blipFill>
-            <a:blip r:embed="rId2">
+            <a:blip r:embed="rId3">
               <a:extLst>
                 <a:ext uri="{96DAC541-7B7A-43D3-8B79-37D633B846F1}">
-                  <asvg:svgBlip xmlns:asvg="http://schemas.microsoft.com/office/drawing/2016/SVG/main" r:embed="rId3"/>
+                  <asvg:svgBlip xmlns:asvg="http://schemas.microsoft.com/office/drawing/2016/SVG/main" r:embed="rId4"/>
                 </a:ext>
               </a:extLst>
             </a:blip>
@@ -11409,13 +10613,13 @@
   <p:clrMapOvr>
     <a:masterClrMapping/>
   </p:clrMapOvr>
-  <mc:AlternateContent xmlns:mc="http://schemas.openxmlformats.org/markup-compatibility/2006">
-    <mc:Choice xmlns:p14="http://schemas.microsoft.com/office/powerpoint/2010/main" Requires="p14">
-      <p:transition spd="med" p14:dur="750">
+  <mc:AlternateContent xmlns:mc="http://schemas.openxmlformats.org/markup-compatibility/2006" xmlns:p14="http://schemas.microsoft.com/office/powerpoint/2010/main">
+    <mc:Choice Requires="p14">
+      <p:transition spd="med">
         <p:pull/>
       </p:transition>
     </mc:Choice>
-    <mc:Fallback>
+    <mc:Fallback xmlns="">
       <p:transition spd="med">
         <p:pull/>
       </p:transition>
@@ -11482,15 +10686,6 @@
               </a:rPr>
               <a:t>Lí do chọn đề tài</a:t>
             </a:r>
-            <a:endParaRPr lang="en-US" sz="7200" b="1" i="1">
-              <a:solidFill>
-                <a:srgbClr val="2D3880"/>
-              </a:solidFill>
-              <a:latin typeface="Cormorant Garamond Bold Italics" panose="00000800000000000000"/>
-              <a:ea typeface="Cormorant Garamond Bold Italics" panose="00000800000000000000"/>
-              <a:cs typeface="Cormorant Garamond Bold Italics" panose="00000800000000000000"/>
-              <a:sym typeface="Cormorant Garamond Bold Italics" panose="00000800000000000000"/>
-            </a:endParaRPr>
           </a:p>
         </p:txBody>
       </p:sp>
@@ -11532,15 +10727,6 @@
               </a:rPr>
               <a:t>Với sự phát triển về công nghệ hóa hiện nay, Thương mại điện tử đã trở thành một phần không thể thiếu trong cuộc sống hằng ngày, đặt biệt là trong lĩnh vực kinh tế. </a:t>
             </a:r>
-            <a:endParaRPr lang="en-US" sz="3600">
-              <a:solidFill>
-                <a:srgbClr val="2D3880"/>
-              </a:solidFill>
-              <a:latin typeface="Times New Roman" panose="02020603050405020304" charset="0"/>
-              <a:ea typeface="Glacial Indifference"/>
-              <a:cs typeface="Times New Roman" panose="02020603050405020304" charset="0"/>
-              <a:sym typeface="Glacial Indifference"/>
-            </a:endParaRPr>
           </a:p>
           <a:p>
             <a:pPr indent="0" algn="l">
@@ -11598,15 +10784,6 @@
               </a:rPr>
               <a:t>ự dụng API để thu thập dữ liệu giúp tiết kiệm thời gian và công sức.</a:t>
             </a:r>
-            <a:endParaRPr lang="en-US" sz="3600">
-              <a:solidFill>
-                <a:srgbClr val="2D3880"/>
-              </a:solidFill>
-              <a:latin typeface="Times New Roman" panose="02020603050405020304" charset="0"/>
-              <a:ea typeface="Glacial Indifference"/>
-              <a:cs typeface="Times New Roman" panose="02020603050405020304" charset="0"/>
-              <a:sym typeface="Glacial Indifference"/>
-            </a:endParaRPr>
           </a:p>
         </p:txBody>
       </p:sp>
@@ -11617,7 +10794,7 @@
           <p:nvPr/>
         </p:nvPicPr>
         <p:blipFill>
-          <a:blip r:embed="rId1"/>
+          <a:blip r:embed="rId2"/>
           <a:stretch>
             <a:fillRect/>
           </a:stretch>
@@ -11637,13 +10814,13 @@
   <p:clrMapOvr>
     <a:masterClrMapping/>
   </p:clrMapOvr>
-  <mc:AlternateContent xmlns:mc="http://schemas.openxmlformats.org/markup-compatibility/2006">
-    <mc:Choice xmlns:p14="http://schemas.microsoft.com/office/powerpoint/2010/main" Requires="p14">
-      <p:transition spd="med" p14:dur="750">
+  <mc:AlternateContent xmlns:mc="http://schemas.openxmlformats.org/markup-compatibility/2006" xmlns:p14="http://schemas.microsoft.com/office/powerpoint/2010/main">
+    <mc:Choice Requires="p14">
+      <p:transition spd="med">
         <p:pull/>
       </p:transition>
     </mc:Choice>
-    <mc:Fallback>
+    <mc:Fallback xmlns="">
       <p:transition spd="med">
         <p:pull/>
       </p:transition>
@@ -11708,10 +10885,10 @@
             </a:pathLst>
           </a:custGeom>
           <a:blipFill>
-            <a:blip r:embed="rId1">
+            <a:blip r:embed="rId2">
               <a:extLst>
                 <a:ext uri="{96DAC541-7B7A-43D3-8B79-37D633B846F1}">
-                  <asvg:svgBlip xmlns:asvg="http://schemas.microsoft.com/office/drawing/2016/SVG/main" r:embed="rId2"/>
+                  <asvg:svgBlip xmlns:asvg="http://schemas.microsoft.com/office/drawing/2016/SVG/main" r:embed="rId3"/>
                 </a:ext>
               </a:extLst>
             </a:blip>
@@ -11762,15 +10939,6 @@
               </a:rPr>
               <a:t>Mục đích nghiên cứu</a:t>
             </a:r>
-            <a:endParaRPr lang="en-US" sz="7700" b="1" i="1">
-              <a:solidFill>
-                <a:srgbClr val="2D3880"/>
-              </a:solidFill>
-              <a:latin typeface="Cormorant Garamond Bold Italics" panose="00000800000000000000"/>
-              <a:ea typeface="Cormorant Garamond Bold Italics" panose="00000800000000000000"/>
-              <a:cs typeface="Cormorant Garamond Bold Italics" panose="00000800000000000000"/>
-              <a:sym typeface="Cormorant Garamond Bold Italics" panose="00000800000000000000"/>
-            </a:endParaRPr>
           </a:p>
         </p:txBody>
       </p:sp>
@@ -11814,15 +10982,6 @@
               </a:rPr>
               <a:t>Hiểu rõ về API và các giải pháp thu thập dữ liệu</a:t>
             </a:r>
-            <a:endParaRPr lang="en-US" sz="4700">
-              <a:solidFill>
-                <a:srgbClr val="2D3880"/>
-              </a:solidFill>
-              <a:latin typeface="Times New Roman" panose="02020603050405020304" charset="0"/>
-              <a:ea typeface="Glacial Indifference"/>
-              <a:cs typeface="Times New Roman" panose="02020603050405020304" charset="0"/>
-              <a:sym typeface="Glacial Indifference"/>
-            </a:endParaRPr>
           </a:p>
           <a:p>
             <a:pPr marL="1014730" lvl="1" indent="-507365" algn="l">
@@ -11844,15 +11003,6 @@
               </a:rPr>
               <a:t>Thực hiện các giải pháp thu thập dữ liệu</a:t>
             </a:r>
-            <a:endParaRPr lang="en-US" sz="4700">
-              <a:solidFill>
-                <a:srgbClr val="2D3880"/>
-              </a:solidFill>
-              <a:latin typeface="Times New Roman" panose="02020603050405020304" charset="0"/>
-              <a:ea typeface="Glacial Indifference"/>
-              <a:cs typeface="Times New Roman" panose="02020603050405020304" charset="0"/>
-              <a:sym typeface="Glacial Indifference"/>
-            </a:endParaRPr>
           </a:p>
           <a:p>
             <a:pPr marL="1014730" lvl="1" indent="-507365" algn="l">
@@ -11874,15 +11024,6 @@
               </a:rPr>
               <a:t>Đánh giá hiệu quả của các giải pháp</a:t>
             </a:r>
-            <a:endParaRPr lang="en-US" sz="4700">
-              <a:solidFill>
-                <a:srgbClr val="2D3880"/>
-              </a:solidFill>
-              <a:latin typeface="Times New Roman" panose="02020603050405020304" charset="0"/>
-              <a:ea typeface="Glacial Indifference"/>
-              <a:cs typeface="Times New Roman" panose="02020603050405020304" charset="0"/>
-              <a:sym typeface="Glacial Indifference"/>
-            </a:endParaRPr>
           </a:p>
         </p:txBody>
       </p:sp>
@@ -11893,7 +11034,7 @@
           <p:nvPr/>
         </p:nvPicPr>
         <p:blipFill>
-          <a:blip r:embed="rId3"/>
+          <a:blip r:embed="rId4"/>
           <a:srcRect l="13540" r="13438"/>
           <a:stretch>
             <a:fillRect/>
@@ -11914,13 +11055,13 @@
   <p:clrMapOvr>
     <a:masterClrMapping/>
   </p:clrMapOvr>
-  <mc:AlternateContent xmlns:mc="http://schemas.openxmlformats.org/markup-compatibility/2006">
-    <mc:Choice xmlns:p14="http://schemas.microsoft.com/office/powerpoint/2010/main" Requires="p14">
-      <p:transition spd="med" p14:dur="750">
+  <mc:AlternateContent xmlns:mc="http://schemas.openxmlformats.org/markup-compatibility/2006" xmlns:p14="http://schemas.microsoft.com/office/powerpoint/2010/main">
+    <mc:Choice Requires="p14">
+      <p:transition spd="med">
         <p:pull/>
       </p:transition>
     </mc:Choice>
-    <mc:Fallback>
+    <mc:Fallback xmlns="">
       <p:transition spd="med">
         <p:pull/>
       </p:transition>
@@ -11953,7 +11094,7 @@
           <p:nvPr/>
         </p:nvGrpSpPr>
         <p:grpSpPr>
-          <a:xfrm rot="0">
+          <a:xfrm>
             <a:off x="10668000" y="664210"/>
             <a:ext cx="7259320" cy="9122410"/>
             <a:chOff x="0" y="0"/>
@@ -12024,6 +11165,7 @@
                   <a:spcPts val="3010"/>
                 </a:lnSpc>
               </a:pPr>
+              <a:endParaRPr/>
             </a:p>
           </p:txBody>
         </p:sp>
@@ -12072,15 +11214,6 @@
               </a:rPr>
               <a:t>Nghiên cứu lý thuyết</a:t>
             </a:r>
-            <a:endParaRPr lang="vi-VN" altLang="en-US" sz="10800" b="1" i="1">
-              <a:solidFill>
-                <a:srgbClr val="2D3880"/>
-              </a:solidFill>
-              <a:latin typeface="Times New Roman" panose="02020603050405020304" charset="0"/>
-              <a:ea typeface="Cormorant Garamond Bold Italics" panose="00000800000000000000"/>
-              <a:cs typeface="Times New Roman" panose="02020603050405020304" charset="0"/>
-              <a:sym typeface="Cormorant Garamond Bold Italics" panose="00000800000000000000"/>
-            </a:endParaRPr>
           </a:p>
         </p:txBody>
       </p:sp>
@@ -12123,10 +11256,10 @@
             </a:pathLst>
           </a:custGeom>
           <a:blipFill>
-            <a:blip r:embed="rId1">
+            <a:blip r:embed="rId2">
               <a:extLst>
                 <a:ext uri="{96DAC541-7B7A-43D3-8B79-37D633B846F1}">
-                  <asvg:svgBlip xmlns:asvg="http://schemas.microsoft.com/office/drawing/2016/SVG/main" r:embed="rId2"/>
+                  <asvg:svgBlip xmlns:asvg="http://schemas.microsoft.com/office/drawing/2016/SVG/main" r:embed="rId3"/>
                 </a:ext>
               </a:extLst>
             </a:blip>
@@ -12143,7 +11276,7 @@
           <p:nvPr/>
         </p:nvPicPr>
         <p:blipFill>
-          <a:blip r:embed="rId3"/>
+          <a:blip r:embed="rId4"/>
           <a:stretch>
             <a:fillRect/>
           </a:stretch>
@@ -12163,13 +11296,13 @@
   <p:clrMapOvr>
     <a:masterClrMapping/>
   </p:clrMapOvr>
-  <mc:AlternateContent xmlns:mc="http://schemas.openxmlformats.org/markup-compatibility/2006">
-    <mc:Choice xmlns:p14="http://schemas.microsoft.com/office/powerpoint/2010/main" Requires="p14">
-      <p:transition spd="med" p14:dur="750">
+  <mc:AlternateContent xmlns:mc="http://schemas.openxmlformats.org/markup-compatibility/2006" xmlns:p14="http://schemas.microsoft.com/office/powerpoint/2010/main">
+    <mc:Choice Requires="p14">
+      <p:transition spd="med">
         <p:pull/>
       </p:transition>
     </mc:Choice>
-    <mc:Fallback>
+    <mc:Fallback xmlns="">
       <p:transition spd="med">
         <p:pull/>
       </p:transition>
@@ -12233,15 +11366,6 @@
               </a:rPr>
               <a:t>Khái niệm giải pháp thu thập </a:t>
             </a:r>
-            <a:endParaRPr lang="en-US" sz="6000" b="1" i="1">
-              <a:solidFill>
-                <a:srgbClr val="2D3880"/>
-              </a:solidFill>
-              <a:latin typeface="Times New Roman" panose="02020603050405020304" charset="0"/>
-              <a:ea typeface="Cormorant Garamond Bold Italics" panose="00000800000000000000"/>
-              <a:cs typeface="Times New Roman" panose="02020603050405020304" charset="0"/>
-              <a:sym typeface="Cormorant Garamond Bold Italics" panose="00000800000000000000"/>
-            </a:endParaRPr>
           </a:p>
           <a:p>
             <a:pPr marL="0" lvl="0" indent="0" algn="l">
@@ -12261,15 +11385,6 @@
               </a:rPr>
               <a:t>dữ liệu thông qua API</a:t>
             </a:r>
-            <a:endParaRPr lang="en-US" sz="6000" b="1" i="1">
-              <a:solidFill>
-                <a:srgbClr val="2D3880"/>
-              </a:solidFill>
-              <a:latin typeface="Times New Roman" panose="02020603050405020304" charset="0"/>
-              <a:ea typeface="Cormorant Garamond Bold Italics" panose="00000800000000000000"/>
-              <a:cs typeface="Times New Roman" panose="02020603050405020304" charset="0"/>
-              <a:sym typeface="Cormorant Garamond Bold Italics" panose="00000800000000000000"/>
-            </a:endParaRPr>
           </a:p>
         </p:txBody>
       </p:sp>
@@ -12311,15 +11426,6 @@
               </a:rPr>
               <a:t>Giải pháp thu thập dữ liệu thông qua API là một phương pháp lấy thông tin từ các cửa hàng trực tuyến. Có thể truy cập từng trang web và sao chép dữ liệu hay sử dụng các giao diện lập trình ứng dụng (API) mà các nền tảng này cung cấp. </a:t>
             </a:r>
-            <a:endParaRPr lang="en-US" sz="3200">
-              <a:solidFill>
-                <a:srgbClr val="2D3880"/>
-              </a:solidFill>
-              <a:latin typeface="Times New Roman" panose="02020603050405020304" charset="0"/>
-              <a:ea typeface="Glacial Indifference"/>
-              <a:cs typeface="Times New Roman" panose="02020603050405020304" charset="0"/>
-              <a:sym typeface="Glacial Indifference"/>
-            </a:endParaRPr>
           </a:p>
         </p:txBody>
       </p:sp>
@@ -12361,15 +11467,6 @@
               </a:rPr>
               <a:t> API đóng vai trò như một cầu nối, cho phép các ứng dụng khác tương tác và lấy dữ liệu từ hệ thống của nền tảng đó.</a:t>
             </a:r>
-            <a:endParaRPr lang="en-US" sz="3200">
-              <a:solidFill>
-                <a:srgbClr val="2D3880"/>
-              </a:solidFill>
-              <a:latin typeface="Times New Roman" panose="02020603050405020304" charset="0"/>
-              <a:ea typeface="Glacial Indifference"/>
-              <a:cs typeface="Times New Roman" panose="02020603050405020304" charset="0"/>
-              <a:sym typeface="Glacial Indifference"/>
-            </a:endParaRPr>
           </a:p>
         </p:txBody>
       </p:sp>
@@ -12380,7 +11477,7 @@
           <p:nvPr/>
         </p:nvPicPr>
         <p:blipFill>
-          <a:blip r:embed="rId1"/>
+          <a:blip r:embed="rId2"/>
           <a:srcRect r="9485"/>
           <a:stretch>
             <a:fillRect/>
@@ -12401,13 +11498,13 @@
   <p:clrMapOvr>
     <a:masterClrMapping/>
   </p:clrMapOvr>
-  <mc:AlternateContent xmlns:mc="http://schemas.openxmlformats.org/markup-compatibility/2006">
-    <mc:Choice xmlns:p14="http://schemas.microsoft.com/office/powerpoint/2010/main" Requires="p14">
-      <p:transition spd="med" p14:dur="750">
+  <mc:AlternateContent xmlns:mc="http://schemas.openxmlformats.org/markup-compatibility/2006" xmlns:p14="http://schemas.microsoft.com/office/powerpoint/2010/main">
+    <mc:Choice Requires="p14">
+      <p:transition spd="med">
         <p:pull/>
       </p:transition>
     </mc:Choice>
-    <mc:Fallback>
+    <mc:Fallback xmlns="">
       <p:transition spd="med">
         <p:pull/>
       </p:transition>
@@ -12472,10 +11569,10 @@
             </a:pathLst>
           </a:custGeom>
           <a:blipFill>
-            <a:blip r:embed="rId1">
+            <a:blip r:embed="rId3">
               <a:extLst>
                 <a:ext uri="{96DAC541-7B7A-43D3-8B79-37D633B846F1}">
-                  <asvg:svgBlip xmlns:asvg="http://schemas.microsoft.com/office/drawing/2016/SVG/main" r:embed="rId2"/>
+                  <asvg:svgBlip xmlns:asvg="http://schemas.microsoft.com/office/drawing/2016/SVG/main" r:embed="rId4"/>
                 </a:ext>
               </a:extLst>
             </a:blip>
@@ -12526,15 +11623,6 @@
               </a:rPr>
               <a:t>Các loại API</a:t>
             </a:r>
-            <a:endParaRPr lang="vi-VN" altLang="en-US" sz="8800" b="1" i="1">
-              <a:solidFill>
-                <a:srgbClr val="2D3880"/>
-              </a:solidFill>
-              <a:latin typeface="Times New Roman" panose="02020603050405020304" charset="0"/>
-              <a:ea typeface="Cormorant Garamond Bold Italics" panose="00000800000000000000"/>
-              <a:cs typeface="Times New Roman" panose="02020603050405020304" charset="0"/>
-              <a:sym typeface="Cormorant Garamond Bold Italics" panose="00000800000000000000"/>
-            </a:endParaRPr>
           </a:p>
         </p:txBody>
       </p:sp>
@@ -12580,6 +11668,7 @@
         </p:style>
         <p:txBody>
           <a:bodyPr rtlCol="0" anchor="ctr"/>
+          <a:lstStyle/>
           <a:p>
             <a:pPr algn="ctr"/>
             <a:r>
@@ -12594,15 +11683,6 @@
               </a:rPr>
               <a:t>API tổng hợp</a:t>
             </a:r>
-            <a:endParaRPr lang="vi-VN" altLang="en-US" sz="3200">
-              <a:solidFill>
-                <a:schemeClr val="tx2">
-                  <a:lumMod val="75000"/>
-                </a:schemeClr>
-              </a:solidFill>
-              <a:latin typeface="Times New Roman" panose="02020603050405020304" charset="0"/>
-              <a:cs typeface="Times New Roman" panose="02020603050405020304" charset="0"/>
-            </a:endParaRPr>
           </a:p>
         </p:txBody>
       </p:sp>
@@ -12648,6 +11728,7 @@
         </p:style>
         <p:txBody>
           <a:bodyPr rtlCol="0" anchor="ctr"/>
+          <a:lstStyle/>
           <a:p>
             <a:pPr algn="ctr"/>
             <a:r>
@@ -12660,29 +11741,8 @@
                 <a:latin typeface="Times New Roman" panose="02020603050405020304" charset="0"/>
                 <a:cs typeface="Times New Roman" panose="02020603050405020304" charset="0"/>
               </a:rPr>
-              <a:t>API </a:t>
-            </a:r>
-            <a:r>
-              <a:rPr lang="vi-VN" altLang="en-US" sz="3200">
-                <a:solidFill>
-                  <a:schemeClr val="tx2">
-                    <a:lumMod val="75000"/>
-                  </a:schemeClr>
-                </a:solidFill>
-                <a:latin typeface="Times New Roman" panose="02020603050405020304" charset="0"/>
-                <a:cs typeface="Times New Roman" panose="02020603050405020304" charset="0"/>
-              </a:rPr>
-              <a:t>đối tác</a:t>
-            </a:r>
-            <a:endParaRPr lang="vi-VN" altLang="en-US" sz="3200">
-              <a:solidFill>
-                <a:schemeClr val="tx2">
-                  <a:lumMod val="75000"/>
-                </a:schemeClr>
-              </a:solidFill>
-              <a:latin typeface="Times New Roman" panose="02020603050405020304" charset="0"/>
-              <a:cs typeface="Times New Roman" panose="02020603050405020304" charset="0"/>
-            </a:endParaRPr>
+              <a:t>API đối tác</a:t>
+            </a:r>
           </a:p>
         </p:txBody>
       </p:sp>
@@ -12728,6 +11788,7 @@
         </p:style>
         <p:txBody>
           <a:bodyPr rtlCol="0" anchor="ctr"/>
+          <a:lstStyle/>
           <a:p>
             <a:pPr algn="ctr"/>
             <a:r>
@@ -12740,29 +11801,8 @@
                 <a:latin typeface="Times New Roman" panose="02020603050405020304" charset="0"/>
                 <a:cs typeface="Times New Roman" panose="02020603050405020304" charset="0"/>
               </a:rPr>
-              <a:t>API nội </a:t>
-            </a:r>
-            <a:r>
-              <a:rPr lang="vi-VN" altLang="en-US" sz="3200">
-                <a:solidFill>
-                  <a:schemeClr val="tx2">
-                    <a:lumMod val="75000"/>
-                  </a:schemeClr>
-                </a:solidFill>
-                <a:latin typeface="Times New Roman" panose="02020603050405020304" charset="0"/>
-                <a:cs typeface="Times New Roman" panose="02020603050405020304" charset="0"/>
-              </a:rPr>
-              <a:t>bộ</a:t>
-            </a:r>
-            <a:endParaRPr lang="vi-VN" altLang="en-US" sz="3200">
-              <a:solidFill>
-                <a:schemeClr val="tx2">
-                  <a:lumMod val="75000"/>
-                </a:schemeClr>
-              </a:solidFill>
-              <a:latin typeface="Times New Roman" panose="02020603050405020304" charset="0"/>
-              <a:cs typeface="Times New Roman" panose="02020603050405020304" charset="0"/>
-            </a:endParaRPr>
+              <a:t>API nội bộ</a:t>
+            </a:r>
           </a:p>
         </p:txBody>
       </p:sp>
@@ -12818,15 +11858,6 @@
                 </a:rPr>
                 <a:t>API </a:t>
               </a:r>
-              <a:endParaRPr lang="vi-VN" altLang="en-US" sz="4000" b="1">
-                <a:solidFill>
-                  <a:srgbClr val="2D3880"/>
-                </a:solidFill>
-                <a:latin typeface="Times New Roman" panose="02020603050405020304" charset="0"/>
-                <a:ea typeface="Glacial Indifference Bold" panose="00000800000000000000"/>
-                <a:cs typeface="Times New Roman" panose="02020603050405020304" charset="0"/>
-                <a:sym typeface="Glacial Indifference Bold" panose="00000800000000000000"/>
-              </a:endParaRPr>
             </a:p>
             <a:p>
               <a:pPr marL="0" lvl="0" indent="0" algn="ctr">
@@ -12846,15 +11877,6 @@
                 </a:rPr>
                 <a:t>về mặt truy cập</a:t>
               </a:r>
-              <a:endParaRPr lang="vi-VN" altLang="en-US" sz="4000" b="1">
-                <a:solidFill>
-                  <a:srgbClr val="2D3880"/>
-                </a:solidFill>
-                <a:latin typeface="Times New Roman" panose="02020603050405020304" charset="0"/>
-                <a:ea typeface="Glacial Indifference Bold" panose="00000800000000000000"/>
-                <a:cs typeface="Times New Roman" panose="02020603050405020304" charset="0"/>
-                <a:sym typeface="Glacial Indifference Bold" panose="00000800000000000000"/>
-              </a:endParaRPr>
             </a:p>
           </p:txBody>
         </p:sp>
@@ -12889,6 +11911,7 @@
           </p:style>
           <p:txBody>
             <a:bodyPr rtlCol="0" anchor="ctr"/>
+            <a:lstStyle/>
             <a:p>
               <a:pPr algn="ctr"/>
               <a:endParaRPr lang="en-US"/>
@@ -12938,6 +11961,7 @@
         </p:style>
         <p:txBody>
           <a:bodyPr rtlCol="0" anchor="ctr"/>
+          <a:lstStyle/>
           <a:p>
             <a:pPr algn="ctr"/>
             <a:r>
@@ -12950,29 +11974,8 @@
                 <a:latin typeface="Times New Roman" panose="02020603050405020304" charset="0"/>
                 <a:cs typeface="Times New Roman" panose="02020603050405020304" charset="0"/>
               </a:rPr>
-              <a:t>API </a:t>
-            </a:r>
-            <a:r>
-              <a:rPr lang="vi-VN" altLang="en-US" sz="3200">
-                <a:solidFill>
-                  <a:schemeClr val="tx2">
-                    <a:lumMod val="75000"/>
-                  </a:schemeClr>
-                </a:solidFill>
-                <a:latin typeface="Times New Roman" panose="02020603050405020304" charset="0"/>
-                <a:cs typeface="Times New Roman" panose="02020603050405020304" charset="0"/>
-              </a:rPr>
-              <a:t>mở</a:t>
-            </a:r>
-            <a:endParaRPr lang="vi-VN" altLang="en-US" sz="3200">
-              <a:solidFill>
-                <a:schemeClr val="tx2">
-                  <a:lumMod val="75000"/>
-                </a:schemeClr>
-              </a:solidFill>
-              <a:latin typeface="Times New Roman" panose="02020603050405020304" charset="0"/>
-              <a:cs typeface="Times New Roman" panose="02020603050405020304" charset="0"/>
-            </a:endParaRPr>
+              <a:t>API mở</a:t>
+            </a:r>
           </a:p>
         </p:txBody>
       </p:sp>
@@ -13155,6 +12158,7 @@
           <a:bodyPr wrap="square">
             <a:spAutoFit/>
           </a:bodyPr>
+          <a:lstStyle/>
           <a:p>
             <a:pPr marL="457200" indent="-228600" defTabSz="457200">
               <a:lnSpc>
@@ -13190,9 +12194,6 @@
               </a:rPr>
               <a:t>Giống như tên gọi, các API này có sẵn công khai, vậy nên sẽ không có bất kỳ hạn chế nào khi người dùng truy cập các API này.</a:t>
             </a:r>
-            <a:endParaRPr lang="en-US" sz="3600">
-              <a:ea typeface="Times New Roman" panose="02020603050405020304"/>
-            </a:endParaRPr>
           </a:p>
         </p:txBody>
       </p:sp>
@@ -13235,10 +12236,10 @@
             </a:pathLst>
           </a:custGeom>
           <a:blipFill>
-            <a:blip r:embed="rId3">
+            <a:blip r:embed="rId5">
               <a:extLst>
                 <a:ext uri="{96DAC541-7B7A-43D3-8B79-37D633B846F1}">
-                  <asvg:svgBlip xmlns:asvg="http://schemas.microsoft.com/office/drawing/2016/SVG/main" r:embed="rId4"/>
+                  <asvg:svgBlip xmlns:asvg="http://schemas.microsoft.com/office/drawing/2016/SVG/main" r:embed="rId6"/>
                 </a:ext>
               </a:extLst>
             </a:blip>
@@ -13275,6 +12276,7 @@
           <a:bodyPr wrap="square">
             <a:spAutoFit/>
           </a:bodyPr>
+          <a:lstStyle/>
           <a:p>
             <a:pPr marL="457200" indent="457200" defTabSz="457200">
               <a:lnSpc>
@@ -13294,23 +12296,8 @@
               <a:rPr lang="en-US" altLang="en-US" sz="3600">
                 <a:ea typeface="Times New Roman" panose="02020603050405020304"/>
               </a:rPr>
-              <a:t>API không có sẵn công khai, chính vì vậy chỉ khi </a:t>
-            </a:r>
-            <a:r>
-              <a:rPr lang="en-US" altLang="en-US" sz="3600">
-                <a:ea typeface="Times New Roman" panose="02020603050405020304"/>
-              </a:rPr>
-              <a:t>đư</a:t>
-            </a:r>
-            <a:r>
-              <a:rPr lang="en-US" altLang="en-US" sz="3600">
-                <a:ea typeface="Times New Roman" panose="02020603050405020304"/>
-              </a:rPr>
-              <a:t>ợc cấp quyền hoặc các giấy phép liên quan thì mới có thể truy cập loại API này.</a:t>
-            </a:r>
-            <a:endParaRPr lang="en-US" altLang="en-US" sz="3600">
-              <a:ea typeface="Times New Roman" panose="02020603050405020304"/>
-            </a:endParaRPr>
+              <a:t>API không có sẵn công khai, chính vì vậy chỉ khi được cấp quyền hoặc các giấy phép liên quan thì mới có thể truy cập loại API này.</a:t>
+            </a:r>
           </a:p>
         </p:txBody>
       </p:sp>
@@ -13341,6 +12328,7 @@
           <a:bodyPr wrap="square" anchor="ctr" anchorCtr="0">
             <a:noAutofit/>
           </a:bodyPr>
+          <a:lstStyle/>
           <a:p>
             <a:pPr marL="457200" indent="457200" algn="l" defTabSz="457200">
               <a:lnSpc>
@@ -13360,23 +12348,8 @@
               <a:rPr lang="en-US" altLang="en-US" sz="3600">
                 <a:ea typeface="Times New Roman" panose="02020603050405020304"/>
               </a:rPr>
-              <a:t>API riêng t</a:t>
-            </a:r>
-            <a:r>
-              <a:rPr lang="en-US" altLang="en-US" sz="3600">
-                <a:ea typeface="Times New Roman" panose="02020603050405020304"/>
-              </a:rPr>
-              <a:t>ư</a:t>
-            </a:r>
-            <a:r>
-              <a:rPr lang="en-US" altLang="en-US" sz="3600">
-                <a:ea typeface="Times New Roman" panose="02020603050405020304"/>
-              </a:rPr>
-              <a:t>, chỉ những hệ thống nội bộ mới có quyền truy cập và sử dụng loại API này</a:t>
-            </a:r>
-            <a:endParaRPr lang="en-US" altLang="en-US" sz="3600">
-              <a:ea typeface="Times New Roman" panose="02020603050405020304"/>
-            </a:endParaRPr>
+              <a:t>API riêng tư, chỉ những hệ thống nội bộ mới có quyền truy cập và sử dụng loại API này</a:t>
+            </a:r>
           </a:p>
         </p:txBody>
       </p:sp>
@@ -13407,6 +12380,7 @@
           <a:bodyPr wrap="square" anchor="ctr" anchorCtr="0">
             <a:noAutofit/>
           </a:bodyPr>
+          <a:lstStyle/>
           <a:p>
             <a:pPr marL="457200" indent="457200" algn="l" defTabSz="457200">
               <a:lnSpc>
@@ -13432,35 +12406,8 @@
               <a:rPr lang="en-US" altLang="en-US" sz="3600">
                 <a:ea typeface="Times New Roman" panose="02020603050405020304"/>
               </a:rPr>
-              <a:t>ự kết hợp của 2 API khác nhau </a:t>
-            </a:r>
-            <a:r>
-              <a:rPr lang="en-US" altLang="en-US" sz="3600">
-                <a:ea typeface="Times New Roman" panose="02020603050405020304"/>
-              </a:rPr>
-              <a:t>đ</a:t>
-            </a:r>
-            <a:r>
-              <a:rPr lang="en-US" altLang="en-US" sz="3600">
-                <a:ea typeface="Times New Roman" panose="02020603050405020304"/>
-              </a:rPr>
-              <a:t>ể giải quyết những vấn </a:t>
-            </a:r>
-            <a:r>
-              <a:rPr lang="en-US" altLang="en-US" sz="3600">
-                <a:ea typeface="Times New Roman" panose="02020603050405020304"/>
-              </a:rPr>
-              <a:t>đ</a:t>
-            </a:r>
-            <a:r>
-              <a:rPr lang="en-US" altLang="en-US" sz="3600">
-                <a:ea typeface="Times New Roman" panose="02020603050405020304"/>
-              </a:rPr>
-              <a:t>ề phức tạp của hệ thống.</a:t>
-            </a:r>
-            <a:endParaRPr lang="en-US" altLang="en-US" sz="3600">
-              <a:ea typeface="Times New Roman" panose="02020603050405020304"/>
-            </a:endParaRPr>
+              <a:t>ự kết hợp của 2 API khác nhau để giải quyết những vấn đề phức tạp của hệ thống.</a:t>
+            </a:r>
           </a:p>
         </p:txBody>
       </p:sp>
@@ -13469,13 +12416,13 @@
   <p:clrMapOvr>
     <a:masterClrMapping/>
   </p:clrMapOvr>
-  <mc:AlternateContent xmlns:mc="http://schemas.openxmlformats.org/markup-compatibility/2006">
-    <mc:Choice xmlns:p14="http://schemas.microsoft.com/office/powerpoint/2010/main" Requires="p14">
+  <mc:AlternateContent xmlns:mc="http://schemas.openxmlformats.org/markup-compatibility/2006" xmlns:p14="http://schemas.microsoft.com/office/powerpoint/2010/main">
+    <mc:Choice Requires="p14">
       <p:transition spd="slow" p14:dur="1500">
         <p:split orient="vert" dir="in"/>
       </p:transition>
     </mc:Choice>
-    <mc:Fallback>
+    <mc:Fallback xmlns="">
       <p:transition spd="slow">
         <p:split orient="vert" dir="in"/>
       </p:transition>
@@ -14128,20 +13075,20 @@
       </p:par>
     </p:tnLst>
     <p:bldLst>
+      <p:bldP spid="17" grpId="0" animBg="1"/>
+      <p:bldP spid="17" grpId="1" animBg="1"/>
+      <p:bldP spid="19" grpId="0" animBg="1"/>
+      <p:bldP spid="19" grpId="1" animBg="1"/>
+      <p:bldP spid="23" grpId="0" animBg="1"/>
+      <p:bldP spid="23" grpId="1" animBg="1"/>
       <p:bldP spid="28" grpId="0" animBg="1"/>
       <p:bldP spid="28" grpId="1" animBg="1"/>
       <p:bldP spid="89" grpId="0" bldLvl="0" animBg="1"/>
       <p:bldP spid="89" grpId="1" animBg="1"/>
-      <p:bldP spid="19" grpId="0" animBg="1"/>
-      <p:bldP spid="19" grpId="1" animBg="1"/>
       <p:bldP spid="92" grpId="0" bldLvl="0" animBg="1"/>
       <p:bldP spid="92" grpId="1" animBg="1"/>
-      <p:bldP spid="23" grpId="0" animBg="1"/>
-      <p:bldP spid="23" grpId="1" animBg="1"/>
       <p:bldP spid="93" grpId="0" bldLvl="0" animBg="1"/>
       <p:bldP spid="93" grpId="1" animBg="1"/>
-      <p:bldP spid="17" grpId="0" animBg="1"/>
-      <p:bldP spid="17" grpId="1" animBg="1"/>
       <p:bldP spid="94" grpId="0" animBg="1"/>
       <p:bldP spid="94" grpId="1" animBg="1"/>
     </p:bldLst>
@@ -14205,10 +13152,10 @@
             </a:pathLst>
           </a:custGeom>
           <a:blipFill>
-            <a:blip r:embed="rId1">
+            <a:blip r:embed="rId3">
               <a:extLst>
                 <a:ext uri="{96DAC541-7B7A-43D3-8B79-37D633B846F1}">
-                  <asvg:svgBlip xmlns:asvg="http://schemas.microsoft.com/office/drawing/2016/SVG/main" r:embed="rId2"/>
+                  <asvg:svgBlip xmlns:asvg="http://schemas.microsoft.com/office/drawing/2016/SVG/main" r:embed="rId4"/>
                 </a:ext>
               </a:extLst>
             </a:blip>
@@ -14259,15 +13206,6 @@
               </a:rPr>
               <a:t>Các loại API</a:t>
             </a:r>
-            <a:endParaRPr lang="vi-VN" altLang="en-US" sz="8800" b="1" i="1">
-              <a:solidFill>
-                <a:srgbClr val="2D3880"/>
-              </a:solidFill>
-              <a:latin typeface="Times New Roman" panose="02020603050405020304" charset="0"/>
-              <a:ea typeface="Cormorant Garamond Bold Italics" panose="00000800000000000000"/>
-              <a:cs typeface="Times New Roman" panose="02020603050405020304" charset="0"/>
-              <a:sym typeface="Cormorant Garamond Bold Italics" panose="00000800000000000000"/>
-            </a:endParaRPr>
           </a:p>
         </p:txBody>
       </p:sp>
@@ -14323,15 +13261,6 @@
                 </a:rPr>
                 <a:t>API </a:t>
               </a:r>
-              <a:endParaRPr lang="vi-VN" altLang="en-US" sz="4000" b="1">
-                <a:solidFill>
-                  <a:srgbClr val="2D3880"/>
-                </a:solidFill>
-                <a:latin typeface="Times New Roman" panose="02020603050405020304" charset="0"/>
-                <a:ea typeface="Glacial Indifference Bold" panose="00000800000000000000"/>
-                <a:cs typeface="Times New Roman" panose="02020603050405020304" charset="0"/>
-                <a:sym typeface="Glacial Indifference Bold" panose="00000800000000000000"/>
-              </a:endParaRPr>
             </a:p>
             <a:p>
               <a:pPr marL="0" lvl="0" indent="0" algn="ctr">
@@ -14349,29 +13278,8 @@
                   <a:cs typeface="Times New Roman" panose="02020603050405020304" charset="0"/>
                   <a:sym typeface="Glacial Indifference Bold" panose="00000800000000000000"/>
                 </a:rPr>
-                <a:t>về mặt kiến t</a:t>
+                <a:t>về mặt kiến trúc</a:t>
               </a:r>
-              <a:r>
-                <a:rPr lang="vi-VN" altLang="en-US" sz="4000" b="1">
-                  <a:solidFill>
-                    <a:srgbClr val="2D3880"/>
-                  </a:solidFill>
-                  <a:latin typeface="Times New Roman" panose="02020603050405020304" charset="0"/>
-                  <a:ea typeface="Glacial Indifference Bold" panose="00000800000000000000"/>
-                  <a:cs typeface="Times New Roman" panose="02020603050405020304" charset="0"/>
-                  <a:sym typeface="Glacial Indifference Bold" panose="00000800000000000000"/>
-                </a:rPr>
-                <a:t>rúc</a:t>
-              </a:r>
-              <a:endParaRPr lang="vi-VN" altLang="en-US" sz="4000" b="1">
-                <a:solidFill>
-                  <a:srgbClr val="2D3880"/>
-                </a:solidFill>
-                <a:latin typeface="Times New Roman" panose="02020603050405020304" charset="0"/>
-                <a:ea typeface="Glacial Indifference Bold" panose="00000800000000000000"/>
-                <a:cs typeface="Times New Roman" panose="02020603050405020304" charset="0"/>
-                <a:sym typeface="Glacial Indifference Bold" panose="00000800000000000000"/>
-              </a:endParaRPr>
             </a:p>
           </p:txBody>
         </p:sp>
@@ -14406,6 +13314,7 @@
           </p:style>
           <p:txBody>
             <a:bodyPr rtlCol="0" anchor="ctr"/>
+            <a:lstStyle/>
             <a:p>
               <a:pPr algn="ctr"/>
               <a:endParaRPr lang="en-US"/>
@@ -14455,6 +13364,7 @@
         </p:style>
         <p:txBody>
           <a:bodyPr rtlCol="0" anchor="ctr"/>
+          <a:lstStyle/>
           <a:p>
             <a:pPr algn="ctr"/>
             <a:r>
@@ -14469,15 +13379,6 @@
               </a:rPr>
               <a:t>REST API</a:t>
             </a:r>
-            <a:endParaRPr lang="vi-VN" altLang="en-US" sz="3200">
-              <a:solidFill>
-                <a:schemeClr val="tx2">
-                  <a:lumMod val="75000"/>
-                </a:schemeClr>
-              </a:solidFill>
-              <a:latin typeface="Times New Roman" panose="02020603050405020304" charset="0"/>
-              <a:cs typeface="Times New Roman" panose="02020603050405020304" charset="0"/>
-            </a:endParaRPr>
           </a:p>
         </p:txBody>
       </p:sp>
@@ -14523,6 +13424,7 @@
         </p:style>
         <p:txBody>
           <a:bodyPr rtlCol="0" anchor="ctr"/>
+          <a:lstStyle/>
           <a:p>
             <a:pPr algn="ctr"/>
             <a:r>
@@ -14561,15 +13463,6 @@
               </a:rPr>
               <a:t> API</a:t>
             </a:r>
-            <a:endParaRPr lang="vi-VN" altLang="en-US" sz="3200">
-              <a:solidFill>
-                <a:schemeClr val="tx2">
-                  <a:lumMod val="75000"/>
-                </a:schemeClr>
-              </a:solidFill>
-              <a:latin typeface="Times New Roman" panose="02020603050405020304" charset="0"/>
-              <a:cs typeface="Times New Roman" panose="02020603050405020304" charset="0"/>
-            </a:endParaRPr>
           </a:p>
         </p:txBody>
       </p:sp>
@@ -14615,6 +13508,7 @@
         </p:style>
         <p:txBody>
           <a:bodyPr rtlCol="0" anchor="ctr"/>
+          <a:lstStyle/>
           <a:p>
             <a:pPr algn="ctr"/>
             <a:r>
@@ -14629,15 +13523,6 @@
               </a:rPr>
               <a:t>SOAP API</a:t>
             </a:r>
-            <a:endParaRPr lang="vi-VN" altLang="en-US" sz="3200">
-              <a:solidFill>
-                <a:schemeClr val="tx2">
-                  <a:lumMod val="75000"/>
-                </a:schemeClr>
-              </a:solidFill>
-              <a:latin typeface="Times New Roman" panose="02020603050405020304" charset="0"/>
-              <a:cs typeface="Times New Roman" panose="02020603050405020304" charset="0"/>
-            </a:endParaRPr>
           </a:p>
         </p:txBody>
       </p:sp>
@@ -14683,6 +13568,7 @@
         </p:style>
         <p:txBody>
           <a:bodyPr rtlCol="0" anchor="ctr"/>
+          <a:lstStyle/>
           <a:p>
             <a:pPr algn="ctr"/>
             <a:r>
@@ -14697,15 +13583,6 @@
               </a:rPr>
               <a:t>Kafka API</a:t>
             </a:r>
-            <a:endParaRPr lang="vi-VN" altLang="en-US" sz="3200">
-              <a:solidFill>
-                <a:schemeClr val="tx2">
-                  <a:lumMod val="75000"/>
-                </a:schemeClr>
-              </a:solidFill>
-              <a:latin typeface="Times New Roman" panose="02020603050405020304" charset="0"/>
-              <a:cs typeface="Times New Roman" panose="02020603050405020304" charset="0"/>
-            </a:endParaRPr>
           </a:p>
         </p:txBody>
       </p:sp>
@@ -14751,6 +13628,7 @@
         </p:style>
         <p:txBody>
           <a:bodyPr rtlCol="0" anchor="ctr"/>
+          <a:lstStyle/>
           <a:p>
             <a:pPr algn="ctr"/>
             <a:r>
@@ -14765,15 +13643,6 @@
               </a:rPr>
               <a:t>Async API</a:t>
             </a:r>
-            <a:endParaRPr lang="vi-VN" altLang="en-US" sz="3200">
-              <a:solidFill>
-                <a:schemeClr val="tx2">
-                  <a:lumMod val="75000"/>
-                </a:schemeClr>
-              </a:solidFill>
-              <a:latin typeface="Times New Roman" panose="02020603050405020304" charset="0"/>
-              <a:cs typeface="Times New Roman" panose="02020603050405020304" charset="0"/>
-            </a:endParaRPr>
           </a:p>
         </p:txBody>
       </p:sp>
@@ -14994,6 +13863,7 @@
           <a:bodyPr wrap="square" anchor="ctr" anchorCtr="0">
             <a:noAutofit/>
           </a:bodyPr>
+          <a:lstStyle/>
           <a:p>
             <a:pPr marL="457200" indent="457200" algn="l" defTabSz="457200">
               <a:lnSpc>
@@ -15013,35 +13883,8 @@
               <a:rPr lang="en-US" altLang="en-US" sz="3600">
                 <a:ea typeface="Times New Roman" panose="02020603050405020304"/>
               </a:rPr>
-              <a:t>Cho phép thực hiện các hoạt </a:t>
-            </a:r>
-            <a:r>
-              <a:rPr lang="en-US" altLang="en-US" sz="3600">
-                <a:ea typeface="Times New Roman" panose="02020603050405020304"/>
-              </a:rPr>
-              <a:t>đ</a:t>
-            </a:r>
-            <a:r>
-              <a:rPr lang="en-US" altLang="en-US" sz="3600">
-                <a:ea typeface="Times New Roman" panose="02020603050405020304"/>
-              </a:rPr>
-              <a:t>ộng CRUD (tạo, </a:t>
-            </a:r>
-            <a:r>
-              <a:rPr lang="en-US" altLang="en-US" sz="3600">
-                <a:ea typeface="Times New Roman" panose="02020603050405020304"/>
-              </a:rPr>
-              <a:t>đ</a:t>
-            </a:r>
-            <a:r>
-              <a:rPr lang="en-US" altLang="en-US" sz="3600">
-                <a:ea typeface="Times New Roman" panose="02020603050405020304"/>
-              </a:rPr>
-              <a:t>ọc, cập nhật và xóa) giữa máy khách và máy chủ.</a:t>
-            </a:r>
-            <a:endParaRPr lang="en-US" altLang="en-US" sz="3600">
-              <a:ea typeface="Times New Roman" panose="02020603050405020304"/>
-            </a:endParaRPr>
+              <a:t>Cho phép thực hiện các hoạt động CRUD (tạo, đọc, cập nhật và xóa) giữa máy khách và máy chủ.</a:t>
+            </a:r>
           </a:p>
         </p:txBody>
       </p:sp>
@@ -15072,6 +13915,7 @@
           <a:bodyPr wrap="square" anchor="ctr" anchorCtr="0">
             <a:noAutofit/>
           </a:bodyPr>
+          <a:lstStyle/>
           <a:p>
             <a:pPr marL="457200" indent="457200" algn="l" defTabSz="457200">
               <a:lnSpc>
@@ -15093,9 +13937,6 @@
               </a:rPr>
               <a:t>Là ngôn ngữ truy vấn cho phép máy khách yêu cầu dữ liệu chính xác mà máy khách yêu cầu từ máy chủ.</a:t>
             </a:r>
-            <a:endParaRPr lang="en-US" altLang="en-US" sz="3600">
-              <a:ea typeface="Times New Roman" panose="02020603050405020304"/>
-            </a:endParaRPr>
           </a:p>
         </p:txBody>
       </p:sp>
@@ -15126,6 +13967,7 @@
           <a:bodyPr wrap="square" anchor="ctr" anchorCtr="0">
             <a:noAutofit/>
           </a:bodyPr>
+          <a:lstStyle/>
           <a:p>
             <a:pPr marL="457200" indent="457200" algn="l" defTabSz="457200">
               <a:lnSpc>
@@ -15145,35 +13987,8 @@
               <a:rPr lang="en-US" altLang="en-US" sz="3600">
                 <a:ea typeface="Times New Roman" panose="02020603050405020304"/>
               </a:rPr>
-              <a:t>Bất kỳ dịch vụ web nào tuân thủ </a:t>
-            </a:r>
-            <a:r>
-              <a:rPr lang="en-US" altLang="en-US" sz="3600">
-                <a:ea typeface="Times New Roman" panose="02020603050405020304"/>
-              </a:rPr>
-              <a:t>đ</a:t>
-            </a:r>
-            <a:r>
-              <a:rPr lang="en-US" altLang="en-US" sz="3600">
-                <a:ea typeface="Times New Roman" panose="02020603050405020304"/>
-              </a:rPr>
-              <a:t>ặc tả API SOAP web service </a:t>
-            </a:r>
-            <a:r>
-              <a:rPr lang="en-US" altLang="en-US" sz="3600">
-                <a:ea typeface="Times New Roman" panose="02020603050405020304"/>
-              </a:rPr>
-              <a:t>đ</a:t>
-            </a:r>
-            <a:r>
-              <a:rPr lang="en-US" altLang="en-US" sz="3600">
-                <a:ea typeface="Times New Roman" panose="02020603050405020304"/>
-              </a:rPr>
-              <a:t>ều là SOAP web service.</a:t>
-            </a:r>
-            <a:endParaRPr lang="en-US" altLang="en-US" sz="3600">
-              <a:ea typeface="Times New Roman" panose="02020603050405020304"/>
-            </a:endParaRPr>
+              <a:t>Bất kỳ dịch vụ web nào tuân thủ đặc tả API SOAP web service đều là SOAP web service.</a:t>
+            </a:r>
           </a:p>
         </p:txBody>
       </p:sp>
@@ -15204,6 +14019,7 @@
           <a:bodyPr wrap="square" anchor="ctr" anchorCtr="0">
             <a:noAutofit/>
           </a:bodyPr>
+          <a:lstStyle/>
           <a:p>
             <a:pPr marL="457200" indent="457200" algn="l" defTabSz="457200">
               <a:lnSpc>
@@ -15223,47 +14039,8 @@
               <a:rPr lang="en-US" altLang="en-US" sz="3600">
                 <a:ea typeface="Times New Roman" panose="02020603050405020304"/>
               </a:rPr>
-              <a:t>Là một nền tảng phát trực tuyến sự kiện kết hợp ba khả n</a:t>
-            </a:r>
-            <a:r>
-              <a:rPr lang="en-US" altLang="en-US" sz="3600">
-                <a:ea typeface="Times New Roman" panose="02020603050405020304"/>
-              </a:rPr>
-              <a:t>ă</a:t>
-            </a:r>
-            <a:r>
-              <a:rPr lang="en-US" altLang="en-US" sz="3600">
-                <a:ea typeface="Times New Roman" panose="02020603050405020304"/>
-              </a:rPr>
-              <a:t>ng </a:t>
-            </a:r>
-            <a:r>
-              <a:rPr lang="en-US" altLang="en-US" sz="3600">
-                <a:ea typeface="Times New Roman" panose="02020603050405020304"/>
-              </a:rPr>
-              <a:t>đ</a:t>
-            </a:r>
-            <a:r>
-              <a:rPr lang="en-US" altLang="en-US" sz="3600">
-                <a:ea typeface="Times New Roman" panose="02020603050405020304"/>
-              </a:rPr>
-              <a:t>ể có thể triển khai các tr</a:t>
-            </a:r>
-            <a:r>
-              <a:rPr lang="en-US" altLang="en-US" sz="3600">
-                <a:ea typeface="Times New Roman" panose="02020603050405020304"/>
-              </a:rPr>
-              <a:t>ư</a:t>
-            </a:r>
-            <a:r>
-              <a:rPr lang="en-US" altLang="en-US" sz="3600">
-                <a:ea typeface="Times New Roman" panose="02020603050405020304"/>
-              </a:rPr>
-              <a:t>ờng hợp sử dụng khác nhau.</a:t>
-            </a:r>
-            <a:endParaRPr lang="en-US" altLang="en-US" sz="3600">
-              <a:ea typeface="Times New Roman" panose="02020603050405020304"/>
-            </a:endParaRPr>
+              <a:t>Là một nền tảng phát trực tuyến sự kiện kết hợp ba khả năng để có thể triển khai các trường hợp sử dụng khác nhau.</a:t>
+            </a:r>
           </a:p>
         </p:txBody>
       </p:sp>
@@ -15294,6 +14071,7 @@
           <a:bodyPr wrap="square" anchor="ctr" anchorCtr="0">
             <a:noAutofit/>
           </a:bodyPr>
+          <a:lstStyle/>
           <a:p>
             <a:pPr marL="457200" indent="457200" algn="l" defTabSz="457200">
               <a:lnSpc>
@@ -15313,47 +14091,8 @@
               <a:rPr lang="en-US" altLang="en-US" sz="3600">
                 <a:ea typeface="Times New Roman" panose="02020603050405020304"/>
               </a:rPr>
-              <a:t>Các API này hoạt </a:t>
-            </a:r>
-            <a:r>
-              <a:rPr lang="en-US" altLang="en-US" sz="3600">
-                <a:ea typeface="Times New Roman" panose="02020603050405020304"/>
-              </a:rPr>
-              <a:t>đ</a:t>
-            </a:r>
-            <a:r>
-              <a:rPr lang="en-US" altLang="en-US" sz="3600">
-                <a:ea typeface="Times New Roman" panose="02020603050405020304"/>
-              </a:rPr>
-              <a:t>ộng theo nguyên tắc Event-Driven Architecture (EDA). Trong Async API, nhiều Subscriber có thể </a:t>
-            </a:r>
-            <a:r>
-              <a:rPr lang="en-US" altLang="en-US" sz="3600">
-                <a:ea typeface="Times New Roman" panose="02020603050405020304"/>
-              </a:rPr>
-              <a:t>đă</a:t>
-            </a:r>
-            <a:r>
-              <a:rPr lang="en-US" altLang="en-US" sz="3600">
-                <a:ea typeface="Times New Roman" panose="02020603050405020304"/>
-              </a:rPr>
-              <a:t>ng k</a:t>
-            </a:r>
-            <a:r>
-              <a:rPr lang="en-US" altLang="en-US" sz="3600">
-                <a:ea typeface="Times New Roman" panose="02020603050405020304"/>
-              </a:rPr>
-              <a:t>ý</a:t>
-            </a:r>
-            <a:r>
-              <a:rPr lang="en-US" altLang="en-US" sz="3600">
-                <a:ea typeface="Times New Roman" panose="02020603050405020304"/>
-              </a:rPr>
-              <a:t> Publisher.</a:t>
-            </a:r>
-            <a:endParaRPr lang="en-US" altLang="en-US" sz="3600">
-              <a:ea typeface="Times New Roman" panose="02020603050405020304"/>
-            </a:endParaRPr>
+              <a:t>Các API này hoạt động theo nguyên tắc Event-Driven Architecture (EDA). Trong Async API, nhiều Subscriber có thể đăng ký Publisher.</a:t>
+            </a:r>
           </a:p>
         </p:txBody>
       </p:sp>
@@ -15362,13 +14101,13 @@
   <p:clrMapOvr>
     <a:masterClrMapping/>
   </p:clrMapOvr>
-  <mc:AlternateContent xmlns:mc="http://schemas.openxmlformats.org/markup-compatibility/2006">
-    <mc:Choice xmlns:p14="http://schemas.microsoft.com/office/powerpoint/2010/main" Requires="p14">
-      <p:transition spd="slow" p14:dur="1000">
+  <mc:AlternateContent xmlns:mc="http://schemas.openxmlformats.org/markup-compatibility/2006" xmlns:p14="http://schemas.microsoft.com/office/powerpoint/2010/main">
+    <mc:Choice Requires="p14">
+      <p:transition spd="slow">
         <p:wipe/>
       </p:transition>
     </mc:Choice>
-    <mc:Fallback>
+    <mc:Fallback xmlns="">
       <p:transition spd="slow">
         <p:wipe/>
       </p:transition>
@@ -16164,22 +14903,22 @@
     <p:bldLst>
       <p:bldP spid="73" grpId="0" animBg="1"/>
       <p:bldP spid="73" grpId="1" animBg="1"/>
+      <p:bldP spid="74" grpId="0" animBg="1"/>
+      <p:bldP spid="74" grpId="1" animBg="1"/>
+      <p:bldP spid="75" grpId="0" animBg="1"/>
+      <p:bldP spid="75" grpId="1" animBg="1"/>
+      <p:bldP spid="76" grpId="0" animBg="1"/>
+      <p:bldP spid="76" grpId="1" animBg="1"/>
+      <p:bldP spid="77" grpId="0" animBg="1"/>
+      <p:bldP spid="77" grpId="1" animBg="1"/>
       <p:bldP spid="12" grpId="0" animBg="1"/>
       <p:bldP spid="12" grpId="1" animBg="1"/>
-      <p:bldP spid="74" grpId="0" animBg="1"/>
-      <p:bldP spid="74" grpId="1" animBg="1"/>
       <p:bldP spid="13" grpId="0" animBg="1"/>
       <p:bldP spid="13" grpId="1" animBg="1"/>
-      <p:bldP spid="75" grpId="0" animBg="1"/>
-      <p:bldP spid="75" grpId="1" animBg="1"/>
       <p:bldP spid="14" grpId="0" animBg="1"/>
       <p:bldP spid="14" grpId="1" animBg="1"/>
-      <p:bldP spid="76" grpId="0" animBg="1"/>
-      <p:bldP spid="76" grpId="1" animBg="1"/>
       <p:bldP spid="15" grpId="0" animBg="1"/>
       <p:bldP spid="15" grpId="1" animBg="1"/>
-      <p:bldP spid="77" grpId="0" animBg="1"/>
-      <p:bldP spid="77" grpId="1" animBg="1"/>
       <p:bldP spid="16" grpId="0" animBg="1"/>
       <p:bldP spid="16" grpId="1" animBg="1"/>
     </p:bldLst>
@@ -16465,6 +15204,8 @@
       </a:bgFillStyleLst>
     </a:fmtScheme>
   </a:themeElements>
+  <a:objectDefaults/>
+  <a:extraClrSchemeLst/>
   <a:extLst>
     <a:ext uri="{05A4C25C-085E-4340-85A3-A5531E510DB2}">
       <thm15:themeFamily xmlns:thm15="http://schemas.microsoft.com/office/thememl/2012/main" name="Office Theme" id="{62F939B6-93AF-4DB8-9C6B-D6C7DFDC589F}" vid="{4A3C46E8-61CC-4603-A589-7422A47A8E4A}"/>
@@ -16724,6 +15465,8 @@
       </a:bgFillStyleLst>
     </a:fmtScheme>
   </a:themeElements>
+  <a:objectDefaults/>
+  <a:extraClrSchemeLst/>
   <a:extLst>
     <a:ext uri="{05A4C25C-085E-4340-85A3-A5531E510DB2}">
       <thm15:themeFamily xmlns:thm15="http://schemas.microsoft.com/office/thememl/2012/main" name="Office Theme" id="{62F939B6-93AF-4DB8-9C6B-D6C7DFDC589F}" vid="{4A3C46E8-61CC-4603-A589-7422A47A8E4A}"/>

</xml_diff>